<commit_message>
Modify: UVM.pptx 1. add slide 只有Driver的驗證平台
</commit_message>
<xml_diff>
--- a/UVM/UVM.pptx
+++ b/UVM/UVM.pptx
@@ -8,6 +8,8 @@
     <p:sldId id="256" r:id="rId2"/>
     <p:sldId id="257" r:id="rId3"/>
     <p:sldId id="259" r:id="rId4"/>
+    <p:sldId id="260" r:id="rId5"/>
+    <p:sldId id="261" r:id="rId6"/>
   </p:sldIdLst>
   <p:sldSz cx="12192000" cy="6858000"/>
   <p:notesSz cx="6858000" cy="9144000"/>
@@ -106,6 +108,11 @@
       </a:defRPr>
     </a:lvl9pPr>
   </p:defaultTextStyle>
+  <p:extLst>
+    <p:ext uri="{EFAFB233-063F-42B5-8137-9DF3F51BA10A}">
+      <p15:sldGuideLst xmlns:p15="http://schemas.microsoft.com/office/powerpoint/2012/main"/>
+    </p:ext>
+  </p:extLst>
 </p:presentation>
 </file>
 
@@ -256,7 +263,7 @@
           <a:p>
             <a:fld id="{0F32A204-0AD4-466F-ABEA-B4DB33A37E21}" type="datetimeFigureOut">
               <a:rPr lang="zh-TW" altLang="en-US" smtClean="0"/>
-              <a:t>2025/4/23</a:t>
+              <a:t>2025/4/28</a:t>
             </a:fld>
             <a:endParaRPr lang="zh-TW" altLang="en-US"/>
           </a:p>
@@ -454,7 +461,7 @@
           <a:p>
             <a:fld id="{0F32A204-0AD4-466F-ABEA-B4DB33A37E21}" type="datetimeFigureOut">
               <a:rPr lang="zh-TW" altLang="en-US" smtClean="0"/>
-              <a:t>2025/4/23</a:t>
+              <a:t>2025/4/28</a:t>
             </a:fld>
             <a:endParaRPr lang="zh-TW" altLang="en-US"/>
           </a:p>
@@ -662,7 +669,7 @@
           <a:p>
             <a:fld id="{0F32A204-0AD4-466F-ABEA-B4DB33A37E21}" type="datetimeFigureOut">
               <a:rPr lang="zh-TW" altLang="en-US" smtClean="0"/>
-              <a:t>2025/4/23</a:t>
+              <a:t>2025/4/28</a:t>
             </a:fld>
             <a:endParaRPr lang="zh-TW" altLang="en-US"/>
           </a:p>
@@ -860,7 +867,7 @@
           <a:p>
             <a:fld id="{0F32A204-0AD4-466F-ABEA-B4DB33A37E21}" type="datetimeFigureOut">
               <a:rPr lang="zh-TW" altLang="en-US" smtClean="0"/>
-              <a:t>2025/4/23</a:t>
+              <a:t>2025/4/28</a:t>
             </a:fld>
             <a:endParaRPr lang="zh-TW" altLang="en-US"/>
           </a:p>
@@ -1135,7 +1142,7 @@
           <a:p>
             <a:fld id="{0F32A204-0AD4-466F-ABEA-B4DB33A37E21}" type="datetimeFigureOut">
               <a:rPr lang="zh-TW" altLang="en-US" smtClean="0"/>
-              <a:t>2025/4/23</a:t>
+              <a:t>2025/4/28</a:t>
             </a:fld>
             <a:endParaRPr lang="zh-TW" altLang="en-US"/>
           </a:p>
@@ -1400,7 +1407,7 @@
           <a:p>
             <a:fld id="{0F32A204-0AD4-466F-ABEA-B4DB33A37E21}" type="datetimeFigureOut">
               <a:rPr lang="zh-TW" altLang="en-US" smtClean="0"/>
-              <a:t>2025/4/23</a:t>
+              <a:t>2025/4/28</a:t>
             </a:fld>
             <a:endParaRPr lang="zh-TW" altLang="en-US"/>
           </a:p>
@@ -1812,7 +1819,7 @@
           <a:p>
             <a:fld id="{0F32A204-0AD4-466F-ABEA-B4DB33A37E21}" type="datetimeFigureOut">
               <a:rPr lang="zh-TW" altLang="en-US" smtClean="0"/>
-              <a:t>2025/4/23</a:t>
+              <a:t>2025/4/28</a:t>
             </a:fld>
             <a:endParaRPr lang="zh-TW" altLang="en-US"/>
           </a:p>
@@ -1953,7 +1960,7 @@
           <a:p>
             <a:fld id="{0F32A204-0AD4-466F-ABEA-B4DB33A37E21}" type="datetimeFigureOut">
               <a:rPr lang="zh-TW" altLang="en-US" smtClean="0"/>
-              <a:t>2025/4/23</a:t>
+              <a:t>2025/4/28</a:t>
             </a:fld>
             <a:endParaRPr lang="zh-TW" altLang="en-US"/>
           </a:p>
@@ -2066,7 +2073,7 @@
           <a:p>
             <a:fld id="{0F32A204-0AD4-466F-ABEA-B4DB33A37E21}" type="datetimeFigureOut">
               <a:rPr lang="zh-TW" altLang="en-US" smtClean="0"/>
-              <a:t>2025/4/23</a:t>
+              <a:t>2025/4/28</a:t>
             </a:fld>
             <a:endParaRPr lang="zh-TW" altLang="en-US"/>
           </a:p>
@@ -2377,7 +2384,7 @@
           <a:p>
             <a:fld id="{0F32A204-0AD4-466F-ABEA-B4DB33A37E21}" type="datetimeFigureOut">
               <a:rPr lang="zh-TW" altLang="en-US" smtClean="0"/>
-              <a:t>2025/4/23</a:t>
+              <a:t>2025/4/28</a:t>
             </a:fld>
             <a:endParaRPr lang="zh-TW" altLang="en-US"/>
           </a:p>
@@ -2665,7 +2672,7 @@
           <a:p>
             <a:fld id="{0F32A204-0AD4-466F-ABEA-B4DB33A37E21}" type="datetimeFigureOut">
               <a:rPr lang="zh-TW" altLang="en-US" smtClean="0"/>
-              <a:t>2025/4/23</a:t>
+              <a:t>2025/4/28</a:t>
             </a:fld>
             <a:endParaRPr lang="zh-TW" altLang="en-US"/>
           </a:p>
@@ -2906,7 +2913,7 @@
           <a:p>
             <a:fld id="{0F32A204-0AD4-466F-ABEA-B4DB33A37E21}" type="datetimeFigureOut">
               <a:rPr lang="zh-TW" altLang="en-US" smtClean="0"/>
-              <a:t>2025/4/23</a:t>
+              <a:t>2025/4/28</a:t>
             </a:fld>
             <a:endParaRPr lang="zh-TW" altLang="en-US"/>
           </a:p>
@@ -3461,10 +3468,6 @@
               <a:buAutoNum type="arabicPeriod"/>
             </a:pPr>
             <a:r>
-              <a:rPr lang="zh-TW" altLang="en-US" dirty="0"/>
-              <a:t>一個簡單的</a:t>
-            </a:r>
-            <a:r>
               <a:rPr lang="en-US" altLang="zh-TW" dirty="0"/>
               <a:t>UVM</a:t>
             </a:r>
@@ -3556,10 +3559,6 @@
           <a:lstStyle/>
           <a:p>
             <a:r>
-              <a:rPr lang="zh-TW" altLang="en-US" dirty="0"/>
-              <a:t>一個簡單的</a:t>
-            </a:r>
-            <a:r>
               <a:rPr lang="en-US" altLang="zh-TW" dirty="0"/>
               <a:t>UVM</a:t>
             </a:r>
@@ -3577,6 +3576,825 @@
     <p:extLst>
       <p:ext uri="{BB962C8B-B14F-4D97-AF65-F5344CB8AC3E}">
         <p14:creationId xmlns:p14="http://schemas.microsoft.com/office/powerpoint/2010/main" val="1254450311"/>
+      </p:ext>
+    </p:extLst>
+  </p:cSld>
+  <p:clrMapOvr>
+    <a:masterClrMapping/>
+  </p:clrMapOvr>
+</p:sld>
+</file>
+
+<file path=ppt/slides/slide4.xml><?xml version="1.0" encoding="utf-8"?>
+<p:sld xmlns:a="http://schemas.openxmlformats.org/drawingml/2006/main" xmlns:r="http://schemas.openxmlformats.org/officeDocument/2006/relationships" xmlns:p="http://schemas.openxmlformats.org/presentationml/2006/main">
+  <p:cSld>
+    <p:spTree>
+      <p:nvGrpSpPr>
+        <p:cNvPr id="1" name="">
+          <a:extLst>
+            <a:ext uri="{FF2B5EF4-FFF2-40B4-BE49-F238E27FC236}">
+              <a16:creationId xmlns:a16="http://schemas.microsoft.com/office/drawing/2014/main" id="{14D5E48D-CDF5-C522-5C87-C958A5E62D60}"/>
+            </a:ext>
+          </a:extLst>
+        </p:cNvPr>
+        <p:cNvGrpSpPr/>
+        <p:nvPr/>
+      </p:nvGrpSpPr>
+      <p:grpSpPr>
+        <a:xfrm>
+          <a:off x="0" y="0"/>
+          <a:ext cx="0" cy="0"/>
+          <a:chOff x="0" y="0"/>
+          <a:chExt cx="0" cy="0"/>
+        </a:xfrm>
+      </p:grpSpPr>
+      <p:sp>
+        <p:nvSpPr>
+          <p:cNvPr id="2" name="標題 1">
+            <a:extLst>
+              <a:ext uri="{FF2B5EF4-FFF2-40B4-BE49-F238E27FC236}">
+                <a16:creationId xmlns:a16="http://schemas.microsoft.com/office/drawing/2014/main" id="{F575397F-C6B6-80EA-BAF8-DE5107708551}"/>
+              </a:ext>
+            </a:extLst>
+          </p:cNvPr>
+          <p:cNvSpPr>
+            <a:spLocks noGrp="1"/>
+          </p:cNvSpPr>
+          <p:nvPr>
+            <p:ph type="title"/>
+          </p:nvPr>
+        </p:nvSpPr>
+        <p:spPr/>
+        <p:txBody>
+          <a:bodyPr/>
+          <a:lstStyle/>
+          <a:p>
+            <a:r>
+              <a:rPr lang="en-US" altLang="zh-TW" dirty="0"/>
+              <a:t>UVM</a:t>
+            </a:r>
+            <a:r>
+              <a:rPr lang="zh-TW" altLang="en-US" dirty="0"/>
+              <a:t>平台架構 </a:t>
+            </a:r>
+            <a:r>
+              <a:rPr lang="en-US" altLang="zh-TW" dirty="0"/>
+              <a:t>(1/1)</a:t>
+            </a:r>
+            <a:endParaRPr lang="zh-TW" altLang="en-US" dirty="0"/>
+          </a:p>
+        </p:txBody>
+      </p:sp>
+      <p:sp>
+        <p:nvSpPr>
+          <p:cNvPr id="10" name="內容版面配置區 9">
+            <a:extLst>
+              <a:ext uri="{FF2B5EF4-FFF2-40B4-BE49-F238E27FC236}">
+                <a16:creationId xmlns:a16="http://schemas.microsoft.com/office/drawing/2014/main" id="{693B3D32-FEA7-3EA0-C8DB-3F80963F59D6}"/>
+              </a:ext>
+            </a:extLst>
+          </p:cNvPr>
+          <p:cNvSpPr>
+            <a:spLocks noGrp="1"/>
+          </p:cNvSpPr>
+          <p:nvPr>
+            <p:ph sz="half" idx="1"/>
+          </p:nvPr>
+        </p:nvSpPr>
+        <p:spPr/>
+        <p:txBody>
+          <a:bodyPr/>
+          <a:lstStyle/>
+          <a:p>
+            <a:r>
+              <a:rPr lang="zh-TW" altLang="en-US" dirty="0"/>
+              <a:t>簡單的</a:t>
+            </a:r>
+            <a:r>
+              <a:rPr lang="en-US" altLang="zh-TW" dirty="0"/>
+              <a:t>UVM</a:t>
+            </a:r>
+            <a:r>
+              <a:rPr lang="zh-TW" altLang="en-US" dirty="0"/>
+              <a:t>平台</a:t>
+            </a:r>
+          </a:p>
+        </p:txBody>
+      </p:sp>
+      <p:sp>
+        <p:nvSpPr>
+          <p:cNvPr id="11" name="內容版面配置區 10">
+            <a:extLst>
+              <a:ext uri="{FF2B5EF4-FFF2-40B4-BE49-F238E27FC236}">
+                <a16:creationId xmlns:a16="http://schemas.microsoft.com/office/drawing/2014/main" id="{7B52BFC5-5F1A-F5E6-12D6-B13B82BDADC3}"/>
+              </a:ext>
+            </a:extLst>
+          </p:cNvPr>
+          <p:cNvSpPr>
+            <a:spLocks noGrp="1"/>
+          </p:cNvSpPr>
+          <p:nvPr>
+            <p:ph sz="half" idx="2"/>
+          </p:nvPr>
+        </p:nvSpPr>
+        <p:spPr/>
+        <p:txBody>
+          <a:bodyPr/>
+          <a:lstStyle/>
+          <a:p>
+            <a:r>
+              <a:rPr lang="zh-TW" altLang="en-US" dirty="0"/>
+              <a:t>典型</a:t>
+            </a:r>
+            <a:r>
+              <a:rPr lang="en-US" altLang="zh-TW" dirty="0"/>
+              <a:t>UVM</a:t>
+            </a:r>
+            <a:r>
+              <a:rPr lang="zh-TW" altLang="en-US" dirty="0"/>
+              <a:t>平台</a:t>
+            </a:r>
+          </a:p>
+        </p:txBody>
+      </p:sp>
+      <p:pic>
+        <p:nvPicPr>
+          <p:cNvPr id="5" name="圖片 4">
+            <a:extLst>
+              <a:ext uri="{FF2B5EF4-FFF2-40B4-BE49-F238E27FC236}">
+                <a16:creationId xmlns:a16="http://schemas.microsoft.com/office/drawing/2014/main" id="{1A35B0DE-66F8-3C1F-79BD-7A971CAE2CFC}"/>
+              </a:ext>
+            </a:extLst>
+          </p:cNvPr>
+          <p:cNvPicPr>
+            <a:picLocks noChangeAspect="1"/>
+          </p:cNvPicPr>
+          <p:nvPr/>
+        </p:nvPicPr>
+        <p:blipFill>
+          <a:blip r:embed="rId2"/>
+          <a:stretch>
+            <a:fillRect/>
+          </a:stretch>
+        </p:blipFill>
+        <p:spPr>
+          <a:xfrm>
+            <a:off x="1000330" y="2781468"/>
+            <a:ext cx="4857340" cy="3419453"/>
+          </a:xfrm>
+          <a:prstGeom prst="rect">
+            <a:avLst/>
+          </a:prstGeom>
+          <a:ln>
+            <a:solidFill>
+              <a:schemeClr val="tx1"/>
+            </a:solidFill>
+          </a:ln>
+        </p:spPr>
+      </p:pic>
+      <p:pic>
+        <p:nvPicPr>
+          <p:cNvPr id="15" name="圖片 14">
+            <a:extLst>
+              <a:ext uri="{FF2B5EF4-FFF2-40B4-BE49-F238E27FC236}">
+                <a16:creationId xmlns:a16="http://schemas.microsoft.com/office/drawing/2014/main" id="{17C0DCFA-DD64-D201-4E16-4A069F407713}"/>
+              </a:ext>
+            </a:extLst>
+          </p:cNvPr>
+          <p:cNvPicPr>
+            <a:picLocks noChangeAspect="1"/>
+          </p:cNvPicPr>
+          <p:nvPr/>
+        </p:nvPicPr>
+        <p:blipFill>
+          <a:blip r:embed="rId3"/>
+          <a:stretch>
+            <a:fillRect/>
+          </a:stretch>
+        </p:blipFill>
+        <p:spPr>
+          <a:xfrm>
+            <a:off x="6255438" y="2780921"/>
+            <a:ext cx="5015124" cy="3420000"/>
+          </a:xfrm>
+          <a:prstGeom prst="rect">
+            <a:avLst/>
+          </a:prstGeom>
+          <a:ln>
+            <a:solidFill>
+              <a:schemeClr val="tx1"/>
+            </a:solidFill>
+          </a:ln>
+        </p:spPr>
+      </p:pic>
+    </p:spTree>
+    <p:extLst>
+      <p:ext uri="{BB962C8B-B14F-4D97-AF65-F5344CB8AC3E}">
+        <p14:creationId xmlns:p14="http://schemas.microsoft.com/office/powerpoint/2010/main" val="2023172318"/>
+      </p:ext>
+    </p:extLst>
+  </p:cSld>
+  <p:clrMapOvr>
+    <a:masterClrMapping/>
+  </p:clrMapOvr>
+</p:sld>
+</file>
+
+<file path=ppt/slides/slide5.xml><?xml version="1.0" encoding="utf-8"?>
+<p:sld xmlns:a="http://schemas.openxmlformats.org/drawingml/2006/main" xmlns:r="http://schemas.openxmlformats.org/officeDocument/2006/relationships" xmlns:p="http://schemas.openxmlformats.org/presentationml/2006/main">
+  <p:cSld>
+    <p:spTree>
+      <p:nvGrpSpPr>
+        <p:cNvPr id="1" name=""/>
+        <p:cNvGrpSpPr/>
+        <p:nvPr/>
+      </p:nvGrpSpPr>
+      <p:grpSpPr>
+        <a:xfrm>
+          <a:off x="0" y="0"/>
+          <a:ext cx="0" cy="0"/>
+          <a:chOff x="0" y="0"/>
+          <a:chExt cx="0" cy="0"/>
+        </a:xfrm>
+      </p:grpSpPr>
+      <p:sp>
+        <p:nvSpPr>
+          <p:cNvPr id="2" name="標題 1">
+            <a:extLst>
+              <a:ext uri="{FF2B5EF4-FFF2-40B4-BE49-F238E27FC236}">
+                <a16:creationId xmlns:a16="http://schemas.microsoft.com/office/drawing/2014/main" id="{E34DAE27-BCE9-D91D-E09F-EA5A5CE63996}"/>
+              </a:ext>
+            </a:extLst>
+          </p:cNvPr>
+          <p:cNvSpPr>
+            <a:spLocks noGrp="1"/>
+          </p:cNvSpPr>
+          <p:nvPr>
+            <p:ph type="title"/>
+          </p:nvPr>
+        </p:nvSpPr>
+        <p:spPr/>
+        <p:txBody>
+          <a:bodyPr/>
+          <a:lstStyle/>
+          <a:p>
+            <a:r>
+              <a:rPr lang="zh-TW" altLang="en-US" dirty="0"/>
+              <a:t>只有</a:t>
+            </a:r>
+            <a:r>
+              <a:rPr lang="en-US" altLang="zh-TW" dirty="0"/>
+              <a:t>Driver</a:t>
+            </a:r>
+            <a:r>
+              <a:rPr lang="zh-TW" altLang="en-US" dirty="0"/>
+              <a:t>的驗證平台 </a:t>
+            </a:r>
+            <a:r>
+              <a:rPr lang="en-US" altLang="zh-TW" dirty="0"/>
+              <a:t>(1/)</a:t>
+            </a:r>
+            <a:endParaRPr lang="zh-TW" altLang="en-US" dirty="0"/>
+          </a:p>
+        </p:txBody>
+      </p:sp>
+      <p:sp>
+        <p:nvSpPr>
+          <p:cNvPr id="3" name="內容版面配置區 2">
+            <a:extLst>
+              <a:ext uri="{FF2B5EF4-FFF2-40B4-BE49-F238E27FC236}">
+                <a16:creationId xmlns:a16="http://schemas.microsoft.com/office/drawing/2014/main" id="{000E3386-F012-BE6A-ECA7-410CAD295AE5}"/>
+              </a:ext>
+            </a:extLst>
+          </p:cNvPr>
+          <p:cNvSpPr>
+            <a:spLocks noGrp="1"/>
+          </p:cNvSpPr>
+          <p:nvPr>
+            <p:ph idx="1"/>
+          </p:nvPr>
+        </p:nvSpPr>
+        <p:spPr/>
+        <p:txBody>
+          <a:bodyPr/>
+          <a:lstStyle/>
+          <a:p>
+            <a:r>
+              <a:rPr lang="zh-TW" altLang="en-US" dirty="0"/>
+              <a:t>包含以下三種機制</a:t>
+            </a:r>
+            <a:endParaRPr lang="en-US" altLang="zh-TW" dirty="0"/>
+          </a:p>
+          <a:p>
+            <a:pPr marL="914400" lvl="1" indent="-457200">
+              <a:buFont typeface="+mj-lt"/>
+              <a:buAutoNum type="arabicPeriod"/>
+            </a:pPr>
+            <a:r>
+              <a:rPr lang="en-US" altLang="zh-TW" dirty="0"/>
+              <a:t>Factory </a:t>
+            </a:r>
+          </a:p>
+          <a:p>
+            <a:pPr lvl="2"/>
+            <a:r>
+              <a:rPr lang="zh-TW" altLang="en-US" dirty="0"/>
+              <a:t>自動創建一個類的實例並調用其中的</a:t>
+            </a:r>
+            <a:r>
+              <a:rPr lang="en-US" altLang="zh-TW" dirty="0"/>
+              <a:t>function</a:t>
+            </a:r>
+            <a:r>
+              <a:rPr lang="zh-TW" altLang="en-US" dirty="0"/>
+              <a:t>、</a:t>
+            </a:r>
+            <a:r>
+              <a:rPr lang="en-US" altLang="zh-TW" dirty="0"/>
+              <a:t>task </a:t>
+            </a:r>
+          </a:p>
+          <a:p>
+            <a:pPr lvl="2"/>
+            <a:endParaRPr lang="en-US" altLang="zh-TW" dirty="0"/>
+          </a:p>
+          <a:p>
+            <a:pPr marL="914400" lvl="1" indent="-457200">
+              <a:buFont typeface="+mj-lt"/>
+              <a:buAutoNum type="arabicPeriod"/>
+            </a:pPr>
+            <a:r>
+              <a:rPr lang="en-US" altLang="zh-TW" dirty="0"/>
+              <a:t>Objection</a:t>
+            </a:r>
+          </a:p>
+          <a:p>
+            <a:pPr lvl="2"/>
+            <a:r>
+              <a:rPr lang="en-US" altLang="zh-TW" dirty="0"/>
+              <a:t>UVM</a:t>
+            </a:r>
+            <a:r>
+              <a:rPr lang="zh-TW" altLang="en-US" dirty="0"/>
+              <a:t>中通過</a:t>
+            </a:r>
+            <a:r>
+              <a:rPr lang="en-US" altLang="zh-TW" dirty="0"/>
+              <a:t>objection</a:t>
+            </a:r>
+            <a:r>
+              <a:rPr lang="zh-TW" altLang="en-US" dirty="0"/>
+              <a:t>機制來控制驗證平台的關閉</a:t>
+            </a:r>
+            <a:endParaRPr lang="en-US" altLang="zh-TW" dirty="0"/>
+          </a:p>
+          <a:p>
+            <a:pPr lvl="2"/>
+            <a:endParaRPr lang="en-US" altLang="zh-TW" dirty="0"/>
+          </a:p>
+          <a:p>
+            <a:pPr marL="914400" lvl="1" indent="-457200">
+              <a:buFont typeface="+mj-lt"/>
+              <a:buAutoNum type="arabicPeriod"/>
+            </a:pPr>
+            <a:r>
+              <a:rPr lang="en-US" altLang="zh-TW" dirty="0"/>
+              <a:t>Virtual interface</a:t>
+            </a:r>
+          </a:p>
+          <a:p>
+            <a:pPr lvl="2"/>
+            <a:r>
+              <a:rPr lang="zh-CN" altLang="en-US" dirty="0"/>
+              <a:t>避免絕對路徑</a:t>
+            </a:r>
+            <a:endParaRPr lang="en-US" altLang="zh-CN" dirty="0"/>
+          </a:p>
+          <a:p>
+            <a:pPr lvl="2"/>
+            <a:r>
+              <a:rPr lang="zh-TW" altLang="en-US" dirty="0"/>
+              <a:t>在</a:t>
+            </a:r>
+            <a:r>
+              <a:rPr lang="en-US" altLang="zh-TW" dirty="0" err="1"/>
+              <a:t>SystemVerilog</a:t>
+            </a:r>
+            <a:r>
+              <a:rPr lang="zh-TW" altLang="en-US" dirty="0"/>
+              <a:t>中使用</a:t>
+            </a:r>
+            <a:r>
+              <a:rPr lang="en-US" altLang="zh-TW" dirty="0"/>
+              <a:t>interface</a:t>
+            </a:r>
+            <a:r>
+              <a:rPr lang="zh-TW" altLang="en-US" dirty="0"/>
+              <a:t>來連接驗證平臺與</a:t>
+            </a:r>
+            <a:r>
+              <a:rPr lang="en-US" altLang="zh-TW" dirty="0"/>
+              <a:t>DUT</a:t>
+            </a:r>
+            <a:r>
+              <a:rPr lang="zh-TW" altLang="en-US" dirty="0"/>
+              <a:t>的接口</a:t>
+            </a:r>
+            <a:endParaRPr lang="en-US" altLang="zh-TW" dirty="0"/>
+          </a:p>
+          <a:p>
+            <a:pPr marL="914400" lvl="1" indent="-457200">
+              <a:buFont typeface="+mj-lt"/>
+              <a:buAutoNum type="arabicPeriod"/>
+            </a:pPr>
+            <a:endParaRPr lang="zh-TW" altLang="en-US" dirty="0"/>
+          </a:p>
+        </p:txBody>
+      </p:sp>
+      <p:sp>
+        <p:nvSpPr>
+          <p:cNvPr id="4" name="文字方塊 3">
+            <a:extLst>
+              <a:ext uri="{FF2B5EF4-FFF2-40B4-BE49-F238E27FC236}">
+                <a16:creationId xmlns:a16="http://schemas.microsoft.com/office/drawing/2014/main" id="{390651C1-1128-B1C0-CDAA-C30794F3E14C}"/>
+              </a:ext>
+            </a:extLst>
+          </p:cNvPr>
+          <p:cNvSpPr txBox="1"/>
+          <p:nvPr/>
+        </p:nvSpPr>
+        <p:spPr>
+          <a:xfrm>
+            <a:off x="9155244" y="2144544"/>
+            <a:ext cx="2858704" cy="830997"/>
+          </a:xfrm>
+          <a:prstGeom prst="rect">
+            <a:avLst/>
+          </a:prstGeom>
+          <a:noFill/>
+          <a:ln>
+            <a:solidFill>
+              <a:schemeClr val="tx1"/>
+            </a:solidFill>
+          </a:ln>
+        </p:spPr>
+        <p:txBody>
+          <a:bodyPr wrap="square" rtlCol="0">
+            <a:spAutoFit/>
+          </a:bodyPr>
+          <a:lstStyle/>
+          <a:p>
+            <a:pPr algn="l"/>
+            <a:r>
+              <a:rPr lang="en-US" altLang="zh-TW" sz="1200" b="0" i="0" u="none" strike="noStrike" baseline="0" dirty="0">
+                <a:latin typeface="CourierNewPSMT"/>
+              </a:rPr>
+              <a:t>Factory Ex:</a:t>
+            </a:r>
+            <a:endParaRPr lang="en-US" altLang="zh-TW" sz="1200" dirty="0">
+              <a:latin typeface="CourierNewPSMT"/>
+            </a:endParaRPr>
+          </a:p>
+          <a:p>
+            <a:pPr algn="l"/>
+            <a:r>
+              <a:rPr lang="en-US" altLang="zh-TW" sz="1200" b="0" i="0" u="none" strike="noStrike" baseline="0" dirty="0">
+                <a:latin typeface="CourierNewPSMT"/>
+              </a:rPr>
+              <a:t>initial begin</a:t>
+            </a:r>
+          </a:p>
+          <a:p>
+            <a:pPr algn="l"/>
+            <a:r>
+              <a:rPr lang="zh-TW" altLang="en-US" sz="1200" b="0" i="0" u="none" strike="noStrike" baseline="0" dirty="0">
+                <a:latin typeface="CourierNewPSMT"/>
+              </a:rPr>
+              <a:t>  </a:t>
+            </a:r>
+            <a:r>
+              <a:rPr lang="en-US" altLang="zh-TW" sz="1200" b="0" i="0" u="none" strike="noStrike" baseline="0" dirty="0" err="1">
+                <a:latin typeface="CourierNewPSMT"/>
+              </a:rPr>
+              <a:t>run_test</a:t>
+            </a:r>
+            <a:r>
+              <a:rPr lang="en-US" altLang="zh-TW" sz="1200" b="0" i="0" u="none" strike="noStrike" baseline="0" dirty="0">
+                <a:latin typeface="CourierNewPSMT"/>
+              </a:rPr>
+              <a:t>("</a:t>
+            </a:r>
+            <a:r>
+              <a:rPr lang="en-US" altLang="zh-TW" sz="1200" b="0" i="0" u="none" strike="noStrike" baseline="0" dirty="0" err="1">
+                <a:latin typeface="CourierNewPSMT"/>
+              </a:rPr>
+              <a:t>my_driver</a:t>
+            </a:r>
+            <a:r>
+              <a:rPr lang="en-US" altLang="zh-TW" sz="1200" b="0" i="0" u="none" strike="noStrike" baseline="0" dirty="0">
+                <a:latin typeface="CourierNewPSMT"/>
+              </a:rPr>
+              <a:t>");</a:t>
+            </a:r>
+          </a:p>
+          <a:p>
+            <a:pPr algn="l"/>
+            <a:r>
+              <a:rPr lang="en-US" altLang="zh-TW" sz="1200" b="0" i="0" u="none" strike="noStrike" baseline="0" dirty="0">
+                <a:latin typeface="CourierNewPSMT"/>
+              </a:rPr>
+              <a:t>end</a:t>
+            </a:r>
+            <a:endParaRPr lang="zh-TW" altLang="en-US" sz="1200" dirty="0"/>
+          </a:p>
+        </p:txBody>
+      </p:sp>
+      <p:sp>
+        <p:nvSpPr>
+          <p:cNvPr id="5" name="文字方塊 4">
+            <a:extLst>
+              <a:ext uri="{FF2B5EF4-FFF2-40B4-BE49-F238E27FC236}">
+                <a16:creationId xmlns:a16="http://schemas.microsoft.com/office/drawing/2014/main" id="{1155B9A9-3CE9-BEE3-2EA6-3BBD5BA62562}"/>
+              </a:ext>
+            </a:extLst>
+          </p:cNvPr>
+          <p:cNvSpPr txBox="1"/>
+          <p:nvPr/>
+        </p:nvSpPr>
+        <p:spPr>
+          <a:xfrm>
+            <a:off x="7660948" y="3375922"/>
+            <a:ext cx="4353000" cy="1200329"/>
+          </a:xfrm>
+          <a:prstGeom prst="rect">
+            <a:avLst/>
+          </a:prstGeom>
+          <a:noFill/>
+          <a:ln>
+            <a:solidFill>
+              <a:schemeClr val="tx1"/>
+            </a:solidFill>
+          </a:ln>
+        </p:spPr>
+        <p:txBody>
+          <a:bodyPr wrap="square" rtlCol="0">
+            <a:spAutoFit/>
+          </a:bodyPr>
+          <a:lstStyle/>
+          <a:p>
+            <a:r>
+              <a:rPr lang="en-US" altLang="zh-TW" sz="1200" b="0" i="0" u="none" strike="noStrike" baseline="0" dirty="0">
+                <a:latin typeface="CourierNewPSMT"/>
+              </a:rPr>
+              <a:t>Objection Ex:</a:t>
+            </a:r>
+          </a:p>
+          <a:p>
+            <a:pPr algn="l"/>
+            <a:r>
+              <a:rPr lang="en-US" altLang="zh-TW" sz="1200" b="0" i="0" u="none" strike="noStrike" baseline="0" dirty="0">
+                <a:latin typeface="CourierNewPSMT"/>
+              </a:rPr>
+              <a:t>task </a:t>
+            </a:r>
+            <a:r>
+              <a:rPr lang="en-US" altLang="zh-TW" sz="1200" b="0" i="0" u="none" strike="noStrike" baseline="0" dirty="0" err="1">
+                <a:latin typeface="CourierNewPSMT"/>
+              </a:rPr>
+              <a:t>my_driver</a:t>
+            </a:r>
+            <a:r>
+              <a:rPr lang="en-US" altLang="zh-TW" sz="1200" b="0" i="0" u="none" strike="noStrike" baseline="0" dirty="0">
+                <a:latin typeface="CourierNewPSMT"/>
+              </a:rPr>
+              <a:t>::</a:t>
+            </a:r>
+            <a:r>
+              <a:rPr lang="en-US" altLang="zh-TW" sz="1200" b="0" i="0" u="none" strike="noStrike" baseline="0" dirty="0" err="1">
+                <a:latin typeface="CourierNewPSMT"/>
+              </a:rPr>
+              <a:t>main_phase</a:t>
+            </a:r>
+            <a:r>
+              <a:rPr lang="en-US" altLang="zh-TW" sz="1200" b="0" i="0" u="none" strike="noStrike" baseline="0" dirty="0">
+                <a:latin typeface="CourierNewPSMT"/>
+              </a:rPr>
+              <a:t>(</a:t>
+            </a:r>
+            <a:r>
+              <a:rPr lang="en-US" altLang="zh-TW" sz="1200" b="0" i="0" u="none" strike="noStrike" baseline="0" dirty="0" err="1">
+                <a:latin typeface="CourierNewPSMT"/>
+              </a:rPr>
+              <a:t>uvm_phase</a:t>
+            </a:r>
+            <a:r>
+              <a:rPr lang="en-US" altLang="zh-TW" sz="1200" b="0" i="0" u="none" strike="noStrike" baseline="0" dirty="0">
+                <a:latin typeface="CourierNewPSMT"/>
+              </a:rPr>
+              <a:t> phase);</a:t>
+            </a:r>
+          </a:p>
+          <a:p>
+            <a:pPr algn="l"/>
+            <a:r>
+              <a:rPr lang="en-US" altLang="zh-TW" sz="1200" dirty="0">
+                <a:latin typeface="CourierNewPSMT"/>
+              </a:rPr>
+              <a:t>   </a:t>
+            </a:r>
+            <a:r>
+              <a:rPr lang="en-US" altLang="zh-TW" sz="1200" b="0" i="0" u="none" strike="noStrike" baseline="0" dirty="0" err="1">
+                <a:latin typeface="CourierNewPSMT"/>
+              </a:rPr>
+              <a:t>phase.raise_objection</a:t>
+            </a:r>
+            <a:r>
+              <a:rPr lang="en-US" altLang="zh-TW" sz="1200" b="0" i="0" u="none" strike="noStrike" baseline="0" dirty="0">
+                <a:latin typeface="CourierNewPSMT"/>
+              </a:rPr>
+              <a:t>(this);</a:t>
+            </a:r>
+          </a:p>
+          <a:p>
+            <a:pPr algn="l"/>
+            <a:r>
+              <a:rPr lang="en-US" altLang="zh-TW" sz="1200" dirty="0">
+                <a:latin typeface="CourierNewPSMT"/>
+              </a:rPr>
+              <a:t>   …</a:t>
+            </a:r>
+          </a:p>
+          <a:p>
+            <a:pPr algn="l"/>
+            <a:r>
+              <a:rPr lang="en-US" altLang="zh-TW" sz="1200" dirty="0">
+                <a:latin typeface="CourierNewPSMT"/>
+              </a:rPr>
+              <a:t>   </a:t>
+            </a:r>
+            <a:r>
+              <a:rPr lang="en-US" altLang="zh-TW" sz="1200" dirty="0" err="1">
+                <a:latin typeface="CourierNewPSMT"/>
+              </a:rPr>
+              <a:t>phase.drop_objection</a:t>
+            </a:r>
+            <a:r>
+              <a:rPr lang="en-US" altLang="zh-TW" sz="1200" dirty="0">
+                <a:latin typeface="CourierNewPSMT"/>
+              </a:rPr>
+              <a:t>(this);</a:t>
+            </a:r>
+          </a:p>
+          <a:p>
+            <a:pPr algn="l"/>
+            <a:r>
+              <a:rPr lang="en-US" altLang="zh-TW" sz="1200" dirty="0" err="1">
+                <a:latin typeface="CourierNewPSMT"/>
+              </a:rPr>
+              <a:t>endtask</a:t>
+            </a:r>
+            <a:endParaRPr lang="zh-TW" altLang="en-US" sz="1200" dirty="0"/>
+          </a:p>
+        </p:txBody>
+      </p:sp>
+      <p:sp>
+        <p:nvSpPr>
+          <p:cNvPr id="6" name="文字方塊 5">
+            <a:extLst>
+              <a:ext uri="{FF2B5EF4-FFF2-40B4-BE49-F238E27FC236}">
+                <a16:creationId xmlns:a16="http://schemas.microsoft.com/office/drawing/2014/main" id="{7846DE7C-8D04-69E0-EB5A-F9D0A211B2D5}"/>
+              </a:ext>
+            </a:extLst>
+          </p:cNvPr>
+          <p:cNvSpPr txBox="1"/>
+          <p:nvPr/>
+        </p:nvSpPr>
+        <p:spPr>
+          <a:xfrm>
+            <a:off x="8296166" y="5669131"/>
+            <a:ext cx="3717782" cy="1015663"/>
+          </a:xfrm>
+          <a:prstGeom prst="rect">
+            <a:avLst/>
+          </a:prstGeom>
+          <a:noFill/>
+          <a:ln>
+            <a:solidFill>
+              <a:schemeClr val="tx1"/>
+            </a:solidFill>
+          </a:ln>
+        </p:spPr>
+        <p:txBody>
+          <a:bodyPr wrap="square" rtlCol="0">
+            <a:spAutoFit/>
+          </a:bodyPr>
+          <a:lstStyle/>
+          <a:p>
+            <a:r>
+              <a:rPr lang="en-US" altLang="zh-TW" sz="1200" b="0" i="0" u="none" strike="noStrike" baseline="0" dirty="0">
+                <a:latin typeface="CourierNewPSMT"/>
+              </a:rPr>
+              <a:t>Virtual interface Ex:</a:t>
+            </a:r>
+          </a:p>
+          <a:p>
+            <a:r>
+              <a:rPr lang="en-US" altLang="zh-TW" sz="1200" b="0" i="0" u="none" strike="noStrike" baseline="0" dirty="0">
+                <a:latin typeface="CourierNewPSMT"/>
+              </a:rPr>
+              <a:t>class </a:t>
+            </a:r>
+            <a:r>
+              <a:rPr lang="en-US" altLang="zh-TW" sz="1200" b="0" i="0" u="none" strike="noStrike" baseline="0" dirty="0" err="1">
+                <a:latin typeface="CourierNewPSMT"/>
+              </a:rPr>
+              <a:t>my_driver</a:t>
+            </a:r>
+            <a:r>
+              <a:rPr lang="en-US" altLang="zh-TW" sz="1200" b="0" i="0" u="none" strike="noStrike" baseline="0" dirty="0">
+                <a:latin typeface="CourierNewPSMT"/>
+              </a:rPr>
+              <a:t> extends </a:t>
+            </a:r>
+            <a:r>
+              <a:rPr lang="en-US" altLang="zh-TW" sz="1200" b="0" i="0" u="none" strike="noStrike" baseline="0" dirty="0" err="1">
+                <a:latin typeface="CourierNewPSMT"/>
+              </a:rPr>
+              <a:t>uvm_driver</a:t>
+            </a:r>
+            <a:r>
+              <a:rPr lang="en-US" altLang="zh-TW" sz="1200" b="0" i="0" u="none" strike="noStrike" baseline="0" dirty="0">
+                <a:latin typeface="CourierNewPSMT"/>
+              </a:rPr>
+              <a:t>;</a:t>
+            </a:r>
+          </a:p>
+          <a:p>
+            <a:r>
+              <a:rPr lang="zh-TW" altLang="en-US" sz="1200" b="0" i="0" u="none" strike="noStrike" baseline="0" dirty="0">
+                <a:latin typeface="CourierNewPSMT"/>
+              </a:rPr>
+              <a:t>   </a:t>
+            </a:r>
+            <a:r>
+              <a:rPr lang="en-US" altLang="zh-TW" sz="1200" b="0" i="0" u="none" strike="noStrike" baseline="0" dirty="0">
+                <a:latin typeface="CourierNewPSMT"/>
+              </a:rPr>
+              <a:t>virtual </a:t>
+            </a:r>
+            <a:r>
+              <a:rPr lang="en-US" altLang="zh-TW" sz="1200" b="0" i="0" u="none" strike="noStrike" baseline="0" dirty="0" err="1">
+                <a:latin typeface="CourierNewPSMT"/>
+              </a:rPr>
+              <a:t>my_if</a:t>
+            </a:r>
+            <a:r>
+              <a:rPr lang="en-US" altLang="zh-TW" sz="1200" b="0" i="0" u="none" strike="noStrike" baseline="0" dirty="0">
+                <a:latin typeface="CourierNewPSMT"/>
+              </a:rPr>
+              <a:t> </a:t>
+            </a:r>
+            <a:r>
+              <a:rPr lang="en-US" altLang="zh-TW" sz="1200" b="0" i="0" u="none" strike="noStrike" baseline="0" dirty="0" err="1">
+                <a:latin typeface="CourierNewPSMT"/>
+              </a:rPr>
+              <a:t>vif</a:t>
+            </a:r>
+            <a:r>
+              <a:rPr lang="en-US" altLang="zh-TW" sz="1200" b="0" i="0" u="none" strike="noStrike" baseline="0" dirty="0">
+                <a:latin typeface="CourierNewPSMT"/>
+              </a:rPr>
+              <a:t>;</a:t>
+            </a:r>
+          </a:p>
+          <a:p>
+            <a:r>
+              <a:rPr lang="en-US" altLang="zh-TW" sz="1200" dirty="0">
+                <a:latin typeface="CourierNewPSMT"/>
+              </a:rPr>
+              <a:t>   …</a:t>
+            </a:r>
+            <a:endParaRPr lang="en-US" altLang="zh-TW" sz="1200" b="0" i="0" u="none" strike="noStrike" baseline="0" dirty="0">
+              <a:latin typeface="CourierNewPSMT"/>
+            </a:endParaRPr>
+          </a:p>
+          <a:p>
+            <a:r>
+              <a:rPr lang="en-US" altLang="zh-TW" sz="1200" dirty="0" err="1">
+                <a:latin typeface="CourierNewPSMT"/>
+              </a:rPr>
+              <a:t>endclass</a:t>
+            </a:r>
+            <a:endParaRPr lang="en-US" altLang="zh-TW" sz="1200" b="0" i="0" u="none" strike="noStrike" baseline="0" dirty="0">
+              <a:latin typeface="CourierNewPSMT"/>
+            </a:endParaRPr>
+          </a:p>
+        </p:txBody>
+      </p:sp>
+    </p:spTree>
+    <p:extLst>
+      <p:ext uri="{BB962C8B-B14F-4D97-AF65-F5344CB8AC3E}">
+        <p14:creationId xmlns:p14="http://schemas.microsoft.com/office/powerpoint/2010/main" val="3619581319"/>
       </p:ext>
     </p:extLst>
   </p:cSld>

</xml_diff>

<commit_message>
Add: virtual interface example code
</commit_message>
<xml_diff>
--- a/UVM/UVM.pptx
+++ b/UVM/UVM.pptx
@@ -10,6 +10,9 @@
     <p:sldId id="259" r:id="rId4"/>
     <p:sldId id="260" r:id="rId5"/>
     <p:sldId id="261" r:id="rId6"/>
+    <p:sldId id="262" r:id="rId7"/>
+    <p:sldId id="263" r:id="rId8"/>
+    <p:sldId id="264" r:id="rId9"/>
   </p:sldIdLst>
   <p:sldSz cx="12192000" cy="6858000"/>
   <p:notesSz cx="6858000" cy="9144000"/>
@@ -263,7 +266,7 @@
           <a:p>
             <a:fld id="{0F32A204-0AD4-466F-ABEA-B4DB33A37E21}" type="datetimeFigureOut">
               <a:rPr lang="zh-TW" altLang="en-US" smtClean="0"/>
-              <a:t>2025/4/28</a:t>
+              <a:t>2025/4/30</a:t>
             </a:fld>
             <a:endParaRPr lang="zh-TW" altLang="en-US"/>
           </a:p>
@@ -461,7 +464,7 @@
           <a:p>
             <a:fld id="{0F32A204-0AD4-466F-ABEA-B4DB33A37E21}" type="datetimeFigureOut">
               <a:rPr lang="zh-TW" altLang="en-US" smtClean="0"/>
-              <a:t>2025/4/28</a:t>
+              <a:t>2025/4/30</a:t>
             </a:fld>
             <a:endParaRPr lang="zh-TW" altLang="en-US"/>
           </a:p>
@@ -669,7 +672,7 @@
           <a:p>
             <a:fld id="{0F32A204-0AD4-466F-ABEA-B4DB33A37E21}" type="datetimeFigureOut">
               <a:rPr lang="zh-TW" altLang="en-US" smtClean="0"/>
-              <a:t>2025/4/28</a:t>
+              <a:t>2025/4/30</a:t>
             </a:fld>
             <a:endParaRPr lang="zh-TW" altLang="en-US"/>
           </a:p>
@@ -867,7 +870,7 @@
           <a:p>
             <a:fld id="{0F32A204-0AD4-466F-ABEA-B4DB33A37E21}" type="datetimeFigureOut">
               <a:rPr lang="zh-TW" altLang="en-US" smtClean="0"/>
-              <a:t>2025/4/28</a:t>
+              <a:t>2025/4/30</a:t>
             </a:fld>
             <a:endParaRPr lang="zh-TW" altLang="en-US"/>
           </a:p>
@@ -1142,7 +1145,7 @@
           <a:p>
             <a:fld id="{0F32A204-0AD4-466F-ABEA-B4DB33A37E21}" type="datetimeFigureOut">
               <a:rPr lang="zh-TW" altLang="en-US" smtClean="0"/>
-              <a:t>2025/4/28</a:t>
+              <a:t>2025/4/30</a:t>
             </a:fld>
             <a:endParaRPr lang="zh-TW" altLang="en-US"/>
           </a:p>
@@ -1407,7 +1410,7 @@
           <a:p>
             <a:fld id="{0F32A204-0AD4-466F-ABEA-B4DB33A37E21}" type="datetimeFigureOut">
               <a:rPr lang="zh-TW" altLang="en-US" smtClean="0"/>
-              <a:t>2025/4/28</a:t>
+              <a:t>2025/4/30</a:t>
             </a:fld>
             <a:endParaRPr lang="zh-TW" altLang="en-US"/>
           </a:p>
@@ -1819,7 +1822,7 @@
           <a:p>
             <a:fld id="{0F32A204-0AD4-466F-ABEA-B4DB33A37E21}" type="datetimeFigureOut">
               <a:rPr lang="zh-TW" altLang="en-US" smtClean="0"/>
-              <a:t>2025/4/28</a:t>
+              <a:t>2025/4/30</a:t>
             </a:fld>
             <a:endParaRPr lang="zh-TW" altLang="en-US"/>
           </a:p>
@@ -1960,7 +1963,7 @@
           <a:p>
             <a:fld id="{0F32A204-0AD4-466F-ABEA-B4DB33A37E21}" type="datetimeFigureOut">
               <a:rPr lang="zh-TW" altLang="en-US" smtClean="0"/>
-              <a:t>2025/4/28</a:t>
+              <a:t>2025/4/30</a:t>
             </a:fld>
             <a:endParaRPr lang="zh-TW" altLang="en-US"/>
           </a:p>
@@ -2073,7 +2076,7 @@
           <a:p>
             <a:fld id="{0F32A204-0AD4-466F-ABEA-B4DB33A37E21}" type="datetimeFigureOut">
               <a:rPr lang="zh-TW" altLang="en-US" smtClean="0"/>
-              <a:t>2025/4/28</a:t>
+              <a:t>2025/4/30</a:t>
             </a:fld>
             <a:endParaRPr lang="zh-TW" altLang="en-US"/>
           </a:p>
@@ -2384,7 +2387,7 @@
           <a:p>
             <a:fld id="{0F32A204-0AD4-466F-ABEA-B4DB33A37E21}" type="datetimeFigureOut">
               <a:rPr lang="zh-TW" altLang="en-US" smtClean="0"/>
-              <a:t>2025/4/28</a:t>
+              <a:t>2025/4/30</a:t>
             </a:fld>
             <a:endParaRPr lang="zh-TW" altLang="en-US"/>
           </a:p>
@@ -2672,7 +2675,7 @@
           <a:p>
             <a:fld id="{0F32A204-0AD4-466F-ABEA-B4DB33A37E21}" type="datetimeFigureOut">
               <a:rPr lang="zh-TW" altLang="en-US" smtClean="0"/>
-              <a:t>2025/4/28</a:t>
+              <a:t>2025/4/30</a:t>
             </a:fld>
             <a:endParaRPr lang="zh-TW" altLang="en-US"/>
           </a:p>
@@ -2913,7 +2916,7 @@
           <a:p>
             <a:fld id="{0F32A204-0AD4-466F-ABEA-B4DB33A37E21}" type="datetimeFigureOut">
               <a:rPr lang="zh-TW" altLang="en-US" smtClean="0"/>
-              <a:t>2025/4/28</a:t>
+              <a:t>2025/4/30</a:t>
             </a:fld>
             <a:endParaRPr lang="zh-TW" altLang="en-US"/>
           </a:p>
@@ -3469,11 +3472,26 @@
             </a:pPr>
             <a:r>
               <a:rPr lang="en-US" altLang="zh-TW" dirty="0"/>
-              <a:t>UVM</a:t>
+              <a:t>Driver Only </a:t>
             </a:r>
             <a:r>
               <a:rPr lang="zh-TW" altLang="en-US" dirty="0"/>
-              <a:t>平台</a:t>
+              <a:t>驗證平台</a:t>
+            </a:r>
+            <a:endParaRPr lang="en-US" altLang="zh-TW" dirty="0"/>
+          </a:p>
+          <a:p>
+            <a:pPr marL="514350" indent="-514350">
+              <a:buFont typeface="+mj-lt"/>
+              <a:buAutoNum type="arabicPeriod"/>
+            </a:pPr>
+            <a:r>
+              <a:rPr lang="en-US" altLang="zh-TW" dirty="0"/>
+              <a:t>Basic UVM</a:t>
+            </a:r>
+            <a:r>
+              <a:rPr lang="zh-TW" altLang="en-US" dirty="0"/>
+              <a:t> 驗證平台</a:t>
             </a:r>
           </a:p>
         </p:txBody>
@@ -3560,15 +3578,12 @@
           <a:p>
             <a:r>
               <a:rPr lang="en-US" altLang="zh-TW" dirty="0"/>
-              <a:t>UVM</a:t>
+              <a:t>Driver Only </a:t>
             </a:r>
             <a:r>
               <a:rPr lang="zh-TW" altLang="en-US" dirty="0"/>
-              <a:t>平台</a:t>
-            </a:r>
-          </a:p>
-          <a:p>
-            <a:endParaRPr lang="zh-TW" altLang="en-US" dirty="0"/>
+              <a:t>驗證平台</a:t>
+            </a:r>
           </a:p>
         </p:txBody>
       </p:sp>
@@ -3852,7 +3867,7 @@
             </a:r>
             <a:r>
               <a:rPr lang="en-US" altLang="zh-TW" dirty="0"/>
-              <a:t>(1/)</a:t>
+              <a:t>(1/2)</a:t>
             </a:r>
             <a:endParaRPr lang="zh-TW" altLang="en-US" dirty="0"/>
           </a:p>
@@ -4395,6 +4410,967 @@
     <p:extLst>
       <p:ext uri="{BB962C8B-B14F-4D97-AF65-F5344CB8AC3E}">
         <p14:creationId xmlns:p14="http://schemas.microsoft.com/office/powerpoint/2010/main" val="3619581319"/>
+      </p:ext>
+    </p:extLst>
+  </p:cSld>
+  <p:clrMapOvr>
+    <a:masterClrMapping/>
+  </p:clrMapOvr>
+</p:sld>
+</file>
+
+<file path=ppt/slides/slide6.xml><?xml version="1.0" encoding="utf-8"?>
+<p:sld xmlns:a="http://schemas.openxmlformats.org/drawingml/2006/main" xmlns:r="http://schemas.openxmlformats.org/officeDocument/2006/relationships" xmlns:p="http://schemas.openxmlformats.org/presentationml/2006/main">
+  <p:cSld>
+    <p:spTree>
+      <p:nvGrpSpPr>
+        <p:cNvPr id="1" name="">
+          <a:extLst>
+            <a:ext uri="{FF2B5EF4-FFF2-40B4-BE49-F238E27FC236}">
+              <a16:creationId xmlns:a16="http://schemas.microsoft.com/office/drawing/2014/main" id="{D6013421-CFB1-6D24-CE3B-09FFC1DE28ED}"/>
+            </a:ext>
+          </a:extLst>
+        </p:cNvPr>
+        <p:cNvGrpSpPr/>
+        <p:nvPr/>
+      </p:nvGrpSpPr>
+      <p:grpSpPr>
+        <a:xfrm>
+          <a:off x="0" y="0"/>
+          <a:ext cx="0" cy="0"/>
+          <a:chOff x="0" y="0"/>
+          <a:chExt cx="0" cy="0"/>
+        </a:xfrm>
+      </p:grpSpPr>
+      <p:sp>
+        <p:nvSpPr>
+          <p:cNvPr id="2" name="標題 1">
+            <a:extLst>
+              <a:ext uri="{FF2B5EF4-FFF2-40B4-BE49-F238E27FC236}">
+                <a16:creationId xmlns:a16="http://schemas.microsoft.com/office/drawing/2014/main" id="{E5F3974D-67A1-DAE5-BC0B-0C81FE8D8A30}"/>
+              </a:ext>
+            </a:extLst>
+          </p:cNvPr>
+          <p:cNvSpPr>
+            <a:spLocks noGrp="1"/>
+          </p:cNvSpPr>
+          <p:nvPr>
+            <p:ph type="title"/>
+          </p:nvPr>
+        </p:nvSpPr>
+        <p:spPr/>
+        <p:txBody>
+          <a:bodyPr/>
+          <a:lstStyle/>
+          <a:p>
+            <a:r>
+              <a:rPr lang="zh-TW" altLang="en-US" dirty="0"/>
+              <a:t>只有</a:t>
+            </a:r>
+            <a:r>
+              <a:rPr lang="en-US" altLang="zh-TW" dirty="0"/>
+              <a:t>Driver</a:t>
+            </a:r>
+            <a:r>
+              <a:rPr lang="zh-TW" altLang="en-US" dirty="0"/>
+              <a:t>的驗證平台 </a:t>
+            </a:r>
+            <a:r>
+              <a:rPr lang="en-US" altLang="zh-TW" dirty="0"/>
+              <a:t>(2/2)</a:t>
+            </a:r>
+            <a:endParaRPr lang="zh-TW" altLang="en-US" dirty="0"/>
+          </a:p>
+        </p:txBody>
+      </p:sp>
+      <p:sp>
+        <p:nvSpPr>
+          <p:cNvPr id="3" name="內容版面配置區 2">
+            <a:extLst>
+              <a:ext uri="{FF2B5EF4-FFF2-40B4-BE49-F238E27FC236}">
+                <a16:creationId xmlns:a16="http://schemas.microsoft.com/office/drawing/2014/main" id="{F05D9BB1-8FE6-189E-7D06-92985B76AB05}"/>
+              </a:ext>
+            </a:extLst>
+          </p:cNvPr>
+          <p:cNvSpPr>
+            <a:spLocks noGrp="1"/>
+          </p:cNvSpPr>
+          <p:nvPr>
+            <p:ph idx="1"/>
+          </p:nvPr>
+        </p:nvSpPr>
+        <p:spPr/>
+        <p:txBody>
+          <a:bodyPr/>
+          <a:lstStyle/>
+          <a:p>
+            <a:pPr marL="0" indent="0">
+              <a:buNone/>
+            </a:pPr>
+            <a:r>
+              <a:rPr lang="en-US" altLang="zh-TW" dirty="0"/>
+              <a:t>Virtual interface</a:t>
+            </a:r>
+          </a:p>
+          <a:p>
+            <a:pPr lvl="1"/>
+            <a:r>
+              <a:rPr lang="zh-TW" altLang="en-US" dirty="0"/>
+              <a:t>使用以下</a:t>
+            </a:r>
+            <a:r>
+              <a:rPr lang="en-US" altLang="zh-TW" dirty="0"/>
+              <a:t>get,</a:t>
+            </a:r>
+            <a:r>
+              <a:rPr lang="zh-TW" altLang="en-US" dirty="0"/>
+              <a:t> </a:t>
+            </a:r>
+            <a:r>
+              <a:rPr lang="en-US" altLang="zh-TW" dirty="0"/>
+              <a:t>set</a:t>
+            </a:r>
+            <a:r>
+              <a:rPr lang="zh-TW" altLang="en-US" dirty="0"/>
+              <a:t> </a:t>
+            </a:r>
+            <a:r>
+              <a:rPr lang="en-US" altLang="zh-TW" dirty="0"/>
+              <a:t>function</a:t>
+            </a:r>
+            <a:r>
+              <a:rPr lang="zh-TW" altLang="en-US" dirty="0"/>
+              <a:t>來讓</a:t>
+            </a:r>
+            <a:r>
+              <a:rPr lang="en-US" altLang="zh-TW" dirty="0"/>
+              <a:t>driver</a:t>
+            </a:r>
+            <a:r>
+              <a:rPr lang="zh-TW" altLang="en-US" dirty="0"/>
+              <a:t>與</a:t>
+            </a:r>
+            <a:r>
+              <a:rPr lang="en-US" altLang="zh-TW" dirty="0" err="1"/>
+              <a:t>top_tp</a:t>
+            </a:r>
+            <a:r>
+              <a:rPr lang="zh-TW" altLang="en-US" dirty="0"/>
+              <a:t>的 </a:t>
+            </a:r>
+            <a:r>
+              <a:rPr lang="en-US" altLang="zh-TW" dirty="0"/>
+              <a:t>virtual interface </a:t>
+            </a:r>
+            <a:r>
+              <a:rPr lang="zh-TW" altLang="en-US" dirty="0"/>
+              <a:t>對接</a:t>
+            </a:r>
+            <a:endParaRPr lang="en-US" altLang="zh-TW" dirty="0"/>
+          </a:p>
+          <a:p>
+            <a:pPr marL="1371600" lvl="2" indent="-457200">
+              <a:buFont typeface="+mj-lt"/>
+              <a:buAutoNum type="arabicPeriod"/>
+            </a:pPr>
+            <a:r>
+              <a:rPr lang="en-US" altLang="zh-TW" dirty="0" err="1"/>
+              <a:t>uvm_config_db</a:t>
+            </a:r>
+            <a:r>
+              <a:rPr lang="en-US" altLang="zh-TW" dirty="0"/>
+              <a:t>#(virtual </a:t>
+            </a:r>
+            <a:r>
+              <a:rPr lang="en-US" altLang="zh-TW" dirty="0" err="1"/>
+              <a:t>my_if</a:t>
+            </a:r>
+            <a:r>
+              <a:rPr lang="en-US" altLang="zh-TW" dirty="0"/>
+              <a:t>)::get(this, "", "</a:t>
+            </a:r>
+            <a:r>
+              <a:rPr lang="en-US" altLang="zh-TW" dirty="0" err="1"/>
+              <a:t>vif</a:t>
+            </a:r>
+            <a:r>
+              <a:rPr lang="en-US" altLang="zh-TW" dirty="0"/>
+              <a:t>", </a:t>
+            </a:r>
+            <a:r>
+              <a:rPr lang="en-US" altLang="zh-TW" dirty="0" err="1"/>
+              <a:t>vif</a:t>
+            </a:r>
+            <a:r>
+              <a:rPr lang="en-US" altLang="zh-TW" dirty="0"/>
+              <a:t>)</a:t>
+            </a:r>
+          </a:p>
+          <a:p>
+            <a:pPr marL="1371600" lvl="2" indent="-457200">
+              <a:buFont typeface="+mj-lt"/>
+              <a:buAutoNum type="arabicPeriod"/>
+            </a:pPr>
+            <a:r>
+              <a:rPr lang="en-US" altLang="zh-TW" dirty="0" err="1"/>
+              <a:t>uvm_config_db</a:t>
+            </a:r>
+            <a:r>
+              <a:rPr lang="en-US" altLang="zh-TW" dirty="0"/>
+              <a:t>#(virtual </a:t>
+            </a:r>
+            <a:r>
+              <a:rPr lang="en-US" altLang="zh-TW" dirty="0" err="1"/>
+              <a:t>my_if</a:t>
+            </a:r>
+            <a:r>
+              <a:rPr lang="en-US" altLang="zh-TW" dirty="0"/>
+              <a:t>)::set(null, "</a:t>
+            </a:r>
+            <a:r>
+              <a:rPr lang="en-US" altLang="zh-TW" dirty="0" err="1"/>
+              <a:t>uvm_test_top</a:t>
+            </a:r>
+            <a:r>
+              <a:rPr lang="en-US" altLang="zh-TW" dirty="0"/>
+              <a:t>", "</a:t>
+            </a:r>
+            <a:r>
+              <a:rPr lang="en-US" altLang="zh-TW" dirty="0" err="1"/>
+              <a:t>vif</a:t>
+            </a:r>
+            <a:r>
+              <a:rPr lang="en-US" altLang="zh-TW" dirty="0"/>
+              <a:t>", </a:t>
+            </a:r>
+            <a:r>
+              <a:rPr lang="en-US" altLang="zh-TW" dirty="0" err="1"/>
+              <a:t>input_if</a:t>
+            </a:r>
+            <a:r>
+              <a:rPr lang="en-US" altLang="zh-TW" dirty="0"/>
+              <a:t>);</a:t>
+            </a:r>
+            <a:endParaRPr lang="zh-TW" altLang="en-US" dirty="0"/>
+          </a:p>
+        </p:txBody>
+      </p:sp>
+      <p:sp>
+        <p:nvSpPr>
+          <p:cNvPr id="7" name="文字方塊 6">
+            <a:extLst>
+              <a:ext uri="{FF2B5EF4-FFF2-40B4-BE49-F238E27FC236}">
+                <a16:creationId xmlns:a16="http://schemas.microsoft.com/office/drawing/2014/main" id="{DD889056-465B-D3B5-0CB6-5C312F9419B4}"/>
+              </a:ext>
+            </a:extLst>
+          </p:cNvPr>
+          <p:cNvSpPr txBox="1"/>
+          <p:nvPr/>
+        </p:nvSpPr>
+        <p:spPr>
+          <a:xfrm>
+            <a:off x="1460739" y="3504940"/>
+            <a:ext cx="9270521" cy="3139321"/>
+          </a:xfrm>
+          <a:prstGeom prst="rect">
+            <a:avLst/>
+          </a:prstGeom>
+          <a:noFill/>
+          <a:ln>
+            <a:solidFill>
+              <a:schemeClr val="tx1"/>
+            </a:solidFill>
+          </a:ln>
+        </p:spPr>
+        <p:txBody>
+          <a:bodyPr wrap="square" rtlCol="0">
+            <a:spAutoFit/>
+          </a:bodyPr>
+          <a:lstStyle/>
+          <a:p>
+            <a:pPr marL="342900" indent="-342900" algn="l">
+              <a:buFont typeface="+mj-lt"/>
+              <a:buAutoNum type="arabicPeriod"/>
+            </a:pPr>
+            <a:r>
+              <a:rPr lang="en-US" altLang="zh-CN" sz="1800" b="0" i="0" u="none" strike="noStrike" baseline="0" dirty="0" err="1">
+                <a:latin typeface="TimesNewRomanPSMT"/>
+              </a:rPr>
+              <a:t>config_db</a:t>
+            </a:r>
+            <a:r>
+              <a:rPr lang="zh-CN" altLang="en-US" sz="1800" b="0" i="0" u="none" strike="noStrike" baseline="0" dirty="0">
+                <a:latin typeface="新細明體" panose="02020500000000000000" pitchFamily="18" charset="-120"/>
+                <a:ea typeface="新細明體" panose="02020500000000000000" pitchFamily="18" charset="-120"/>
+              </a:rPr>
+              <a:t>的</a:t>
+            </a:r>
+            <a:r>
+              <a:rPr lang="en-US" altLang="zh-CN" sz="1800" b="0" i="0" u="none" strike="noStrike" baseline="0" dirty="0">
+                <a:latin typeface="TimesNewRomanPSMT"/>
+                <a:ea typeface="新細明體" panose="02020500000000000000" pitchFamily="18" charset="-120"/>
+              </a:rPr>
+              <a:t>set</a:t>
+            </a:r>
+            <a:r>
+              <a:rPr lang="zh-CN" altLang="en-US" sz="1800" b="0" i="0" u="none" strike="noStrike" baseline="0" dirty="0">
+                <a:latin typeface="新細明體" panose="02020500000000000000" pitchFamily="18" charset="-120"/>
+                <a:ea typeface="新細明體" panose="02020500000000000000" pitchFamily="18" charset="-120"/>
+              </a:rPr>
+              <a:t>和</a:t>
+            </a:r>
+            <a:r>
+              <a:rPr lang="en-US" altLang="zh-CN" sz="1800" b="0" i="0" u="none" strike="noStrike" baseline="0" dirty="0">
+                <a:latin typeface="TimesNewRomanPSMT"/>
+                <a:ea typeface="新細明體" panose="02020500000000000000" pitchFamily="18" charset="-120"/>
+              </a:rPr>
+              <a:t>get</a:t>
+            </a:r>
+            <a:r>
+              <a:rPr lang="zh-CN" altLang="en-US" sz="1800" b="0" i="0" u="none" strike="noStrike" baseline="0" dirty="0">
+                <a:latin typeface="新細明體" panose="02020500000000000000" pitchFamily="18" charset="-120"/>
+                <a:ea typeface="新細明體" panose="02020500000000000000" pitchFamily="18" charset="-120"/>
+              </a:rPr>
+              <a:t>函數都有四個參數，這兩個函數的第三個參數必須完全一致</a:t>
+            </a:r>
+            <a:endParaRPr lang="en-US" altLang="zh-CN" sz="1800" b="0" i="0" u="none" strike="noStrike" baseline="0" dirty="0">
+              <a:latin typeface="新細明體" panose="02020500000000000000" pitchFamily="18" charset="-120"/>
+              <a:ea typeface="新細明體" panose="02020500000000000000" pitchFamily="18" charset="-120"/>
+            </a:endParaRPr>
+          </a:p>
+          <a:p>
+            <a:pPr marL="342900" indent="-342900" algn="l">
+              <a:buFont typeface="+mj-lt"/>
+              <a:buAutoNum type="arabicPeriod"/>
+            </a:pPr>
+            <a:endParaRPr lang="en-US" altLang="zh-CN" sz="1800" b="0" i="0" u="none" strike="noStrike" baseline="0" dirty="0">
+              <a:latin typeface="新細明體" panose="02020500000000000000" pitchFamily="18" charset="-120"/>
+              <a:ea typeface="新細明體" panose="02020500000000000000" pitchFamily="18" charset="-120"/>
+            </a:endParaRPr>
+          </a:p>
+          <a:p>
+            <a:pPr marL="342900" indent="-342900" algn="l">
+              <a:buFont typeface="+mj-lt"/>
+              <a:buAutoNum type="arabicPeriod"/>
+            </a:pPr>
+            <a:r>
+              <a:rPr lang="en-US" altLang="zh-CN" sz="1800" b="0" i="0" u="none" strike="noStrike" baseline="0" dirty="0">
+                <a:latin typeface="TimesNewRomanPSMT"/>
+                <a:ea typeface="新細明體" panose="02020500000000000000" pitchFamily="18" charset="-120"/>
+              </a:rPr>
+              <a:t>set</a:t>
+            </a:r>
+            <a:r>
+              <a:rPr lang="zh-CN" altLang="en-US" sz="1800" b="0" i="0" u="none" strike="noStrike" baseline="0" dirty="0">
+                <a:latin typeface="新細明體" panose="02020500000000000000" pitchFamily="18" charset="-120"/>
+                <a:ea typeface="新細明體" panose="02020500000000000000" pitchFamily="18" charset="-120"/>
+              </a:rPr>
+              <a:t>函數的第四個參數表示要將哪個</a:t>
+            </a:r>
+            <a:r>
+              <a:rPr lang="en-US" altLang="zh-CN" sz="1800" b="0" i="0" u="none" strike="noStrike" baseline="0" dirty="0">
+                <a:latin typeface="TimesNewRomanPSMT"/>
+                <a:ea typeface="新細明體" panose="02020500000000000000" pitchFamily="18" charset="-120"/>
+              </a:rPr>
+              <a:t>interface</a:t>
+            </a:r>
+            <a:r>
+              <a:rPr lang="zh-CN" altLang="en-US" sz="1800" b="0" i="0" u="none" strike="noStrike" baseline="0" dirty="0">
+                <a:latin typeface="新細明體" panose="02020500000000000000" pitchFamily="18" charset="-120"/>
+                <a:ea typeface="新細明體" panose="02020500000000000000" pitchFamily="18" charset="-120"/>
+              </a:rPr>
+              <a:t>通過</a:t>
+            </a:r>
+            <a:r>
+              <a:rPr lang="en-US" altLang="zh-CN" sz="1800" b="0" i="0" u="none" strike="noStrike" baseline="0" dirty="0" err="1">
+                <a:latin typeface="TimesNewRomanPSMT"/>
+                <a:ea typeface="新細明體" panose="02020500000000000000" pitchFamily="18" charset="-120"/>
+              </a:rPr>
+              <a:t>config_db</a:t>
+            </a:r>
+            <a:r>
+              <a:rPr lang="zh-CN" altLang="en-US" sz="1800" b="0" i="0" u="none" strike="noStrike" baseline="0" dirty="0">
+                <a:latin typeface="新細明體" panose="02020500000000000000" pitchFamily="18" charset="-120"/>
+                <a:ea typeface="新細明體" panose="02020500000000000000" pitchFamily="18" charset="-120"/>
+              </a:rPr>
+              <a:t>傳遞給</a:t>
+            </a:r>
+            <a:r>
+              <a:rPr lang="en-US" altLang="zh-CN" sz="1800" b="0" i="0" u="none" strike="noStrike" baseline="0" dirty="0" err="1">
+                <a:latin typeface="TimesNewRomanPSMT"/>
+                <a:ea typeface="新細明體" panose="02020500000000000000" pitchFamily="18" charset="-120"/>
+              </a:rPr>
+              <a:t>my_driver</a:t>
+            </a:r>
+            <a:endParaRPr lang="en-US" altLang="zh-CN" sz="1800" b="0" i="0" u="none" strike="noStrike" baseline="0" dirty="0">
+              <a:latin typeface="新細明體" panose="02020500000000000000" pitchFamily="18" charset="-120"/>
+              <a:ea typeface="新細明體" panose="02020500000000000000" pitchFamily="18" charset="-120"/>
+            </a:endParaRPr>
+          </a:p>
+          <a:p>
+            <a:pPr marL="342900" indent="-342900" algn="l">
+              <a:buFont typeface="+mj-lt"/>
+              <a:buAutoNum type="arabicPeriod"/>
+            </a:pPr>
+            <a:endParaRPr lang="en-US" altLang="zh-CN" sz="1800" b="0" i="0" u="none" strike="noStrike" baseline="0" dirty="0">
+              <a:latin typeface="新細明體" panose="02020500000000000000" pitchFamily="18" charset="-120"/>
+              <a:ea typeface="新細明體" panose="02020500000000000000" pitchFamily="18" charset="-120"/>
+            </a:endParaRPr>
+          </a:p>
+          <a:p>
+            <a:pPr marL="342900" indent="-342900" algn="l">
+              <a:buFont typeface="+mj-lt"/>
+              <a:buAutoNum type="arabicPeriod"/>
+            </a:pPr>
+            <a:r>
+              <a:rPr lang="en-US" altLang="zh-CN" sz="1800" b="0" i="0" u="none" strike="noStrike" baseline="0" dirty="0">
+                <a:latin typeface="TimesNewRomanPSMT"/>
+                <a:ea typeface="新細明體" panose="02020500000000000000" pitchFamily="18" charset="-120"/>
+              </a:rPr>
+              <a:t>get</a:t>
+            </a:r>
+            <a:r>
+              <a:rPr lang="zh-CN" altLang="en-US" sz="1800" b="0" i="0" u="none" strike="noStrike" baseline="0" dirty="0">
+                <a:latin typeface="新細明體" panose="02020500000000000000" pitchFamily="18" charset="-120"/>
+                <a:ea typeface="新細明體" panose="02020500000000000000" pitchFamily="18" charset="-120"/>
+              </a:rPr>
+              <a:t>函數的第四個參數表示把得到的</a:t>
+            </a:r>
+            <a:r>
+              <a:rPr lang="en-US" altLang="zh-CN" sz="1800" b="0" i="0" u="none" strike="noStrike" baseline="0" dirty="0">
+                <a:latin typeface="TimesNewRomanPSMT"/>
+                <a:ea typeface="新細明體" panose="02020500000000000000" pitchFamily="18" charset="-120"/>
+              </a:rPr>
+              <a:t>interface</a:t>
+            </a:r>
+            <a:r>
+              <a:rPr lang="zh-CN" altLang="en-US" sz="1800" b="0" i="0" u="none" strike="noStrike" baseline="0" dirty="0">
+                <a:latin typeface="新細明體" panose="02020500000000000000" pitchFamily="18" charset="-120"/>
+                <a:ea typeface="新細明體" panose="02020500000000000000" pitchFamily="18" charset="-120"/>
+              </a:rPr>
+              <a:t>傳遞給哪個</a:t>
+            </a:r>
+            <a:r>
+              <a:rPr lang="en-US" altLang="zh-CN" sz="1800" b="0" i="0" u="none" strike="noStrike" baseline="0" dirty="0" err="1">
+                <a:latin typeface="TimesNewRomanPSMT"/>
+                <a:ea typeface="新細明體" panose="02020500000000000000" pitchFamily="18" charset="-120"/>
+              </a:rPr>
+              <a:t>my_driver</a:t>
+            </a:r>
+            <a:r>
+              <a:rPr lang="zh-CN" altLang="en-US" sz="1800" b="0" i="0" u="none" strike="noStrike" baseline="0" dirty="0">
+                <a:latin typeface="新細明體" panose="02020500000000000000" pitchFamily="18" charset="-120"/>
+                <a:ea typeface="新細明體" panose="02020500000000000000" pitchFamily="18" charset="-120"/>
+              </a:rPr>
+              <a:t>的成員變數</a:t>
+            </a:r>
+            <a:endParaRPr lang="en-US" altLang="zh-CN" sz="1800" b="0" i="0" u="none" strike="noStrike" baseline="0" dirty="0">
+              <a:latin typeface="新細明體" panose="02020500000000000000" pitchFamily="18" charset="-120"/>
+              <a:ea typeface="新細明體" panose="02020500000000000000" pitchFamily="18" charset="-120"/>
+            </a:endParaRPr>
+          </a:p>
+          <a:p>
+            <a:pPr marL="342900" indent="-342900" algn="l">
+              <a:buFont typeface="+mj-lt"/>
+              <a:buAutoNum type="arabicPeriod"/>
+            </a:pPr>
+            <a:endParaRPr lang="en-US" altLang="zh-CN" sz="1800" b="0" i="0" u="none" strike="noStrike" baseline="0" dirty="0">
+              <a:latin typeface="新細明體" panose="02020500000000000000" pitchFamily="18" charset="-120"/>
+              <a:ea typeface="新細明體" panose="02020500000000000000" pitchFamily="18" charset="-120"/>
+            </a:endParaRPr>
+          </a:p>
+          <a:p>
+            <a:pPr marL="342900" indent="-342900" algn="l">
+              <a:buFont typeface="+mj-lt"/>
+              <a:buAutoNum type="arabicPeriod"/>
+            </a:pPr>
+            <a:r>
+              <a:rPr lang="en-US" altLang="zh-CN" sz="1800" b="0" i="0" u="none" strike="noStrike" baseline="0" dirty="0">
+                <a:latin typeface="TimesNewRomanPSMT"/>
+                <a:ea typeface="新細明體" panose="02020500000000000000" pitchFamily="18" charset="-120"/>
+              </a:rPr>
+              <a:t>set</a:t>
+            </a:r>
+            <a:r>
+              <a:rPr lang="zh-CN" altLang="en-US" sz="1800" b="0" i="0" u="none" strike="noStrike" baseline="0" dirty="0">
+                <a:latin typeface="新細明體" panose="02020500000000000000" pitchFamily="18" charset="-120"/>
+                <a:ea typeface="新細明體" panose="02020500000000000000" pitchFamily="18" charset="-120"/>
+              </a:rPr>
+              <a:t>函數的第二個參數表示的是路徑索引</a:t>
+            </a:r>
+            <a:endParaRPr lang="en-US" altLang="zh-CN" sz="1800" b="0" i="0" u="none" strike="noStrike" baseline="0" dirty="0">
+              <a:latin typeface="新細明體" panose="02020500000000000000" pitchFamily="18" charset="-120"/>
+              <a:ea typeface="新細明體" panose="02020500000000000000" pitchFamily="18" charset="-120"/>
+            </a:endParaRPr>
+          </a:p>
+          <a:p>
+            <a:pPr marL="342900" indent="-342900" algn="l">
+              <a:buFont typeface="+mj-lt"/>
+              <a:buAutoNum type="arabicPeriod"/>
+            </a:pPr>
+            <a:endParaRPr lang="en-US" altLang="zh-CN" dirty="0">
+              <a:latin typeface="新細明體" panose="02020500000000000000" pitchFamily="18" charset="-120"/>
+              <a:ea typeface="新細明體" panose="02020500000000000000" pitchFamily="18" charset="-120"/>
+            </a:endParaRPr>
+          </a:p>
+          <a:p>
+            <a:pPr marL="342900" indent="-342900" algn="l">
+              <a:buFont typeface="+mj-lt"/>
+              <a:buAutoNum type="arabicPeriod"/>
+            </a:pPr>
+            <a:r>
+              <a:rPr lang="zh-TW" altLang="en-US" sz="1800" b="0" i="0" u="none" strike="noStrike" baseline="0" dirty="0">
+                <a:latin typeface="新細明體" panose="02020500000000000000" pitchFamily="18" charset="-120"/>
+                <a:ea typeface="新細明體" panose="02020500000000000000" pitchFamily="18" charset="-120"/>
+              </a:rPr>
+              <a:t>在 </a:t>
+            </a:r>
+            <a:r>
+              <a:rPr lang="en-US" altLang="zh-CN" sz="1800" b="0" i="0" u="none" strike="noStrike" baseline="0" dirty="0" err="1">
+                <a:latin typeface="新細明體" panose="02020500000000000000" pitchFamily="18" charset="-120"/>
+                <a:ea typeface="新細明體" panose="02020500000000000000" pitchFamily="18" charset="-120"/>
+              </a:rPr>
+              <a:t>top_tb</a:t>
+            </a:r>
+            <a:r>
+              <a:rPr lang="en-US" altLang="zh-CN" sz="1800" b="0" i="0" u="none" strike="noStrike" baseline="0" dirty="0">
+                <a:latin typeface="新細明體" panose="02020500000000000000" pitchFamily="18" charset="-120"/>
+                <a:ea typeface="新細明體" panose="02020500000000000000" pitchFamily="18" charset="-120"/>
+              </a:rPr>
+              <a:t> </a:t>
+            </a:r>
+            <a:r>
+              <a:rPr lang="zh-TW" altLang="en-US" sz="1800" b="0" i="0" u="none" strike="noStrike" baseline="0" dirty="0">
+                <a:latin typeface="新細明體" panose="02020500000000000000" pitchFamily="18" charset="-120"/>
+                <a:ea typeface="新細明體" panose="02020500000000000000" pitchFamily="18" charset="-120"/>
+              </a:rPr>
+              <a:t>中通過 </a:t>
+            </a:r>
+            <a:r>
+              <a:rPr lang="en-US" altLang="zh-CN" sz="1800" b="0" i="0" u="none" strike="noStrike" baseline="0" dirty="0" err="1">
+                <a:latin typeface="新細明體" panose="02020500000000000000" pitchFamily="18" charset="-120"/>
+                <a:ea typeface="新細明體" panose="02020500000000000000" pitchFamily="18" charset="-120"/>
+              </a:rPr>
+              <a:t>run_test</a:t>
+            </a:r>
+            <a:r>
+              <a:rPr lang="en-US" altLang="zh-CN" sz="1800" b="0" i="0" u="none" strike="noStrike" baseline="0" dirty="0">
+                <a:latin typeface="新細明體" panose="02020500000000000000" pitchFamily="18" charset="-120"/>
+                <a:ea typeface="新細明體" panose="02020500000000000000" pitchFamily="18" charset="-120"/>
+              </a:rPr>
+              <a:t> </a:t>
+            </a:r>
+            <a:r>
+              <a:rPr lang="zh-TW" altLang="en-US" sz="1800" b="0" i="0" u="none" strike="noStrike" baseline="0" dirty="0">
+                <a:latin typeface="新細明體" panose="02020500000000000000" pitchFamily="18" charset="-120"/>
+                <a:ea typeface="新細明體" panose="02020500000000000000" pitchFamily="18" charset="-120"/>
+              </a:rPr>
+              <a:t>創建了一個 </a:t>
+            </a:r>
+            <a:r>
+              <a:rPr lang="en-US" altLang="zh-CN" sz="1800" b="0" i="0" u="none" strike="noStrike" baseline="0" dirty="0" err="1">
+                <a:latin typeface="新細明體" panose="02020500000000000000" pitchFamily="18" charset="-120"/>
+                <a:ea typeface="新細明體" panose="02020500000000000000" pitchFamily="18" charset="-120"/>
+              </a:rPr>
+              <a:t>my_driver</a:t>
+            </a:r>
+            <a:r>
+              <a:rPr lang="en-US" altLang="zh-CN" sz="1800" b="0" i="0" u="none" strike="noStrike" baseline="0" dirty="0">
+                <a:latin typeface="新細明體" panose="02020500000000000000" pitchFamily="18" charset="-120"/>
+                <a:ea typeface="新細明體" panose="02020500000000000000" pitchFamily="18" charset="-120"/>
+              </a:rPr>
+              <a:t> </a:t>
+            </a:r>
+            <a:r>
+              <a:rPr lang="zh-TW" altLang="en-US" sz="1800" b="0" i="0" u="none" strike="noStrike" baseline="0" dirty="0">
+                <a:latin typeface="新細明體" panose="02020500000000000000" pitchFamily="18" charset="-120"/>
+                <a:ea typeface="新細明體" panose="02020500000000000000" pitchFamily="18" charset="-120"/>
+              </a:rPr>
+              <a:t>的實例，那麼這個實例的名字是什麼呢？答案是 </a:t>
+            </a:r>
+            <a:r>
+              <a:rPr lang="en-US" altLang="zh-CN" sz="1800" b="0" i="0" u="none" strike="noStrike" baseline="0" dirty="0" err="1">
+                <a:latin typeface="新細明體" panose="02020500000000000000" pitchFamily="18" charset="-120"/>
+                <a:ea typeface="新細明體" panose="02020500000000000000" pitchFamily="18" charset="-120"/>
+              </a:rPr>
+              <a:t>uvm_test_top</a:t>
+            </a:r>
+            <a:br>
+              <a:rPr lang="en-US" altLang="zh-CN" dirty="0">
+                <a:latin typeface="新細明體" panose="02020500000000000000" pitchFamily="18" charset="-120"/>
+                <a:ea typeface="新細明體" panose="02020500000000000000" pitchFamily="18" charset="-120"/>
+              </a:rPr>
+            </a:br>
+            <a:r>
+              <a:rPr lang="en-US" altLang="zh-CN" sz="1800" b="0" i="0" u="none" strike="noStrike" baseline="0" dirty="0">
+                <a:latin typeface="新細明體" panose="02020500000000000000" pitchFamily="18" charset="-120"/>
+                <a:ea typeface="新細明體" panose="02020500000000000000" pitchFamily="18" charset="-120"/>
+              </a:rPr>
+              <a:t>UVM</a:t>
+            </a:r>
+            <a:r>
+              <a:rPr lang="zh-TW" altLang="en-US" sz="1800" b="0" i="0" u="none" strike="noStrike" baseline="0" dirty="0">
+                <a:latin typeface="新細明體" panose="02020500000000000000" pitchFamily="18" charset="-120"/>
+                <a:ea typeface="新細明體" panose="02020500000000000000" pitchFamily="18" charset="-120"/>
+              </a:rPr>
+              <a:t>通過 </a:t>
+            </a:r>
+            <a:r>
+              <a:rPr lang="en-US" altLang="zh-CN" sz="1800" b="0" i="0" u="none" strike="noStrike" baseline="0" dirty="0" err="1">
+                <a:latin typeface="新細明體" panose="02020500000000000000" pitchFamily="18" charset="-120"/>
+                <a:ea typeface="新細明體" panose="02020500000000000000" pitchFamily="18" charset="-120"/>
+              </a:rPr>
+              <a:t>run_test</a:t>
+            </a:r>
+            <a:r>
+              <a:rPr lang="en-US" altLang="zh-CN" sz="1800" b="0" i="0" u="none" strike="noStrike" baseline="0" dirty="0">
+                <a:latin typeface="新細明體" panose="02020500000000000000" pitchFamily="18" charset="-120"/>
+                <a:ea typeface="新細明體" panose="02020500000000000000" pitchFamily="18" charset="-120"/>
+              </a:rPr>
+              <a:t> </a:t>
+            </a:r>
+            <a:r>
+              <a:rPr lang="zh-TW" altLang="en-US" sz="1800" b="0" i="0" u="none" strike="noStrike" baseline="0" dirty="0">
+                <a:latin typeface="新細明體" panose="02020500000000000000" pitchFamily="18" charset="-120"/>
+                <a:ea typeface="新細明體" panose="02020500000000000000" pitchFamily="18" charset="-120"/>
+              </a:rPr>
+              <a:t>語句創建一個名字為</a:t>
+            </a:r>
+            <a:r>
+              <a:rPr lang="en-US" altLang="zh-CN" sz="1800" b="0" i="0" u="none" strike="noStrike" baseline="0" dirty="0" err="1">
+                <a:latin typeface="新細明體" panose="02020500000000000000" pitchFamily="18" charset="-120"/>
+                <a:ea typeface="新細明體" panose="02020500000000000000" pitchFamily="18" charset="-120"/>
+              </a:rPr>
+              <a:t>uvm_test_top</a:t>
+            </a:r>
+            <a:r>
+              <a:rPr lang="zh-TW" altLang="en-US" sz="1800" b="0" i="0" u="none" strike="noStrike" baseline="0" dirty="0">
+                <a:latin typeface="新細明體" panose="02020500000000000000" pitchFamily="18" charset="-120"/>
+                <a:ea typeface="新細明體" panose="02020500000000000000" pitchFamily="18" charset="-120"/>
+              </a:rPr>
+              <a:t>的實例</a:t>
+            </a:r>
+            <a:endParaRPr lang="en-US" altLang="zh-CN" sz="1800" b="0" i="0" u="none" strike="noStrike" baseline="0" dirty="0">
+              <a:latin typeface="新細明體" panose="02020500000000000000" pitchFamily="18" charset="-120"/>
+              <a:ea typeface="新細明體" panose="02020500000000000000" pitchFamily="18" charset="-120"/>
+            </a:endParaRPr>
+          </a:p>
+        </p:txBody>
+      </p:sp>
+    </p:spTree>
+    <p:extLst>
+      <p:ext uri="{BB962C8B-B14F-4D97-AF65-F5344CB8AC3E}">
+        <p14:creationId xmlns:p14="http://schemas.microsoft.com/office/powerpoint/2010/main" val="2506607735"/>
+      </p:ext>
+    </p:extLst>
+  </p:cSld>
+  <p:clrMapOvr>
+    <a:masterClrMapping/>
+  </p:clrMapOvr>
+</p:sld>
+</file>
+
+<file path=ppt/slides/slide7.xml><?xml version="1.0" encoding="utf-8"?>
+<p:sld xmlns:a="http://schemas.openxmlformats.org/drawingml/2006/main" xmlns:r="http://schemas.openxmlformats.org/officeDocument/2006/relationships" xmlns:p="http://schemas.openxmlformats.org/presentationml/2006/main">
+  <p:cSld>
+    <p:spTree>
+      <p:nvGrpSpPr>
+        <p:cNvPr id="1" name="">
+          <a:extLst>
+            <a:ext uri="{FF2B5EF4-FFF2-40B4-BE49-F238E27FC236}">
+              <a16:creationId xmlns:a16="http://schemas.microsoft.com/office/drawing/2014/main" id="{7838CF80-0A59-7697-ECD6-689F0FBEFEA5}"/>
+            </a:ext>
+          </a:extLst>
+        </p:cNvPr>
+        <p:cNvGrpSpPr/>
+        <p:nvPr/>
+      </p:nvGrpSpPr>
+      <p:grpSpPr>
+        <a:xfrm>
+          <a:off x="0" y="0"/>
+          <a:ext cx="0" cy="0"/>
+          <a:chOff x="0" y="0"/>
+          <a:chExt cx="0" cy="0"/>
+        </a:xfrm>
+      </p:grpSpPr>
+      <p:sp>
+        <p:nvSpPr>
+          <p:cNvPr id="2" name="標題 1">
+            <a:extLst>
+              <a:ext uri="{FF2B5EF4-FFF2-40B4-BE49-F238E27FC236}">
+                <a16:creationId xmlns:a16="http://schemas.microsoft.com/office/drawing/2014/main" id="{723C51D7-627F-15B3-FB59-0BFA69A9329F}"/>
+              </a:ext>
+            </a:extLst>
+          </p:cNvPr>
+          <p:cNvSpPr>
+            <a:spLocks noGrp="1"/>
+          </p:cNvSpPr>
+          <p:nvPr>
+            <p:ph type="ctrTitle"/>
+          </p:nvPr>
+        </p:nvSpPr>
+        <p:spPr/>
+        <p:txBody>
+          <a:bodyPr/>
+          <a:lstStyle/>
+          <a:p>
+            <a:r>
+              <a:rPr lang="en-US" altLang="zh-TW" dirty="0"/>
+              <a:t>Chapter 2</a:t>
+            </a:r>
+            <a:endParaRPr lang="zh-TW" altLang="en-US" dirty="0"/>
+          </a:p>
+        </p:txBody>
+      </p:sp>
+      <p:sp>
+        <p:nvSpPr>
+          <p:cNvPr id="3" name="副標題 2">
+            <a:extLst>
+              <a:ext uri="{FF2B5EF4-FFF2-40B4-BE49-F238E27FC236}">
+                <a16:creationId xmlns:a16="http://schemas.microsoft.com/office/drawing/2014/main" id="{1534FE51-39D9-57DB-FB3E-51F3642C5D72}"/>
+              </a:ext>
+            </a:extLst>
+          </p:cNvPr>
+          <p:cNvSpPr>
+            <a:spLocks noGrp="1"/>
+          </p:cNvSpPr>
+          <p:nvPr>
+            <p:ph type="subTitle" idx="1"/>
+          </p:nvPr>
+        </p:nvSpPr>
+        <p:spPr/>
+        <p:txBody>
+          <a:bodyPr/>
+          <a:lstStyle/>
+          <a:p>
+            <a:r>
+              <a:rPr lang="en-US" altLang="zh-TW" dirty="0"/>
+              <a:t>Basic UVM </a:t>
+            </a:r>
+            <a:r>
+              <a:rPr lang="zh-TW" altLang="en-US" dirty="0"/>
+              <a:t>驗證平台</a:t>
+            </a:r>
+          </a:p>
+        </p:txBody>
+      </p:sp>
+    </p:spTree>
+    <p:extLst>
+      <p:ext uri="{BB962C8B-B14F-4D97-AF65-F5344CB8AC3E}">
+        <p14:creationId xmlns:p14="http://schemas.microsoft.com/office/powerpoint/2010/main" val="2860226607"/>
+      </p:ext>
+    </p:extLst>
+  </p:cSld>
+  <p:clrMapOvr>
+    <a:masterClrMapping/>
+  </p:clrMapOvr>
+</p:sld>
+</file>
+
+<file path=ppt/slides/slide8.xml><?xml version="1.0" encoding="utf-8"?>
+<p:sld xmlns:a="http://schemas.openxmlformats.org/drawingml/2006/main" xmlns:r="http://schemas.openxmlformats.org/officeDocument/2006/relationships" xmlns:p="http://schemas.openxmlformats.org/presentationml/2006/main">
+  <p:cSld>
+    <p:spTree>
+      <p:nvGrpSpPr>
+        <p:cNvPr id="1" name="">
+          <a:extLst>
+            <a:ext uri="{FF2B5EF4-FFF2-40B4-BE49-F238E27FC236}">
+              <a16:creationId xmlns:a16="http://schemas.microsoft.com/office/drawing/2014/main" id="{ABAAA25C-5985-E42C-62C9-0351D1F9CEF6}"/>
+            </a:ext>
+          </a:extLst>
+        </p:cNvPr>
+        <p:cNvGrpSpPr/>
+        <p:nvPr/>
+      </p:nvGrpSpPr>
+      <p:grpSpPr>
+        <a:xfrm>
+          <a:off x="0" y="0"/>
+          <a:ext cx="0" cy="0"/>
+          <a:chOff x="0" y="0"/>
+          <a:chExt cx="0" cy="0"/>
+        </a:xfrm>
+      </p:grpSpPr>
+      <p:sp>
+        <p:nvSpPr>
+          <p:cNvPr id="2" name="標題 1">
+            <a:extLst>
+              <a:ext uri="{FF2B5EF4-FFF2-40B4-BE49-F238E27FC236}">
+                <a16:creationId xmlns:a16="http://schemas.microsoft.com/office/drawing/2014/main" id="{4EBB75CA-EF2B-B544-C1F6-F2A8FEED7A5D}"/>
+              </a:ext>
+            </a:extLst>
+          </p:cNvPr>
+          <p:cNvSpPr>
+            <a:spLocks noGrp="1"/>
+          </p:cNvSpPr>
+          <p:nvPr>
+            <p:ph type="title"/>
+          </p:nvPr>
+        </p:nvSpPr>
+        <p:spPr/>
+        <p:txBody>
+          <a:bodyPr/>
+          <a:lstStyle/>
+          <a:p>
+            <a:r>
+              <a:rPr lang="en-US" altLang="zh-TW" dirty="0"/>
+              <a:t>Basic UVM</a:t>
+            </a:r>
+            <a:r>
+              <a:rPr lang="zh-TW" altLang="en-US" dirty="0"/>
+              <a:t> 驗證平台 </a:t>
+            </a:r>
+            <a:r>
+              <a:rPr lang="en-US" altLang="zh-TW" dirty="0"/>
+              <a:t>(1/)</a:t>
+            </a:r>
+            <a:endParaRPr lang="zh-TW" altLang="en-US" dirty="0"/>
+          </a:p>
+        </p:txBody>
+      </p:sp>
+      <p:sp>
+        <p:nvSpPr>
+          <p:cNvPr id="3" name="內容版面配置區 2">
+            <a:extLst>
+              <a:ext uri="{FF2B5EF4-FFF2-40B4-BE49-F238E27FC236}">
+                <a16:creationId xmlns:a16="http://schemas.microsoft.com/office/drawing/2014/main" id="{EF3F9887-0B53-C4A4-1A9D-E46DA6276C34}"/>
+              </a:ext>
+            </a:extLst>
+          </p:cNvPr>
+          <p:cNvSpPr>
+            <a:spLocks noGrp="1"/>
+          </p:cNvSpPr>
+          <p:nvPr>
+            <p:ph idx="1"/>
+          </p:nvPr>
+        </p:nvSpPr>
+        <p:spPr/>
+        <p:txBody>
+          <a:bodyPr/>
+          <a:lstStyle/>
+          <a:p>
+            <a:r>
+              <a:rPr lang="zh-TW" altLang="en-US" dirty="0"/>
+              <a:t>加入以下七種項目即可組成 </a:t>
+            </a:r>
+            <a:r>
+              <a:rPr lang="en-US" altLang="zh-TW" dirty="0"/>
+              <a:t>Basic UVM </a:t>
+            </a:r>
+            <a:r>
+              <a:rPr lang="zh-TW" altLang="en-US"/>
+              <a:t>驗證平台</a:t>
+            </a:r>
+            <a:endParaRPr lang="en-US" altLang="zh-TW" dirty="0"/>
+          </a:p>
+          <a:p>
+            <a:pPr marL="971550" lvl="1" indent="-514350">
+              <a:buFont typeface="+mj-lt"/>
+              <a:buAutoNum type="arabicPeriod"/>
+            </a:pPr>
+            <a:r>
+              <a:rPr lang="zh-TW" altLang="en-US" dirty="0"/>
+              <a:t>加入 </a:t>
+            </a:r>
+            <a:r>
+              <a:rPr lang="en-US" altLang="zh-TW" dirty="0" err="1"/>
+              <a:t>transation</a:t>
+            </a:r>
+            <a:endParaRPr lang="en-US" altLang="zh-TW" dirty="0"/>
+          </a:p>
+          <a:p>
+            <a:pPr marL="971550" lvl="1" indent="-514350">
+              <a:buFont typeface="+mj-lt"/>
+              <a:buAutoNum type="arabicPeriod"/>
+            </a:pPr>
+            <a:r>
+              <a:rPr lang="zh-TW" altLang="en-US" dirty="0"/>
+              <a:t>加入 </a:t>
+            </a:r>
+            <a:r>
+              <a:rPr lang="en-US" altLang="zh-TW" dirty="0"/>
+              <a:t>env</a:t>
+            </a:r>
+          </a:p>
+          <a:p>
+            <a:pPr marL="971550" lvl="1" indent="-514350">
+              <a:buFont typeface="+mj-lt"/>
+              <a:buAutoNum type="arabicPeriod"/>
+            </a:pPr>
+            <a:r>
+              <a:rPr lang="zh-TW" altLang="en-US" dirty="0"/>
+              <a:t>加入 </a:t>
+            </a:r>
+            <a:r>
+              <a:rPr lang="en-US" altLang="zh-TW" dirty="0"/>
+              <a:t>monitor</a:t>
+            </a:r>
+          </a:p>
+          <a:p>
+            <a:pPr marL="971550" lvl="1" indent="-514350">
+              <a:buFont typeface="+mj-lt"/>
+              <a:buAutoNum type="arabicPeriod"/>
+            </a:pPr>
+            <a:r>
+              <a:rPr lang="zh-TW" altLang="en-US" dirty="0"/>
+              <a:t>封裝成 </a:t>
+            </a:r>
+            <a:r>
+              <a:rPr lang="en-US" altLang="zh-TW" dirty="0"/>
+              <a:t>agent</a:t>
+            </a:r>
+          </a:p>
+          <a:p>
+            <a:pPr marL="971550" lvl="1" indent="-514350">
+              <a:buFont typeface="+mj-lt"/>
+              <a:buAutoNum type="arabicPeriod"/>
+            </a:pPr>
+            <a:r>
+              <a:rPr lang="zh-TW" altLang="en-US" dirty="0"/>
+              <a:t>加入 </a:t>
+            </a:r>
+            <a:r>
+              <a:rPr lang="en-US" altLang="zh-TW" dirty="0"/>
+              <a:t>reference model</a:t>
+            </a:r>
+          </a:p>
+          <a:p>
+            <a:pPr marL="971550" lvl="1" indent="-514350">
+              <a:buFont typeface="+mj-lt"/>
+              <a:buAutoNum type="arabicPeriod"/>
+            </a:pPr>
+            <a:r>
+              <a:rPr lang="zh-TW" altLang="en-US" dirty="0"/>
+              <a:t>加入 </a:t>
+            </a:r>
+            <a:r>
+              <a:rPr lang="en-US" altLang="zh-TW" dirty="0"/>
+              <a:t>scoreboard</a:t>
+            </a:r>
+          </a:p>
+          <a:p>
+            <a:pPr marL="971550" lvl="1" indent="-514350">
+              <a:buFont typeface="+mj-lt"/>
+              <a:buAutoNum type="arabicPeriod"/>
+            </a:pPr>
+            <a:r>
+              <a:rPr lang="zh-TW" altLang="en-US" dirty="0"/>
+              <a:t>加入 </a:t>
+            </a:r>
+            <a:r>
+              <a:rPr lang="en-US" altLang="zh-TW" dirty="0" err="1"/>
+              <a:t>field_automation</a:t>
+            </a:r>
+            <a:r>
+              <a:rPr lang="zh-TW" altLang="en-US" dirty="0"/>
+              <a:t> 機制</a:t>
+            </a:r>
+          </a:p>
+        </p:txBody>
+      </p:sp>
+    </p:spTree>
+    <p:extLst>
+      <p:ext uri="{BB962C8B-B14F-4D97-AF65-F5344CB8AC3E}">
+        <p14:creationId xmlns:p14="http://schemas.microsoft.com/office/powerpoint/2010/main" val="156410506"/>
       </p:ext>
     </p:extLst>
   </p:cSld>

</xml_diff>

<commit_message>
Add: Basic UVM example code 1. add transation 2. add env 3. add monitor
</commit_message>
<xml_diff>
--- a/UVM/UVM.pptx
+++ b/UVM/UVM.pptx
@@ -4,6 +4,9 @@
   <p:sldMasterIdLst>
     <p:sldMasterId id="2147483648" r:id="rId1"/>
   </p:sldMasterIdLst>
+  <p:notesMasterIdLst>
+    <p:notesMasterId r:id="rId17"/>
+  </p:notesMasterIdLst>
   <p:sldIdLst>
     <p:sldId id="256" r:id="rId2"/>
     <p:sldId id="257" r:id="rId3"/>
@@ -13,6 +16,13 @@
     <p:sldId id="262" r:id="rId7"/>
     <p:sldId id="263" r:id="rId8"/>
     <p:sldId id="264" r:id="rId9"/>
+    <p:sldId id="265" r:id="rId10"/>
+    <p:sldId id="266" r:id="rId11"/>
+    <p:sldId id="267" r:id="rId12"/>
+    <p:sldId id="268" r:id="rId13"/>
+    <p:sldId id="269" r:id="rId14"/>
+    <p:sldId id="270" r:id="rId15"/>
+    <p:sldId id="271" r:id="rId16"/>
   </p:sldIdLst>
   <p:sldSz cx="12192000" cy="6858000"/>
   <p:notesSz cx="6858000" cy="9144000"/>
@@ -119,6 +129,979 @@
 </p:presentation>
 </file>
 
+<file path=ppt/notesMasters/notesMaster1.xml><?xml version="1.0" encoding="utf-8"?>
+<p:notesMaster xmlns:a="http://schemas.openxmlformats.org/drawingml/2006/main" xmlns:r="http://schemas.openxmlformats.org/officeDocument/2006/relationships" xmlns:p="http://schemas.openxmlformats.org/presentationml/2006/main">
+  <p:cSld>
+    <p:bg>
+      <p:bgRef idx="1001">
+        <a:schemeClr val="bg1"/>
+      </p:bgRef>
+    </p:bg>
+    <p:spTree>
+      <p:nvGrpSpPr>
+        <p:cNvPr id="1" name=""/>
+        <p:cNvGrpSpPr/>
+        <p:nvPr/>
+      </p:nvGrpSpPr>
+      <p:grpSpPr>
+        <a:xfrm>
+          <a:off x="0" y="0"/>
+          <a:ext cx="0" cy="0"/>
+          <a:chOff x="0" y="0"/>
+          <a:chExt cx="0" cy="0"/>
+        </a:xfrm>
+      </p:grpSpPr>
+      <p:sp>
+        <p:nvSpPr>
+          <p:cNvPr id="2" name="頁首版面配置區 1"/>
+          <p:cNvSpPr>
+            <a:spLocks noGrp="1"/>
+          </p:cNvSpPr>
+          <p:nvPr>
+            <p:ph type="hdr" sz="quarter"/>
+          </p:nvPr>
+        </p:nvSpPr>
+        <p:spPr>
+          <a:xfrm>
+            <a:off x="0" y="0"/>
+            <a:ext cx="2971800" cy="458788"/>
+          </a:xfrm>
+          <a:prstGeom prst="rect">
+            <a:avLst/>
+          </a:prstGeom>
+        </p:spPr>
+        <p:txBody>
+          <a:bodyPr vert="horz" lIns="91440" tIns="45720" rIns="91440" bIns="45720" rtlCol="0"/>
+          <a:lstStyle>
+            <a:lvl1pPr algn="l">
+              <a:defRPr sz="1200"/>
+            </a:lvl1pPr>
+          </a:lstStyle>
+          <a:p>
+            <a:endParaRPr lang="zh-TW" altLang="en-US"/>
+          </a:p>
+        </p:txBody>
+      </p:sp>
+      <p:sp>
+        <p:nvSpPr>
+          <p:cNvPr id="3" name="日期版面配置區 2"/>
+          <p:cNvSpPr>
+            <a:spLocks noGrp="1"/>
+          </p:cNvSpPr>
+          <p:nvPr>
+            <p:ph type="dt" idx="1"/>
+          </p:nvPr>
+        </p:nvSpPr>
+        <p:spPr>
+          <a:xfrm>
+            <a:off x="3884613" y="0"/>
+            <a:ext cx="2971800" cy="458788"/>
+          </a:xfrm>
+          <a:prstGeom prst="rect">
+            <a:avLst/>
+          </a:prstGeom>
+        </p:spPr>
+        <p:txBody>
+          <a:bodyPr vert="horz" lIns="91440" tIns="45720" rIns="91440" bIns="45720" rtlCol="0"/>
+          <a:lstStyle>
+            <a:lvl1pPr algn="r">
+              <a:defRPr sz="1200"/>
+            </a:lvl1pPr>
+          </a:lstStyle>
+          <a:p>
+            <a:fld id="{DC9BAD77-A9DC-412E-A1BD-F95D6ECE15BA}" type="datetimeFigureOut">
+              <a:rPr lang="zh-TW" altLang="en-US" smtClean="0"/>
+              <a:t>2025/5/1</a:t>
+            </a:fld>
+            <a:endParaRPr lang="zh-TW" altLang="en-US"/>
+          </a:p>
+        </p:txBody>
+      </p:sp>
+      <p:sp>
+        <p:nvSpPr>
+          <p:cNvPr id="4" name="投影片影像版面配置區 3"/>
+          <p:cNvSpPr>
+            <a:spLocks noGrp="1" noRot="1" noChangeAspect="1"/>
+          </p:cNvSpPr>
+          <p:nvPr>
+            <p:ph type="sldImg" idx="2"/>
+          </p:nvPr>
+        </p:nvSpPr>
+        <p:spPr>
+          <a:xfrm>
+            <a:off x="685800" y="1143000"/>
+            <a:ext cx="5486400" cy="3086100"/>
+          </a:xfrm>
+          <a:prstGeom prst="rect">
+            <a:avLst/>
+          </a:prstGeom>
+          <a:noFill/>
+          <a:ln w="12700">
+            <a:solidFill>
+              <a:prstClr val="black"/>
+            </a:solidFill>
+          </a:ln>
+        </p:spPr>
+        <p:txBody>
+          <a:bodyPr vert="horz" lIns="91440" tIns="45720" rIns="91440" bIns="45720" rtlCol="0" anchor="ctr"/>
+          <a:lstStyle/>
+          <a:p>
+            <a:endParaRPr lang="zh-TW" altLang="en-US"/>
+          </a:p>
+        </p:txBody>
+      </p:sp>
+      <p:sp>
+        <p:nvSpPr>
+          <p:cNvPr id="5" name="備忘稿版面配置區 4"/>
+          <p:cNvSpPr>
+            <a:spLocks noGrp="1"/>
+          </p:cNvSpPr>
+          <p:nvPr>
+            <p:ph type="body" sz="quarter" idx="3"/>
+          </p:nvPr>
+        </p:nvSpPr>
+        <p:spPr>
+          <a:xfrm>
+            <a:off x="685800" y="4400550"/>
+            <a:ext cx="5486400" cy="3600450"/>
+          </a:xfrm>
+          <a:prstGeom prst="rect">
+            <a:avLst/>
+          </a:prstGeom>
+        </p:spPr>
+        <p:txBody>
+          <a:bodyPr vert="horz" lIns="91440" tIns="45720" rIns="91440" bIns="45720" rtlCol="0"/>
+          <a:lstStyle/>
+          <a:p>
+            <a:pPr lvl="0"/>
+            <a:r>
+              <a:rPr lang="zh-TW" altLang="en-US"/>
+              <a:t>按一下以編輯母片文字樣式</a:t>
+            </a:r>
+          </a:p>
+          <a:p>
+            <a:pPr lvl="1"/>
+            <a:r>
+              <a:rPr lang="zh-TW" altLang="en-US"/>
+              <a:t>第二層</a:t>
+            </a:r>
+          </a:p>
+          <a:p>
+            <a:pPr lvl="2"/>
+            <a:r>
+              <a:rPr lang="zh-TW" altLang="en-US"/>
+              <a:t>第三層</a:t>
+            </a:r>
+          </a:p>
+          <a:p>
+            <a:pPr lvl="3"/>
+            <a:r>
+              <a:rPr lang="zh-TW" altLang="en-US"/>
+              <a:t>第四層</a:t>
+            </a:r>
+          </a:p>
+          <a:p>
+            <a:pPr lvl="4"/>
+            <a:r>
+              <a:rPr lang="zh-TW" altLang="en-US"/>
+              <a:t>第五層</a:t>
+            </a:r>
+          </a:p>
+        </p:txBody>
+      </p:sp>
+      <p:sp>
+        <p:nvSpPr>
+          <p:cNvPr id="6" name="頁尾版面配置區 5"/>
+          <p:cNvSpPr>
+            <a:spLocks noGrp="1"/>
+          </p:cNvSpPr>
+          <p:nvPr>
+            <p:ph type="ftr" sz="quarter" idx="4"/>
+          </p:nvPr>
+        </p:nvSpPr>
+        <p:spPr>
+          <a:xfrm>
+            <a:off x="0" y="8685213"/>
+            <a:ext cx="2971800" cy="458787"/>
+          </a:xfrm>
+          <a:prstGeom prst="rect">
+            <a:avLst/>
+          </a:prstGeom>
+        </p:spPr>
+        <p:txBody>
+          <a:bodyPr vert="horz" lIns="91440" tIns="45720" rIns="91440" bIns="45720" rtlCol="0" anchor="b"/>
+          <a:lstStyle>
+            <a:lvl1pPr algn="l">
+              <a:defRPr sz="1200"/>
+            </a:lvl1pPr>
+          </a:lstStyle>
+          <a:p>
+            <a:endParaRPr lang="zh-TW" altLang="en-US"/>
+          </a:p>
+        </p:txBody>
+      </p:sp>
+      <p:sp>
+        <p:nvSpPr>
+          <p:cNvPr id="7" name="投影片編號版面配置區 6"/>
+          <p:cNvSpPr>
+            <a:spLocks noGrp="1"/>
+          </p:cNvSpPr>
+          <p:nvPr>
+            <p:ph type="sldNum" sz="quarter" idx="5"/>
+          </p:nvPr>
+        </p:nvSpPr>
+        <p:spPr>
+          <a:xfrm>
+            <a:off x="3884613" y="8685213"/>
+            <a:ext cx="2971800" cy="458787"/>
+          </a:xfrm>
+          <a:prstGeom prst="rect">
+            <a:avLst/>
+          </a:prstGeom>
+        </p:spPr>
+        <p:txBody>
+          <a:bodyPr vert="horz" lIns="91440" tIns="45720" rIns="91440" bIns="45720" rtlCol="0" anchor="b"/>
+          <a:lstStyle>
+            <a:lvl1pPr algn="r">
+              <a:defRPr sz="1200"/>
+            </a:lvl1pPr>
+          </a:lstStyle>
+          <a:p>
+            <a:fld id="{005DCC72-CBA4-423D-B8F5-4EF2030FF5C1}" type="slidenum">
+              <a:rPr lang="zh-TW" altLang="en-US" smtClean="0"/>
+              <a:t>‹#›</a:t>
+            </a:fld>
+            <a:endParaRPr lang="zh-TW" altLang="en-US"/>
+          </a:p>
+        </p:txBody>
+      </p:sp>
+    </p:spTree>
+    <p:extLst>
+      <p:ext uri="{BB962C8B-B14F-4D97-AF65-F5344CB8AC3E}">
+        <p14:creationId xmlns:p14="http://schemas.microsoft.com/office/powerpoint/2010/main" val="352937116"/>
+      </p:ext>
+    </p:extLst>
+  </p:cSld>
+  <p:clrMap bg1="lt1" tx1="dk1" bg2="lt2" tx2="dk2" accent1="accent1" accent2="accent2" accent3="accent3" accent4="accent4" accent5="accent5" accent6="accent6" hlink="hlink" folHlink="folHlink"/>
+  <p:notesStyle>
+    <a:lvl1pPr marL="0" algn="l" defTabSz="914400" rtl="0" eaLnBrk="1" latinLnBrk="0" hangingPunct="1">
+      <a:defRPr sz="1200" kern="1200">
+        <a:solidFill>
+          <a:schemeClr val="tx1"/>
+        </a:solidFill>
+        <a:latin typeface="+mn-lt"/>
+        <a:ea typeface="+mn-ea"/>
+        <a:cs typeface="+mn-cs"/>
+      </a:defRPr>
+    </a:lvl1pPr>
+    <a:lvl2pPr marL="457200" algn="l" defTabSz="914400" rtl="0" eaLnBrk="1" latinLnBrk="0" hangingPunct="1">
+      <a:defRPr sz="1200" kern="1200">
+        <a:solidFill>
+          <a:schemeClr val="tx1"/>
+        </a:solidFill>
+        <a:latin typeface="+mn-lt"/>
+        <a:ea typeface="+mn-ea"/>
+        <a:cs typeface="+mn-cs"/>
+      </a:defRPr>
+    </a:lvl2pPr>
+    <a:lvl3pPr marL="914400" algn="l" defTabSz="914400" rtl="0" eaLnBrk="1" latinLnBrk="0" hangingPunct="1">
+      <a:defRPr sz="1200" kern="1200">
+        <a:solidFill>
+          <a:schemeClr val="tx1"/>
+        </a:solidFill>
+        <a:latin typeface="+mn-lt"/>
+        <a:ea typeface="+mn-ea"/>
+        <a:cs typeface="+mn-cs"/>
+      </a:defRPr>
+    </a:lvl3pPr>
+    <a:lvl4pPr marL="1371600" algn="l" defTabSz="914400" rtl="0" eaLnBrk="1" latinLnBrk="0" hangingPunct="1">
+      <a:defRPr sz="1200" kern="1200">
+        <a:solidFill>
+          <a:schemeClr val="tx1"/>
+        </a:solidFill>
+        <a:latin typeface="+mn-lt"/>
+        <a:ea typeface="+mn-ea"/>
+        <a:cs typeface="+mn-cs"/>
+      </a:defRPr>
+    </a:lvl4pPr>
+    <a:lvl5pPr marL="1828800" algn="l" defTabSz="914400" rtl="0" eaLnBrk="1" latinLnBrk="0" hangingPunct="1">
+      <a:defRPr sz="1200" kern="1200">
+        <a:solidFill>
+          <a:schemeClr val="tx1"/>
+        </a:solidFill>
+        <a:latin typeface="+mn-lt"/>
+        <a:ea typeface="+mn-ea"/>
+        <a:cs typeface="+mn-cs"/>
+      </a:defRPr>
+    </a:lvl5pPr>
+    <a:lvl6pPr marL="2286000" algn="l" defTabSz="914400" rtl="0" eaLnBrk="1" latinLnBrk="0" hangingPunct="1">
+      <a:defRPr sz="1200" kern="1200">
+        <a:solidFill>
+          <a:schemeClr val="tx1"/>
+        </a:solidFill>
+        <a:latin typeface="+mn-lt"/>
+        <a:ea typeface="+mn-ea"/>
+        <a:cs typeface="+mn-cs"/>
+      </a:defRPr>
+    </a:lvl6pPr>
+    <a:lvl7pPr marL="2743200" algn="l" defTabSz="914400" rtl="0" eaLnBrk="1" latinLnBrk="0" hangingPunct="1">
+      <a:defRPr sz="1200" kern="1200">
+        <a:solidFill>
+          <a:schemeClr val="tx1"/>
+        </a:solidFill>
+        <a:latin typeface="+mn-lt"/>
+        <a:ea typeface="+mn-ea"/>
+        <a:cs typeface="+mn-cs"/>
+      </a:defRPr>
+    </a:lvl7pPr>
+    <a:lvl8pPr marL="3200400" algn="l" defTabSz="914400" rtl="0" eaLnBrk="1" latinLnBrk="0" hangingPunct="1">
+      <a:defRPr sz="1200" kern="1200">
+        <a:solidFill>
+          <a:schemeClr val="tx1"/>
+        </a:solidFill>
+        <a:latin typeface="+mn-lt"/>
+        <a:ea typeface="+mn-ea"/>
+        <a:cs typeface="+mn-cs"/>
+      </a:defRPr>
+    </a:lvl8pPr>
+    <a:lvl9pPr marL="3657600" algn="l" defTabSz="914400" rtl="0" eaLnBrk="1" latinLnBrk="0" hangingPunct="1">
+      <a:defRPr sz="1200" kern="1200">
+        <a:solidFill>
+          <a:schemeClr val="tx1"/>
+        </a:solidFill>
+        <a:latin typeface="+mn-lt"/>
+        <a:ea typeface="+mn-ea"/>
+        <a:cs typeface="+mn-cs"/>
+      </a:defRPr>
+    </a:lvl9pPr>
+  </p:notesStyle>
+</p:notesMaster>
+</file>
+
+<file path=ppt/notesSlides/notesSlide1.xml><?xml version="1.0" encoding="utf-8"?>
+<p:notes xmlns:a="http://schemas.openxmlformats.org/drawingml/2006/main" xmlns:r="http://schemas.openxmlformats.org/officeDocument/2006/relationships" xmlns:p="http://schemas.openxmlformats.org/presentationml/2006/main">
+  <p:cSld>
+    <p:spTree>
+      <p:nvGrpSpPr>
+        <p:cNvPr id="1" name=""/>
+        <p:cNvGrpSpPr/>
+        <p:nvPr/>
+      </p:nvGrpSpPr>
+      <p:grpSpPr>
+        <a:xfrm>
+          <a:off x="0" y="0"/>
+          <a:ext cx="0" cy="0"/>
+          <a:chOff x="0" y="0"/>
+          <a:chExt cx="0" cy="0"/>
+        </a:xfrm>
+      </p:grpSpPr>
+      <p:sp>
+        <p:nvSpPr>
+          <p:cNvPr id="2" name="投影片影像版面配置區 1"/>
+          <p:cNvSpPr>
+            <a:spLocks noGrp="1" noRot="1" noChangeAspect="1"/>
+          </p:cNvSpPr>
+          <p:nvPr>
+            <p:ph type="sldImg"/>
+          </p:nvPr>
+        </p:nvSpPr>
+        <p:spPr/>
+      </p:sp>
+      <p:sp>
+        <p:nvSpPr>
+          <p:cNvPr id="3" name="備忘稿版面配置區 2"/>
+          <p:cNvSpPr>
+            <a:spLocks noGrp="1"/>
+          </p:cNvSpPr>
+          <p:nvPr>
+            <p:ph type="body" idx="1"/>
+          </p:nvPr>
+        </p:nvSpPr>
+        <p:spPr/>
+        <p:txBody>
+          <a:bodyPr/>
+          <a:lstStyle/>
+          <a:p>
+            <a:endParaRPr lang="zh-TW" altLang="en-US" dirty="0"/>
+          </a:p>
+        </p:txBody>
+      </p:sp>
+      <p:sp>
+        <p:nvSpPr>
+          <p:cNvPr id="4" name="投影片編號版面配置區 3"/>
+          <p:cNvSpPr>
+            <a:spLocks noGrp="1"/>
+          </p:cNvSpPr>
+          <p:nvPr>
+            <p:ph type="sldNum" sz="quarter" idx="5"/>
+          </p:nvPr>
+        </p:nvSpPr>
+        <p:spPr/>
+        <p:txBody>
+          <a:bodyPr/>
+          <a:lstStyle/>
+          <a:p>
+            <a:fld id="{005DCC72-CBA4-423D-B8F5-4EF2030FF5C1}" type="slidenum">
+              <a:rPr lang="zh-TW" altLang="en-US" smtClean="0"/>
+              <a:t>10</a:t>
+            </a:fld>
+            <a:endParaRPr lang="zh-TW" altLang="en-US"/>
+          </a:p>
+        </p:txBody>
+      </p:sp>
+    </p:spTree>
+    <p:extLst>
+      <p:ext uri="{BB962C8B-B14F-4D97-AF65-F5344CB8AC3E}">
+        <p14:creationId xmlns:p14="http://schemas.microsoft.com/office/powerpoint/2010/main" val="840026239"/>
+      </p:ext>
+    </p:extLst>
+  </p:cSld>
+  <p:clrMapOvr>
+    <a:masterClrMapping/>
+  </p:clrMapOvr>
+</p:notes>
+</file>
+
+<file path=ppt/notesSlides/notesSlide2.xml><?xml version="1.0" encoding="utf-8"?>
+<p:notes xmlns:a="http://schemas.openxmlformats.org/drawingml/2006/main" xmlns:r="http://schemas.openxmlformats.org/officeDocument/2006/relationships" xmlns:p="http://schemas.openxmlformats.org/presentationml/2006/main">
+  <p:cSld>
+    <p:spTree>
+      <p:nvGrpSpPr>
+        <p:cNvPr id="1" name="">
+          <a:extLst>
+            <a:ext uri="{FF2B5EF4-FFF2-40B4-BE49-F238E27FC236}">
+              <a16:creationId xmlns:a16="http://schemas.microsoft.com/office/drawing/2014/main" id="{E0E7384D-7971-5D2F-3B26-8EC2BD842ACF}"/>
+            </a:ext>
+          </a:extLst>
+        </p:cNvPr>
+        <p:cNvGrpSpPr/>
+        <p:nvPr/>
+      </p:nvGrpSpPr>
+      <p:grpSpPr>
+        <a:xfrm>
+          <a:off x="0" y="0"/>
+          <a:ext cx="0" cy="0"/>
+          <a:chOff x="0" y="0"/>
+          <a:chExt cx="0" cy="0"/>
+        </a:xfrm>
+      </p:grpSpPr>
+      <p:sp>
+        <p:nvSpPr>
+          <p:cNvPr id="2" name="投影片影像版面配置區 1">
+            <a:extLst>
+              <a:ext uri="{FF2B5EF4-FFF2-40B4-BE49-F238E27FC236}">
+                <a16:creationId xmlns:a16="http://schemas.microsoft.com/office/drawing/2014/main" id="{2F92288D-870E-0E74-EDE5-B5BF4E769A0C}"/>
+              </a:ext>
+            </a:extLst>
+          </p:cNvPr>
+          <p:cNvSpPr>
+            <a:spLocks noGrp="1" noRot="1" noChangeAspect="1"/>
+          </p:cNvSpPr>
+          <p:nvPr>
+            <p:ph type="sldImg"/>
+          </p:nvPr>
+        </p:nvSpPr>
+        <p:spPr/>
+      </p:sp>
+      <p:sp>
+        <p:nvSpPr>
+          <p:cNvPr id="3" name="備忘稿版面配置區 2">
+            <a:extLst>
+              <a:ext uri="{FF2B5EF4-FFF2-40B4-BE49-F238E27FC236}">
+                <a16:creationId xmlns:a16="http://schemas.microsoft.com/office/drawing/2014/main" id="{32A9A7A5-AAAB-3FDA-08D2-D04B091EED68}"/>
+              </a:ext>
+            </a:extLst>
+          </p:cNvPr>
+          <p:cNvSpPr>
+            <a:spLocks noGrp="1"/>
+          </p:cNvSpPr>
+          <p:nvPr>
+            <p:ph type="body" idx="1"/>
+          </p:nvPr>
+        </p:nvSpPr>
+        <p:spPr/>
+        <p:txBody>
+          <a:bodyPr/>
+          <a:lstStyle/>
+          <a:p>
+            <a:endParaRPr lang="zh-TW" altLang="en-US" dirty="0"/>
+          </a:p>
+        </p:txBody>
+      </p:sp>
+      <p:sp>
+        <p:nvSpPr>
+          <p:cNvPr id="4" name="投影片編號版面配置區 3">
+            <a:extLst>
+              <a:ext uri="{FF2B5EF4-FFF2-40B4-BE49-F238E27FC236}">
+                <a16:creationId xmlns:a16="http://schemas.microsoft.com/office/drawing/2014/main" id="{9B36234E-1D4E-E3ED-26DE-60C18BB89C1C}"/>
+              </a:ext>
+            </a:extLst>
+          </p:cNvPr>
+          <p:cNvSpPr>
+            <a:spLocks noGrp="1"/>
+          </p:cNvSpPr>
+          <p:nvPr>
+            <p:ph type="sldNum" sz="quarter" idx="5"/>
+          </p:nvPr>
+        </p:nvSpPr>
+        <p:spPr/>
+        <p:txBody>
+          <a:bodyPr/>
+          <a:lstStyle/>
+          <a:p>
+            <a:fld id="{005DCC72-CBA4-423D-B8F5-4EF2030FF5C1}" type="slidenum">
+              <a:rPr lang="zh-TW" altLang="en-US" smtClean="0"/>
+              <a:t>11</a:t>
+            </a:fld>
+            <a:endParaRPr lang="zh-TW" altLang="en-US"/>
+          </a:p>
+        </p:txBody>
+      </p:sp>
+    </p:spTree>
+    <p:extLst>
+      <p:ext uri="{BB962C8B-B14F-4D97-AF65-F5344CB8AC3E}">
+        <p14:creationId xmlns:p14="http://schemas.microsoft.com/office/powerpoint/2010/main" val="496434292"/>
+      </p:ext>
+    </p:extLst>
+  </p:cSld>
+  <p:clrMapOvr>
+    <a:masterClrMapping/>
+  </p:clrMapOvr>
+</p:notes>
+</file>
+
+<file path=ppt/notesSlides/notesSlide3.xml><?xml version="1.0" encoding="utf-8"?>
+<p:notes xmlns:a="http://schemas.openxmlformats.org/drawingml/2006/main" xmlns:r="http://schemas.openxmlformats.org/officeDocument/2006/relationships" xmlns:p="http://schemas.openxmlformats.org/presentationml/2006/main">
+  <p:cSld>
+    <p:spTree>
+      <p:nvGrpSpPr>
+        <p:cNvPr id="1" name="">
+          <a:extLst>
+            <a:ext uri="{FF2B5EF4-FFF2-40B4-BE49-F238E27FC236}">
+              <a16:creationId xmlns:a16="http://schemas.microsoft.com/office/drawing/2014/main" id="{D6906B6D-9F07-8416-36B8-8E7992951D5C}"/>
+            </a:ext>
+          </a:extLst>
+        </p:cNvPr>
+        <p:cNvGrpSpPr/>
+        <p:nvPr/>
+      </p:nvGrpSpPr>
+      <p:grpSpPr>
+        <a:xfrm>
+          <a:off x="0" y="0"/>
+          <a:ext cx="0" cy="0"/>
+          <a:chOff x="0" y="0"/>
+          <a:chExt cx="0" cy="0"/>
+        </a:xfrm>
+      </p:grpSpPr>
+      <p:sp>
+        <p:nvSpPr>
+          <p:cNvPr id="2" name="投影片影像版面配置區 1">
+            <a:extLst>
+              <a:ext uri="{FF2B5EF4-FFF2-40B4-BE49-F238E27FC236}">
+                <a16:creationId xmlns:a16="http://schemas.microsoft.com/office/drawing/2014/main" id="{AEABF2D0-22B8-E884-AD1E-C8E3D10991CF}"/>
+              </a:ext>
+            </a:extLst>
+          </p:cNvPr>
+          <p:cNvSpPr>
+            <a:spLocks noGrp="1" noRot="1" noChangeAspect="1"/>
+          </p:cNvSpPr>
+          <p:nvPr>
+            <p:ph type="sldImg"/>
+          </p:nvPr>
+        </p:nvSpPr>
+        <p:spPr/>
+      </p:sp>
+      <p:sp>
+        <p:nvSpPr>
+          <p:cNvPr id="3" name="備忘稿版面配置區 2">
+            <a:extLst>
+              <a:ext uri="{FF2B5EF4-FFF2-40B4-BE49-F238E27FC236}">
+                <a16:creationId xmlns:a16="http://schemas.microsoft.com/office/drawing/2014/main" id="{7FC85800-62F5-CB01-DB4F-FEFADE6B1846}"/>
+              </a:ext>
+            </a:extLst>
+          </p:cNvPr>
+          <p:cNvSpPr>
+            <a:spLocks noGrp="1"/>
+          </p:cNvSpPr>
+          <p:nvPr>
+            <p:ph type="body" idx="1"/>
+          </p:nvPr>
+        </p:nvSpPr>
+        <p:spPr/>
+        <p:txBody>
+          <a:bodyPr/>
+          <a:lstStyle/>
+          <a:p>
+            <a:endParaRPr lang="zh-TW" altLang="en-US" dirty="0"/>
+          </a:p>
+        </p:txBody>
+      </p:sp>
+      <p:sp>
+        <p:nvSpPr>
+          <p:cNvPr id="4" name="投影片編號版面配置區 3">
+            <a:extLst>
+              <a:ext uri="{FF2B5EF4-FFF2-40B4-BE49-F238E27FC236}">
+                <a16:creationId xmlns:a16="http://schemas.microsoft.com/office/drawing/2014/main" id="{15CD78DD-F14C-8DA0-B0F0-C303E4110603}"/>
+              </a:ext>
+            </a:extLst>
+          </p:cNvPr>
+          <p:cNvSpPr>
+            <a:spLocks noGrp="1"/>
+          </p:cNvSpPr>
+          <p:nvPr>
+            <p:ph type="sldNum" sz="quarter" idx="5"/>
+          </p:nvPr>
+        </p:nvSpPr>
+        <p:spPr/>
+        <p:txBody>
+          <a:bodyPr/>
+          <a:lstStyle/>
+          <a:p>
+            <a:fld id="{005DCC72-CBA4-423D-B8F5-4EF2030FF5C1}" type="slidenum">
+              <a:rPr lang="zh-TW" altLang="en-US" smtClean="0"/>
+              <a:t>12</a:t>
+            </a:fld>
+            <a:endParaRPr lang="zh-TW" altLang="en-US"/>
+          </a:p>
+        </p:txBody>
+      </p:sp>
+    </p:spTree>
+    <p:extLst>
+      <p:ext uri="{BB962C8B-B14F-4D97-AF65-F5344CB8AC3E}">
+        <p14:creationId xmlns:p14="http://schemas.microsoft.com/office/powerpoint/2010/main" val="1734481847"/>
+      </p:ext>
+    </p:extLst>
+  </p:cSld>
+  <p:clrMapOvr>
+    <a:masterClrMapping/>
+  </p:clrMapOvr>
+</p:notes>
+</file>
+
+<file path=ppt/notesSlides/notesSlide4.xml><?xml version="1.0" encoding="utf-8"?>
+<p:notes xmlns:a="http://schemas.openxmlformats.org/drawingml/2006/main" xmlns:r="http://schemas.openxmlformats.org/officeDocument/2006/relationships" xmlns:p="http://schemas.openxmlformats.org/presentationml/2006/main">
+  <p:cSld>
+    <p:spTree>
+      <p:nvGrpSpPr>
+        <p:cNvPr id="1" name="">
+          <a:extLst>
+            <a:ext uri="{FF2B5EF4-FFF2-40B4-BE49-F238E27FC236}">
+              <a16:creationId xmlns:a16="http://schemas.microsoft.com/office/drawing/2014/main" id="{20523448-874C-5766-377F-2E0F7EAEBF55}"/>
+            </a:ext>
+          </a:extLst>
+        </p:cNvPr>
+        <p:cNvGrpSpPr/>
+        <p:nvPr/>
+      </p:nvGrpSpPr>
+      <p:grpSpPr>
+        <a:xfrm>
+          <a:off x="0" y="0"/>
+          <a:ext cx="0" cy="0"/>
+          <a:chOff x="0" y="0"/>
+          <a:chExt cx="0" cy="0"/>
+        </a:xfrm>
+      </p:grpSpPr>
+      <p:sp>
+        <p:nvSpPr>
+          <p:cNvPr id="2" name="投影片影像版面配置區 1">
+            <a:extLst>
+              <a:ext uri="{FF2B5EF4-FFF2-40B4-BE49-F238E27FC236}">
+                <a16:creationId xmlns:a16="http://schemas.microsoft.com/office/drawing/2014/main" id="{BF16A64C-082C-7F2B-36D5-A055CF000DDD}"/>
+              </a:ext>
+            </a:extLst>
+          </p:cNvPr>
+          <p:cNvSpPr>
+            <a:spLocks noGrp="1" noRot="1" noChangeAspect="1"/>
+          </p:cNvSpPr>
+          <p:nvPr>
+            <p:ph type="sldImg"/>
+          </p:nvPr>
+        </p:nvSpPr>
+        <p:spPr/>
+      </p:sp>
+      <p:sp>
+        <p:nvSpPr>
+          <p:cNvPr id="3" name="備忘稿版面配置區 2">
+            <a:extLst>
+              <a:ext uri="{FF2B5EF4-FFF2-40B4-BE49-F238E27FC236}">
+                <a16:creationId xmlns:a16="http://schemas.microsoft.com/office/drawing/2014/main" id="{49C12FEA-DB60-482E-0D2D-5E85108B8BF2}"/>
+              </a:ext>
+            </a:extLst>
+          </p:cNvPr>
+          <p:cNvSpPr>
+            <a:spLocks noGrp="1"/>
+          </p:cNvSpPr>
+          <p:nvPr>
+            <p:ph type="body" idx="1"/>
+          </p:nvPr>
+        </p:nvSpPr>
+        <p:spPr/>
+        <p:txBody>
+          <a:bodyPr/>
+          <a:lstStyle/>
+          <a:p>
+            <a:endParaRPr lang="zh-TW" altLang="en-US" dirty="0"/>
+          </a:p>
+        </p:txBody>
+      </p:sp>
+      <p:sp>
+        <p:nvSpPr>
+          <p:cNvPr id="4" name="投影片編號版面配置區 3">
+            <a:extLst>
+              <a:ext uri="{FF2B5EF4-FFF2-40B4-BE49-F238E27FC236}">
+                <a16:creationId xmlns:a16="http://schemas.microsoft.com/office/drawing/2014/main" id="{8DFDE2ED-3627-FE08-E6A7-E0EB48525BBC}"/>
+              </a:ext>
+            </a:extLst>
+          </p:cNvPr>
+          <p:cNvSpPr>
+            <a:spLocks noGrp="1"/>
+          </p:cNvSpPr>
+          <p:nvPr>
+            <p:ph type="sldNum" sz="quarter" idx="5"/>
+          </p:nvPr>
+        </p:nvSpPr>
+        <p:spPr/>
+        <p:txBody>
+          <a:bodyPr/>
+          <a:lstStyle/>
+          <a:p>
+            <a:fld id="{005DCC72-CBA4-423D-B8F5-4EF2030FF5C1}" type="slidenum">
+              <a:rPr lang="zh-TW" altLang="en-US" smtClean="0"/>
+              <a:t>13</a:t>
+            </a:fld>
+            <a:endParaRPr lang="zh-TW" altLang="en-US"/>
+          </a:p>
+        </p:txBody>
+      </p:sp>
+    </p:spTree>
+    <p:extLst>
+      <p:ext uri="{BB962C8B-B14F-4D97-AF65-F5344CB8AC3E}">
+        <p14:creationId xmlns:p14="http://schemas.microsoft.com/office/powerpoint/2010/main" val="1422428311"/>
+      </p:ext>
+    </p:extLst>
+  </p:cSld>
+  <p:clrMapOvr>
+    <a:masterClrMapping/>
+  </p:clrMapOvr>
+</p:notes>
+</file>
+
+<file path=ppt/notesSlides/notesSlide5.xml><?xml version="1.0" encoding="utf-8"?>
+<p:notes xmlns:a="http://schemas.openxmlformats.org/drawingml/2006/main" xmlns:r="http://schemas.openxmlformats.org/officeDocument/2006/relationships" xmlns:p="http://schemas.openxmlformats.org/presentationml/2006/main">
+  <p:cSld>
+    <p:spTree>
+      <p:nvGrpSpPr>
+        <p:cNvPr id="1" name="">
+          <a:extLst>
+            <a:ext uri="{FF2B5EF4-FFF2-40B4-BE49-F238E27FC236}">
+              <a16:creationId xmlns:a16="http://schemas.microsoft.com/office/drawing/2014/main" id="{19184B2C-CAF0-1456-6D0A-17D768F08564}"/>
+            </a:ext>
+          </a:extLst>
+        </p:cNvPr>
+        <p:cNvGrpSpPr/>
+        <p:nvPr/>
+      </p:nvGrpSpPr>
+      <p:grpSpPr>
+        <a:xfrm>
+          <a:off x="0" y="0"/>
+          <a:ext cx="0" cy="0"/>
+          <a:chOff x="0" y="0"/>
+          <a:chExt cx="0" cy="0"/>
+        </a:xfrm>
+      </p:grpSpPr>
+      <p:sp>
+        <p:nvSpPr>
+          <p:cNvPr id="2" name="投影片影像版面配置區 1">
+            <a:extLst>
+              <a:ext uri="{FF2B5EF4-FFF2-40B4-BE49-F238E27FC236}">
+                <a16:creationId xmlns:a16="http://schemas.microsoft.com/office/drawing/2014/main" id="{742B5C7F-9D75-F349-CF18-9E4C558E1155}"/>
+              </a:ext>
+            </a:extLst>
+          </p:cNvPr>
+          <p:cNvSpPr>
+            <a:spLocks noGrp="1" noRot="1" noChangeAspect="1"/>
+          </p:cNvSpPr>
+          <p:nvPr>
+            <p:ph type="sldImg"/>
+          </p:nvPr>
+        </p:nvSpPr>
+        <p:spPr/>
+      </p:sp>
+      <p:sp>
+        <p:nvSpPr>
+          <p:cNvPr id="3" name="備忘稿版面配置區 2">
+            <a:extLst>
+              <a:ext uri="{FF2B5EF4-FFF2-40B4-BE49-F238E27FC236}">
+                <a16:creationId xmlns:a16="http://schemas.microsoft.com/office/drawing/2014/main" id="{F018447F-4401-3356-0A51-4E986F5D1A38}"/>
+              </a:ext>
+            </a:extLst>
+          </p:cNvPr>
+          <p:cNvSpPr>
+            <a:spLocks noGrp="1"/>
+          </p:cNvSpPr>
+          <p:nvPr>
+            <p:ph type="body" idx="1"/>
+          </p:nvPr>
+        </p:nvSpPr>
+        <p:spPr/>
+        <p:txBody>
+          <a:bodyPr/>
+          <a:lstStyle/>
+          <a:p>
+            <a:endParaRPr lang="zh-TW" altLang="en-US" dirty="0"/>
+          </a:p>
+        </p:txBody>
+      </p:sp>
+      <p:sp>
+        <p:nvSpPr>
+          <p:cNvPr id="4" name="投影片編號版面配置區 3">
+            <a:extLst>
+              <a:ext uri="{FF2B5EF4-FFF2-40B4-BE49-F238E27FC236}">
+                <a16:creationId xmlns:a16="http://schemas.microsoft.com/office/drawing/2014/main" id="{0B707E01-47FF-93BA-EA0E-4082A181448D}"/>
+              </a:ext>
+            </a:extLst>
+          </p:cNvPr>
+          <p:cNvSpPr>
+            <a:spLocks noGrp="1"/>
+          </p:cNvSpPr>
+          <p:nvPr>
+            <p:ph type="sldNum" sz="quarter" idx="5"/>
+          </p:nvPr>
+        </p:nvSpPr>
+        <p:spPr/>
+        <p:txBody>
+          <a:bodyPr/>
+          <a:lstStyle/>
+          <a:p>
+            <a:fld id="{005DCC72-CBA4-423D-B8F5-4EF2030FF5C1}" type="slidenum">
+              <a:rPr lang="zh-TW" altLang="en-US" smtClean="0"/>
+              <a:t>14</a:t>
+            </a:fld>
+            <a:endParaRPr lang="zh-TW" altLang="en-US"/>
+          </a:p>
+        </p:txBody>
+      </p:sp>
+    </p:spTree>
+    <p:extLst>
+      <p:ext uri="{BB962C8B-B14F-4D97-AF65-F5344CB8AC3E}">
+        <p14:creationId xmlns:p14="http://schemas.microsoft.com/office/powerpoint/2010/main" val="1245441686"/>
+      </p:ext>
+    </p:extLst>
+  </p:cSld>
+  <p:clrMapOvr>
+    <a:masterClrMapping/>
+  </p:clrMapOvr>
+</p:notes>
+</file>
+
+<file path=ppt/notesSlides/notesSlide6.xml><?xml version="1.0" encoding="utf-8"?>
+<p:notes xmlns:a="http://schemas.openxmlformats.org/drawingml/2006/main" xmlns:r="http://schemas.openxmlformats.org/officeDocument/2006/relationships" xmlns:p="http://schemas.openxmlformats.org/presentationml/2006/main">
+  <p:cSld>
+    <p:spTree>
+      <p:nvGrpSpPr>
+        <p:cNvPr id="1" name="">
+          <a:extLst>
+            <a:ext uri="{FF2B5EF4-FFF2-40B4-BE49-F238E27FC236}">
+              <a16:creationId xmlns:a16="http://schemas.microsoft.com/office/drawing/2014/main" id="{E50D5260-D7B3-01DD-56E9-ACD3391CE939}"/>
+            </a:ext>
+          </a:extLst>
+        </p:cNvPr>
+        <p:cNvGrpSpPr/>
+        <p:nvPr/>
+      </p:nvGrpSpPr>
+      <p:grpSpPr>
+        <a:xfrm>
+          <a:off x="0" y="0"/>
+          <a:ext cx="0" cy="0"/>
+          <a:chOff x="0" y="0"/>
+          <a:chExt cx="0" cy="0"/>
+        </a:xfrm>
+      </p:grpSpPr>
+      <p:sp>
+        <p:nvSpPr>
+          <p:cNvPr id="2" name="投影片影像版面配置區 1">
+            <a:extLst>
+              <a:ext uri="{FF2B5EF4-FFF2-40B4-BE49-F238E27FC236}">
+                <a16:creationId xmlns:a16="http://schemas.microsoft.com/office/drawing/2014/main" id="{3A6450C8-B765-14D9-1F80-8A5C7F48D376}"/>
+              </a:ext>
+            </a:extLst>
+          </p:cNvPr>
+          <p:cNvSpPr>
+            <a:spLocks noGrp="1" noRot="1" noChangeAspect="1"/>
+          </p:cNvSpPr>
+          <p:nvPr>
+            <p:ph type="sldImg"/>
+          </p:nvPr>
+        </p:nvSpPr>
+        <p:spPr/>
+      </p:sp>
+      <p:sp>
+        <p:nvSpPr>
+          <p:cNvPr id="3" name="備忘稿版面配置區 2">
+            <a:extLst>
+              <a:ext uri="{FF2B5EF4-FFF2-40B4-BE49-F238E27FC236}">
+                <a16:creationId xmlns:a16="http://schemas.microsoft.com/office/drawing/2014/main" id="{6E6CBEBA-64FB-B9C8-544F-7490F7DF51EB}"/>
+              </a:ext>
+            </a:extLst>
+          </p:cNvPr>
+          <p:cNvSpPr>
+            <a:spLocks noGrp="1"/>
+          </p:cNvSpPr>
+          <p:nvPr>
+            <p:ph type="body" idx="1"/>
+          </p:nvPr>
+        </p:nvSpPr>
+        <p:spPr/>
+        <p:txBody>
+          <a:bodyPr/>
+          <a:lstStyle/>
+          <a:p>
+            <a:endParaRPr lang="zh-TW" altLang="en-US" dirty="0"/>
+          </a:p>
+        </p:txBody>
+      </p:sp>
+      <p:sp>
+        <p:nvSpPr>
+          <p:cNvPr id="4" name="投影片編號版面配置區 3">
+            <a:extLst>
+              <a:ext uri="{FF2B5EF4-FFF2-40B4-BE49-F238E27FC236}">
+                <a16:creationId xmlns:a16="http://schemas.microsoft.com/office/drawing/2014/main" id="{B62D8C39-318C-3656-958F-392F83EF5C8F}"/>
+              </a:ext>
+            </a:extLst>
+          </p:cNvPr>
+          <p:cNvSpPr>
+            <a:spLocks noGrp="1"/>
+          </p:cNvSpPr>
+          <p:nvPr>
+            <p:ph type="sldNum" sz="quarter" idx="5"/>
+          </p:nvPr>
+        </p:nvSpPr>
+        <p:spPr/>
+        <p:txBody>
+          <a:bodyPr/>
+          <a:lstStyle/>
+          <a:p>
+            <a:fld id="{005DCC72-CBA4-423D-B8F5-4EF2030FF5C1}" type="slidenum">
+              <a:rPr lang="zh-TW" altLang="en-US" smtClean="0"/>
+              <a:t>15</a:t>
+            </a:fld>
+            <a:endParaRPr lang="zh-TW" altLang="en-US"/>
+          </a:p>
+        </p:txBody>
+      </p:sp>
+    </p:spTree>
+    <p:extLst>
+      <p:ext uri="{BB962C8B-B14F-4D97-AF65-F5344CB8AC3E}">
+        <p14:creationId xmlns:p14="http://schemas.microsoft.com/office/powerpoint/2010/main" val="710619753"/>
+      </p:ext>
+    </p:extLst>
+  </p:cSld>
+  <p:clrMapOvr>
+    <a:masterClrMapping/>
+  </p:clrMapOvr>
+</p:notes>
+</file>
+
 <file path=ppt/slideLayouts/slideLayout1.xml><?xml version="1.0" encoding="utf-8"?>
 <p:sldLayout xmlns:a="http://schemas.openxmlformats.org/drawingml/2006/main" xmlns:r="http://schemas.openxmlformats.org/officeDocument/2006/relationships" xmlns:p="http://schemas.openxmlformats.org/presentationml/2006/main" type="title" preserve="1">
   <p:cSld name="標題投影片">
@@ -266,7 +1249,7 @@
           <a:p>
             <a:fld id="{0F32A204-0AD4-466F-ABEA-B4DB33A37E21}" type="datetimeFigureOut">
               <a:rPr lang="zh-TW" altLang="en-US" smtClean="0"/>
-              <a:t>2025/4/30</a:t>
+              <a:t>2025/5/1</a:t>
             </a:fld>
             <a:endParaRPr lang="zh-TW" altLang="en-US"/>
           </a:p>
@@ -464,7 +1447,7 @@
           <a:p>
             <a:fld id="{0F32A204-0AD4-466F-ABEA-B4DB33A37E21}" type="datetimeFigureOut">
               <a:rPr lang="zh-TW" altLang="en-US" smtClean="0"/>
-              <a:t>2025/4/30</a:t>
+              <a:t>2025/5/1</a:t>
             </a:fld>
             <a:endParaRPr lang="zh-TW" altLang="en-US"/>
           </a:p>
@@ -672,7 +1655,7 @@
           <a:p>
             <a:fld id="{0F32A204-0AD4-466F-ABEA-B4DB33A37E21}" type="datetimeFigureOut">
               <a:rPr lang="zh-TW" altLang="en-US" smtClean="0"/>
-              <a:t>2025/4/30</a:t>
+              <a:t>2025/5/1</a:t>
             </a:fld>
             <a:endParaRPr lang="zh-TW" altLang="en-US"/>
           </a:p>
@@ -870,7 +1853,7 @@
           <a:p>
             <a:fld id="{0F32A204-0AD4-466F-ABEA-B4DB33A37E21}" type="datetimeFigureOut">
               <a:rPr lang="zh-TW" altLang="en-US" smtClean="0"/>
-              <a:t>2025/4/30</a:t>
+              <a:t>2025/5/1</a:t>
             </a:fld>
             <a:endParaRPr lang="zh-TW" altLang="en-US"/>
           </a:p>
@@ -1145,7 +2128,7 @@
           <a:p>
             <a:fld id="{0F32A204-0AD4-466F-ABEA-B4DB33A37E21}" type="datetimeFigureOut">
               <a:rPr lang="zh-TW" altLang="en-US" smtClean="0"/>
-              <a:t>2025/4/30</a:t>
+              <a:t>2025/5/1</a:t>
             </a:fld>
             <a:endParaRPr lang="zh-TW" altLang="en-US"/>
           </a:p>
@@ -1410,7 +2393,7 @@
           <a:p>
             <a:fld id="{0F32A204-0AD4-466F-ABEA-B4DB33A37E21}" type="datetimeFigureOut">
               <a:rPr lang="zh-TW" altLang="en-US" smtClean="0"/>
-              <a:t>2025/4/30</a:t>
+              <a:t>2025/5/1</a:t>
             </a:fld>
             <a:endParaRPr lang="zh-TW" altLang="en-US"/>
           </a:p>
@@ -1822,7 +2805,7 @@
           <a:p>
             <a:fld id="{0F32A204-0AD4-466F-ABEA-B4DB33A37E21}" type="datetimeFigureOut">
               <a:rPr lang="zh-TW" altLang="en-US" smtClean="0"/>
-              <a:t>2025/4/30</a:t>
+              <a:t>2025/5/1</a:t>
             </a:fld>
             <a:endParaRPr lang="zh-TW" altLang="en-US"/>
           </a:p>
@@ -1963,7 +2946,7 @@
           <a:p>
             <a:fld id="{0F32A204-0AD4-466F-ABEA-B4DB33A37E21}" type="datetimeFigureOut">
               <a:rPr lang="zh-TW" altLang="en-US" smtClean="0"/>
-              <a:t>2025/4/30</a:t>
+              <a:t>2025/5/1</a:t>
             </a:fld>
             <a:endParaRPr lang="zh-TW" altLang="en-US"/>
           </a:p>
@@ -2076,7 +3059,7 @@
           <a:p>
             <a:fld id="{0F32A204-0AD4-466F-ABEA-B4DB33A37E21}" type="datetimeFigureOut">
               <a:rPr lang="zh-TW" altLang="en-US" smtClean="0"/>
-              <a:t>2025/4/30</a:t>
+              <a:t>2025/5/1</a:t>
             </a:fld>
             <a:endParaRPr lang="zh-TW" altLang="en-US"/>
           </a:p>
@@ -2387,7 +3370,7 @@
           <a:p>
             <a:fld id="{0F32A204-0AD4-466F-ABEA-B4DB33A37E21}" type="datetimeFigureOut">
               <a:rPr lang="zh-TW" altLang="en-US" smtClean="0"/>
-              <a:t>2025/4/30</a:t>
+              <a:t>2025/5/1</a:t>
             </a:fld>
             <a:endParaRPr lang="zh-TW" altLang="en-US"/>
           </a:p>
@@ -2675,7 +3658,7 @@
           <a:p>
             <a:fld id="{0F32A204-0AD4-466F-ABEA-B4DB33A37E21}" type="datetimeFigureOut">
               <a:rPr lang="zh-TW" altLang="en-US" smtClean="0"/>
-              <a:t>2025/4/30</a:t>
+              <a:t>2025/5/1</a:t>
             </a:fld>
             <a:endParaRPr lang="zh-TW" altLang="en-US"/>
           </a:p>
@@ -2916,7 +3899,7 @@
           <a:p>
             <a:fld id="{0F32A204-0AD4-466F-ABEA-B4DB33A37E21}" type="datetimeFigureOut">
               <a:rPr lang="zh-TW" altLang="en-US" smtClean="0"/>
-              <a:t>2025/4/30</a:t>
+              <a:t>2025/5/1</a:t>
             </a:fld>
             <a:endParaRPr lang="zh-TW" altLang="en-US"/>
           </a:p>
@@ -3400,6 +4383,1818 @@
 </p:sld>
 </file>
 
+<file path=ppt/slides/slide10.xml><?xml version="1.0" encoding="utf-8"?>
+<p:sld xmlns:a="http://schemas.openxmlformats.org/drawingml/2006/main" xmlns:r="http://schemas.openxmlformats.org/officeDocument/2006/relationships" xmlns:p="http://schemas.openxmlformats.org/presentationml/2006/main">
+  <p:cSld>
+    <p:spTree>
+      <p:nvGrpSpPr>
+        <p:cNvPr id="1" name="">
+          <a:extLst>
+            <a:ext uri="{FF2B5EF4-FFF2-40B4-BE49-F238E27FC236}">
+              <a16:creationId xmlns:a16="http://schemas.microsoft.com/office/drawing/2014/main" id="{95EF478F-9514-30F1-6C80-99C115EE104E}"/>
+            </a:ext>
+          </a:extLst>
+        </p:cNvPr>
+        <p:cNvGrpSpPr/>
+        <p:nvPr/>
+      </p:nvGrpSpPr>
+      <p:grpSpPr>
+        <a:xfrm>
+          <a:off x="0" y="0"/>
+          <a:ext cx="0" cy="0"/>
+          <a:chOff x="0" y="0"/>
+          <a:chExt cx="0" cy="0"/>
+        </a:xfrm>
+      </p:grpSpPr>
+      <p:sp>
+        <p:nvSpPr>
+          <p:cNvPr id="2" name="標題 1">
+            <a:extLst>
+              <a:ext uri="{FF2B5EF4-FFF2-40B4-BE49-F238E27FC236}">
+                <a16:creationId xmlns:a16="http://schemas.microsoft.com/office/drawing/2014/main" id="{C2A6B20D-F987-9EDA-6590-3B79FBB99EE3}"/>
+              </a:ext>
+            </a:extLst>
+          </p:cNvPr>
+          <p:cNvSpPr>
+            <a:spLocks noGrp="1"/>
+          </p:cNvSpPr>
+          <p:nvPr>
+            <p:ph type="title"/>
+          </p:nvPr>
+        </p:nvSpPr>
+        <p:spPr/>
+        <p:txBody>
+          <a:bodyPr/>
+          <a:lstStyle/>
+          <a:p>
+            <a:r>
+              <a:rPr lang="en-US" altLang="zh-TW" dirty="0"/>
+              <a:t>Env</a:t>
+            </a:r>
+            <a:r>
+              <a:rPr lang="zh-TW" altLang="en-US" dirty="0"/>
+              <a:t> </a:t>
+            </a:r>
+            <a:r>
+              <a:rPr lang="en-US" altLang="zh-TW" dirty="0"/>
+              <a:t>(3/)</a:t>
+            </a:r>
+            <a:endParaRPr lang="zh-TW" altLang="en-US" dirty="0"/>
+          </a:p>
+        </p:txBody>
+      </p:sp>
+      <p:sp>
+        <p:nvSpPr>
+          <p:cNvPr id="3" name="內容版面配置區 2">
+            <a:extLst>
+              <a:ext uri="{FF2B5EF4-FFF2-40B4-BE49-F238E27FC236}">
+                <a16:creationId xmlns:a16="http://schemas.microsoft.com/office/drawing/2014/main" id="{9A88DC69-C9BC-B68D-9515-83944798972C}"/>
+              </a:ext>
+            </a:extLst>
+          </p:cNvPr>
+          <p:cNvSpPr>
+            <a:spLocks noGrp="1"/>
+          </p:cNvSpPr>
+          <p:nvPr>
+            <p:ph idx="1"/>
+          </p:nvPr>
+        </p:nvSpPr>
+        <p:spPr/>
+        <p:txBody>
+          <a:bodyPr>
+            <a:normAutofit lnSpcReduction="10000"/>
+          </a:bodyPr>
+          <a:lstStyle/>
+          <a:p>
+            <a:pPr algn="l"/>
+            <a:r>
+              <a:rPr lang="zh-TW" altLang="en-US" dirty="0">
+                <a:latin typeface="標楷體" panose="03000509000000000000" pitchFamily="65" charset="-120"/>
+                <a:ea typeface="標楷體" panose="03000509000000000000" pitchFamily="65" charset="-120"/>
+              </a:rPr>
+              <a:t>由於在 </a:t>
+            </a:r>
+            <a:r>
+              <a:rPr lang="en-US" altLang="zh-TW" dirty="0" err="1">
+                <a:latin typeface="標楷體" panose="03000509000000000000" pitchFamily="65" charset="-120"/>
+                <a:ea typeface="標楷體" panose="03000509000000000000" pitchFamily="65" charset="-120"/>
+              </a:rPr>
+              <a:t>top_tb</a:t>
+            </a:r>
+            <a:r>
+              <a:rPr lang="en-US" altLang="zh-TW" dirty="0">
+                <a:latin typeface="標楷體" panose="03000509000000000000" pitchFamily="65" charset="-120"/>
+                <a:ea typeface="標楷體" panose="03000509000000000000" pitchFamily="65" charset="-120"/>
+              </a:rPr>
+              <a:t> </a:t>
+            </a:r>
+            <a:r>
+              <a:rPr lang="zh-TW" altLang="en-US" dirty="0">
+                <a:latin typeface="標楷體" panose="03000509000000000000" pitchFamily="65" charset="-120"/>
+                <a:ea typeface="標楷體" panose="03000509000000000000" pitchFamily="65" charset="-120"/>
+              </a:rPr>
+              <a:t>中，實例化所有組件 </a:t>
+            </a:r>
+            <a:r>
+              <a:rPr lang="en-US" altLang="zh-TW" dirty="0">
+                <a:latin typeface="標楷體" panose="03000509000000000000" pitchFamily="65" charset="-120"/>
+                <a:ea typeface="標楷體" panose="03000509000000000000" pitchFamily="65" charset="-120"/>
+              </a:rPr>
+              <a:t>(</a:t>
+            </a:r>
+            <a:r>
+              <a:rPr lang="en-US" altLang="zh-CN" dirty="0">
+                <a:latin typeface="標楷體" panose="03000509000000000000" pitchFamily="65" charset="-120"/>
+                <a:ea typeface="標楷體" panose="03000509000000000000" pitchFamily="65" charset="-120"/>
+              </a:rPr>
+              <a:t>driver</a:t>
+            </a:r>
+            <a:r>
+              <a:rPr lang="zh-TW" altLang="en-US" dirty="0">
+                <a:latin typeface="標楷體" panose="03000509000000000000" pitchFamily="65" charset="-120"/>
+                <a:ea typeface="標楷體" panose="03000509000000000000" pitchFamily="65" charset="-120"/>
+              </a:rPr>
+              <a:t>、</a:t>
+            </a:r>
+            <a:r>
+              <a:rPr lang="en-US" altLang="zh-CN" dirty="0">
+                <a:latin typeface="標楷體" panose="03000509000000000000" pitchFamily="65" charset="-120"/>
+                <a:ea typeface="標楷體" panose="03000509000000000000" pitchFamily="65" charset="-120"/>
+              </a:rPr>
+              <a:t> monitor</a:t>
+            </a:r>
+            <a:r>
+              <a:rPr lang="zh-TW" altLang="en-US" dirty="0">
+                <a:latin typeface="標楷體" panose="03000509000000000000" pitchFamily="65" charset="-120"/>
+                <a:ea typeface="標楷體" panose="03000509000000000000" pitchFamily="65" charset="-120"/>
+              </a:rPr>
+              <a:t> </a:t>
+            </a:r>
+            <a:r>
+              <a:rPr lang="en-US" altLang="zh-TW" dirty="0">
+                <a:latin typeface="標楷體" panose="03000509000000000000" pitchFamily="65" charset="-120"/>
+                <a:ea typeface="標楷體" panose="03000509000000000000" pitchFamily="65" charset="-120"/>
+              </a:rPr>
+              <a:t>…)</a:t>
+            </a:r>
+            <a:r>
+              <a:rPr lang="zh-TW" altLang="en-US" dirty="0">
+                <a:latin typeface="標楷體" panose="03000509000000000000" pitchFamily="65" charset="-120"/>
+                <a:ea typeface="標楷體" panose="03000509000000000000" pitchFamily="65" charset="-120"/>
+              </a:rPr>
+              <a:t>，</a:t>
+            </a:r>
+            <a:br>
+              <a:rPr lang="en-US" altLang="zh-TW" dirty="0">
+                <a:latin typeface="標楷體" panose="03000509000000000000" pitchFamily="65" charset="-120"/>
+                <a:ea typeface="標楷體" panose="03000509000000000000" pitchFamily="65" charset="-120"/>
+              </a:rPr>
+            </a:br>
+            <a:r>
+              <a:rPr lang="zh-TW" altLang="en-US" dirty="0">
+                <a:latin typeface="標楷體" panose="03000509000000000000" pitchFamily="65" charset="-120"/>
+                <a:ea typeface="標楷體" panose="03000509000000000000" pitchFamily="65" charset="-120"/>
+              </a:rPr>
+              <a:t>不是一個有效率的方式</a:t>
+            </a:r>
+            <a:endParaRPr lang="en-US" altLang="zh-TW" dirty="0">
+              <a:latin typeface="標楷體" panose="03000509000000000000" pitchFamily="65" charset="-120"/>
+              <a:ea typeface="標楷體" panose="03000509000000000000" pitchFamily="65" charset="-120"/>
+            </a:endParaRPr>
+          </a:p>
+          <a:p>
+            <a:pPr algn="l"/>
+            <a:endParaRPr lang="en-US" altLang="zh-CN" dirty="0">
+              <a:latin typeface="標楷體" panose="03000509000000000000" pitchFamily="65" charset="-120"/>
+              <a:ea typeface="標楷體" panose="03000509000000000000" pitchFamily="65" charset="-120"/>
+            </a:endParaRPr>
+          </a:p>
+          <a:p>
+            <a:pPr algn="l"/>
+            <a:r>
+              <a:rPr lang="zh-TW" altLang="en-US" dirty="0">
+                <a:latin typeface="標楷體" panose="03000509000000000000" pitchFamily="65" charset="-120"/>
+                <a:ea typeface="標楷體" panose="03000509000000000000" pitchFamily="65" charset="-120"/>
+              </a:rPr>
+              <a:t>所以 </a:t>
+            </a:r>
+            <a:r>
+              <a:rPr lang="en-US" altLang="zh-TW" dirty="0">
+                <a:latin typeface="標楷體" panose="03000509000000000000" pitchFamily="65" charset="-120"/>
+                <a:ea typeface="標楷體" panose="03000509000000000000" pitchFamily="65" charset="-120"/>
+              </a:rPr>
+              <a:t>UVM </a:t>
+            </a:r>
+            <a:r>
+              <a:rPr lang="zh-TW" altLang="en-US" dirty="0">
+                <a:latin typeface="標楷體" panose="03000509000000000000" pitchFamily="65" charset="-120"/>
+                <a:ea typeface="標楷體" panose="03000509000000000000" pitchFamily="65" charset="-120"/>
+              </a:rPr>
+              <a:t>加入 </a:t>
+            </a:r>
+            <a:r>
+              <a:rPr lang="en-US" altLang="zh-TW" dirty="0">
+                <a:latin typeface="標楷體" panose="03000509000000000000" pitchFamily="65" charset="-120"/>
+                <a:ea typeface="標楷體" panose="03000509000000000000" pitchFamily="65" charset="-120"/>
+              </a:rPr>
+              <a:t>Env </a:t>
+            </a:r>
+            <a:r>
+              <a:rPr lang="zh-CN" altLang="en-US" dirty="0">
+                <a:latin typeface="標楷體" panose="03000509000000000000" pitchFamily="65" charset="-120"/>
+                <a:ea typeface="標楷體" panose="03000509000000000000" pitchFamily="65" charset="-120"/>
+              </a:rPr>
+              <a:t>容器類</a:t>
+            </a:r>
+            <a:br>
+              <a:rPr lang="en-US" altLang="zh-CN" dirty="0">
+                <a:latin typeface="標楷體" panose="03000509000000000000" pitchFamily="65" charset="-120"/>
+                <a:ea typeface="標楷體" panose="03000509000000000000" pitchFamily="65" charset="-120"/>
+              </a:rPr>
+            </a:br>
+            <a:r>
+              <a:rPr lang="zh-TW" altLang="en-US" dirty="0">
+                <a:latin typeface="標楷體" panose="03000509000000000000" pitchFamily="65" charset="-120"/>
+                <a:ea typeface="標楷體" panose="03000509000000000000" pitchFamily="65" charset="-120"/>
+              </a:rPr>
+              <a:t>在 </a:t>
+            </a:r>
+            <a:r>
+              <a:rPr lang="en-US" altLang="zh-TW" dirty="0">
+                <a:latin typeface="標楷體" panose="03000509000000000000" pitchFamily="65" charset="-120"/>
+                <a:ea typeface="標楷體" panose="03000509000000000000" pitchFamily="65" charset="-120"/>
+              </a:rPr>
+              <a:t>Env</a:t>
+            </a:r>
+            <a:r>
+              <a:rPr lang="zh-TW" altLang="en-US" dirty="0">
+                <a:latin typeface="標楷體" panose="03000509000000000000" pitchFamily="65" charset="-120"/>
+                <a:ea typeface="標楷體" panose="03000509000000000000" pitchFamily="65" charset="-120"/>
+              </a:rPr>
+              <a:t> </a:t>
+            </a:r>
+            <a:r>
+              <a:rPr lang="zh-CN" altLang="en-US" dirty="0">
+                <a:latin typeface="標楷體" panose="03000509000000000000" pitchFamily="65" charset="-120"/>
+                <a:ea typeface="標楷體" panose="03000509000000000000" pitchFamily="65" charset="-120"/>
+              </a:rPr>
+              <a:t>中產生實體</a:t>
+            </a:r>
+            <a:r>
+              <a:rPr lang="en-US" altLang="zh-CN" dirty="0">
+                <a:latin typeface="標楷體" panose="03000509000000000000" pitchFamily="65" charset="-120"/>
+                <a:ea typeface="標楷體" panose="03000509000000000000" pitchFamily="65" charset="-120"/>
+              </a:rPr>
+              <a:t>driver</a:t>
+            </a:r>
+            <a:r>
+              <a:rPr lang="zh-TW" altLang="en-US" dirty="0">
+                <a:latin typeface="標楷體" panose="03000509000000000000" pitchFamily="65" charset="-120"/>
+                <a:ea typeface="標楷體" panose="03000509000000000000" pitchFamily="65" charset="-120"/>
+              </a:rPr>
+              <a:t>、</a:t>
+            </a:r>
+            <a:r>
+              <a:rPr lang="en-US" altLang="zh-CN" dirty="0">
+                <a:latin typeface="標楷體" panose="03000509000000000000" pitchFamily="65" charset="-120"/>
+                <a:ea typeface="標楷體" panose="03000509000000000000" pitchFamily="65" charset="-120"/>
+              </a:rPr>
+              <a:t>monitor</a:t>
+            </a:r>
+            <a:r>
+              <a:rPr lang="zh-TW" altLang="en-US" dirty="0">
+                <a:latin typeface="標楷體" panose="03000509000000000000" pitchFamily="65" charset="-120"/>
+                <a:ea typeface="標楷體" panose="03000509000000000000" pitchFamily="65" charset="-120"/>
+              </a:rPr>
+              <a:t>、</a:t>
+            </a:r>
+            <a:r>
+              <a:rPr lang="en-US" altLang="zh-CN" dirty="0">
+                <a:latin typeface="標楷體" panose="03000509000000000000" pitchFamily="65" charset="-120"/>
+                <a:ea typeface="標楷體" panose="03000509000000000000" pitchFamily="65" charset="-120"/>
+              </a:rPr>
+              <a:t>reference model</a:t>
+            </a:r>
+            <a:r>
+              <a:rPr lang="zh-CN" altLang="en-US" dirty="0">
+                <a:latin typeface="標楷體" panose="03000509000000000000" pitchFamily="65" charset="-120"/>
+                <a:ea typeface="標楷體" panose="03000509000000000000" pitchFamily="65" charset="-120"/>
+              </a:rPr>
+              <a:t>和</a:t>
+            </a:r>
+            <a:r>
+              <a:rPr lang="en-US" altLang="zh-CN" dirty="0">
+                <a:latin typeface="標楷體" panose="03000509000000000000" pitchFamily="65" charset="-120"/>
+                <a:ea typeface="標楷體" panose="03000509000000000000" pitchFamily="65" charset="-120"/>
+              </a:rPr>
+              <a:t>scoreboard</a:t>
+            </a:r>
+            <a:r>
+              <a:rPr lang="zh-CN" altLang="en-US" dirty="0">
+                <a:latin typeface="標楷體" panose="03000509000000000000" pitchFamily="65" charset="-120"/>
+                <a:ea typeface="標楷體" panose="03000509000000000000" pitchFamily="65" charset="-120"/>
+              </a:rPr>
+              <a:t>等</a:t>
+            </a:r>
+            <a:endParaRPr lang="en-US" altLang="zh-CN" dirty="0">
+              <a:latin typeface="標楷體" panose="03000509000000000000" pitchFamily="65" charset="-120"/>
+              <a:ea typeface="標楷體" panose="03000509000000000000" pitchFamily="65" charset="-120"/>
+            </a:endParaRPr>
+          </a:p>
+          <a:p>
+            <a:pPr algn="l"/>
+            <a:endParaRPr lang="en-US" altLang="zh-CN" dirty="0">
+              <a:latin typeface="標楷體" panose="03000509000000000000" pitchFamily="65" charset="-120"/>
+              <a:ea typeface="標楷體" panose="03000509000000000000" pitchFamily="65" charset="-120"/>
+            </a:endParaRPr>
+          </a:p>
+          <a:p>
+            <a:pPr algn="l"/>
+            <a:r>
+              <a:rPr lang="zh-CN" altLang="en-US" dirty="0">
+                <a:latin typeface="標楷體" panose="03000509000000000000" pitchFamily="65" charset="-120"/>
+                <a:ea typeface="標楷體" panose="03000509000000000000" pitchFamily="65" charset="-120"/>
+              </a:rPr>
+              <a:t>在</a:t>
+            </a:r>
+            <a:r>
+              <a:rPr lang="en-US" altLang="zh-TW" dirty="0" err="1">
+                <a:latin typeface="標楷體" panose="03000509000000000000" pitchFamily="65" charset="-120"/>
+                <a:ea typeface="標楷體" panose="03000509000000000000" pitchFamily="65" charset="-120"/>
+              </a:rPr>
+              <a:t>top_tb</a:t>
+            </a:r>
+            <a:r>
+              <a:rPr lang="zh-CN" altLang="en-US" dirty="0">
+                <a:latin typeface="標楷體" panose="03000509000000000000" pitchFamily="65" charset="-120"/>
+                <a:ea typeface="標楷體" panose="03000509000000000000" pitchFamily="65" charset="-120"/>
+              </a:rPr>
+              <a:t>調用</a:t>
+            </a:r>
+            <a:r>
+              <a:rPr lang="en-US" altLang="zh-CN" dirty="0" err="1">
+                <a:latin typeface="標楷體" panose="03000509000000000000" pitchFamily="65" charset="-120"/>
+                <a:ea typeface="標楷體" panose="03000509000000000000" pitchFamily="65" charset="-120"/>
+              </a:rPr>
+              <a:t>run_test</a:t>
+            </a:r>
+            <a:r>
+              <a:rPr lang="zh-CN" altLang="en-US" dirty="0">
+                <a:latin typeface="標楷體" panose="03000509000000000000" pitchFamily="65" charset="-120"/>
+                <a:ea typeface="標楷體" panose="03000509000000000000" pitchFamily="65" charset="-120"/>
+              </a:rPr>
+              <a:t>時</a:t>
+            </a:r>
+            <a:r>
+              <a:rPr lang="zh-TW" altLang="en-US" dirty="0">
+                <a:latin typeface="標楷體" panose="03000509000000000000" pitchFamily="65" charset="-120"/>
+                <a:ea typeface="標楷體" panose="03000509000000000000" pitchFamily="65" charset="-120"/>
+              </a:rPr>
+              <a:t>，</a:t>
+            </a:r>
+            <a:r>
+              <a:rPr lang="zh-CN" altLang="en-US" dirty="0">
+                <a:latin typeface="標楷體" panose="03000509000000000000" pitchFamily="65" charset="-120"/>
+                <a:ea typeface="標楷體" panose="03000509000000000000" pitchFamily="65" charset="-120"/>
+              </a:rPr>
+              <a:t>傳遞的參數不再是</a:t>
+            </a:r>
+            <a:r>
+              <a:rPr lang="en-US" altLang="zh-CN" dirty="0" err="1">
+                <a:latin typeface="標楷體" panose="03000509000000000000" pitchFamily="65" charset="-120"/>
+                <a:ea typeface="標楷體" panose="03000509000000000000" pitchFamily="65" charset="-120"/>
+              </a:rPr>
+              <a:t>my_driver</a:t>
+            </a:r>
+            <a:r>
+              <a:rPr lang="zh-TW" altLang="en-US" dirty="0">
+                <a:latin typeface="標楷體" panose="03000509000000000000" pitchFamily="65" charset="-120"/>
+                <a:ea typeface="標楷體" panose="03000509000000000000" pitchFamily="65" charset="-120"/>
+              </a:rPr>
+              <a:t>，</a:t>
+            </a:r>
+            <a:br>
+              <a:rPr lang="en-US" altLang="zh-TW" dirty="0">
+                <a:latin typeface="標楷體" panose="03000509000000000000" pitchFamily="65" charset="-120"/>
+                <a:ea typeface="標楷體" panose="03000509000000000000" pitchFamily="65" charset="-120"/>
+              </a:rPr>
+            </a:br>
+            <a:r>
+              <a:rPr lang="zh-CN" altLang="en-US" dirty="0">
+                <a:latin typeface="標楷體" panose="03000509000000000000" pitchFamily="65" charset="-120"/>
+                <a:ea typeface="標楷體" panose="03000509000000000000" pitchFamily="65" charset="-120"/>
+              </a:rPr>
+              <a:t>而是</a:t>
+            </a:r>
+            <a:r>
+              <a:rPr lang="en-US" altLang="zh-TW" dirty="0">
+                <a:latin typeface="標楷體" panose="03000509000000000000" pitchFamily="65" charset="-120"/>
+                <a:ea typeface="標楷體" panose="03000509000000000000" pitchFamily="65" charset="-120"/>
+              </a:rPr>
+              <a:t>Env</a:t>
+            </a:r>
+            <a:r>
+              <a:rPr lang="zh-CN" altLang="en-US" dirty="0">
+                <a:latin typeface="標楷體" panose="03000509000000000000" pitchFamily="65" charset="-120"/>
+                <a:ea typeface="標楷體" panose="03000509000000000000" pitchFamily="65" charset="-120"/>
+              </a:rPr>
+              <a:t>這個容器類，即讓</a:t>
+            </a:r>
+            <a:r>
+              <a:rPr lang="en-US" altLang="zh-CN" dirty="0">
+                <a:latin typeface="標楷體" panose="03000509000000000000" pitchFamily="65" charset="-120"/>
+                <a:ea typeface="標楷體" panose="03000509000000000000" pitchFamily="65" charset="-120"/>
+              </a:rPr>
+              <a:t>UVM</a:t>
+            </a:r>
+            <a:r>
+              <a:rPr lang="zh-CN" altLang="en-US" dirty="0">
+                <a:latin typeface="標楷體" panose="03000509000000000000" pitchFamily="65" charset="-120"/>
+                <a:ea typeface="標楷體" panose="03000509000000000000" pitchFamily="65" charset="-120"/>
+              </a:rPr>
+              <a:t>自動創建這個容器類的實例。</a:t>
+            </a:r>
+            <a:br>
+              <a:rPr lang="en-US" altLang="zh-CN" dirty="0">
+                <a:latin typeface="標楷體" panose="03000509000000000000" pitchFamily="65" charset="-120"/>
+                <a:ea typeface="標楷體" panose="03000509000000000000" pitchFamily="65" charset="-120"/>
+              </a:rPr>
+            </a:br>
+            <a:r>
+              <a:rPr lang="zh-CN" altLang="en-US" dirty="0">
+                <a:latin typeface="標楷體" panose="03000509000000000000" pitchFamily="65" charset="-120"/>
+                <a:ea typeface="標楷體" panose="03000509000000000000" pitchFamily="65" charset="-120"/>
+              </a:rPr>
+              <a:t>在</a:t>
+            </a:r>
+            <a:r>
+              <a:rPr lang="en-US" altLang="zh-CN" dirty="0">
+                <a:latin typeface="標楷體" panose="03000509000000000000" pitchFamily="65" charset="-120"/>
+                <a:ea typeface="標楷體" panose="03000509000000000000" pitchFamily="65" charset="-120"/>
+              </a:rPr>
+              <a:t>UVM</a:t>
+            </a:r>
+            <a:r>
+              <a:rPr lang="zh-CN" altLang="en-US" dirty="0">
+                <a:latin typeface="標楷體" panose="03000509000000000000" pitchFamily="65" charset="-120"/>
+                <a:ea typeface="標楷體" panose="03000509000000000000" pitchFamily="65" charset="-120"/>
+              </a:rPr>
+              <a:t>中，這個容器類稱為</a:t>
+            </a:r>
+            <a:r>
+              <a:rPr lang="en-US" altLang="zh-CN" dirty="0" err="1">
+                <a:latin typeface="標楷體" panose="03000509000000000000" pitchFamily="65" charset="-120"/>
+                <a:ea typeface="標楷體" panose="03000509000000000000" pitchFamily="65" charset="-120"/>
+              </a:rPr>
+              <a:t>uvm_env</a:t>
+            </a:r>
+            <a:endParaRPr lang="zh-TW" altLang="en-US" dirty="0">
+              <a:latin typeface="標楷體" panose="03000509000000000000" pitchFamily="65" charset="-120"/>
+              <a:ea typeface="標楷體" panose="03000509000000000000" pitchFamily="65" charset="-120"/>
+            </a:endParaRPr>
+          </a:p>
+        </p:txBody>
+      </p:sp>
+    </p:spTree>
+    <p:extLst>
+      <p:ext uri="{BB962C8B-B14F-4D97-AF65-F5344CB8AC3E}">
+        <p14:creationId xmlns:p14="http://schemas.microsoft.com/office/powerpoint/2010/main" val="3439584913"/>
+      </p:ext>
+    </p:extLst>
+  </p:cSld>
+  <p:clrMapOvr>
+    <a:masterClrMapping/>
+  </p:clrMapOvr>
+</p:sld>
+</file>
+
+<file path=ppt/slides/slide11.xml><?xml version="1.0" encoding="utf-8"?>
+<p:sld xmlns:a="http://schemas.openxmlformats.org/drawingml/2006/main" xmlns:r="http://schemas.openxmlformats.org/officeDocument/2006/relationships" xmlns:p="http://schemas.openxmlformats.org/presentationml/2006/main">
+  <p:cSld>
+    <p:spTree>
+      <p:nvGrpSpPr>
+        <p:cNvPr id="1" name="">
+          <a:extLst>
+            <a:ext uri="{FF2B5EF4-FFF2-40B4-BE49-F238E27FC236}">
+              <a16:creationId xmlns:a16="http://schemas.microsoft.com/office/drawing/2014/main" id="{6737D154-D901-1B64-9067-C8947C2F665E}"/>
+            </a:ext>
+          </a:extLst>
+        </p:cNvPr>
+        <p:cNvGrpSpPr/>
+        <p:nvPr/>
+      </p:nvGrpSpPr>
+      <p:grpSpPr>
+        <a:xfrm>
+          <a:off x="0" y="0"/>
+          <a:ext cx="0" cy="0"/>
+          <a:chOff x="0" y="0"/>
+          <a:chExt cx="0" cy="0"/>
+        </a:xfrm>
+      </p:grpSpPr>
+      <p:sp>
+        <p:nvSpPr>
+          <p:cNvPr id="2" name="標題 1">
+            <a:extLst>
+              <a:ext uri="{FF2B5EF4-FFF2-40B4-BE49-F238E27FC236}">
+                <a16:creationId xmlns:a16="http://schemas.microsoft.com/office/drawing/2014/main" id="{C0C4A91F-B6AA-F4A9-4512-89D81A19A248}"/>
+              </a:ext>
+            </a:extLst>
+          </p:cNvPr>
+          <p:cNvSpPr>
+            <a:spLocks noGrp="1"/>
+          </p:cNvSpPr>
+          <p:nvPr>
+            <p:ph type="title"/>
+          </p:nvPr>
+        </p:nvSpPr>
+        <p:spPr/>
+        <p:txBody>
+          <a:bodyPr/>
+          <a:lstStyle/>
+          <a:p>
+            <a:r>
+              <a:rPr lang="en-US" altLang="zh-TW" dirty="0"/>
+              <a:t>Env</a:t>
+            </a:r>
+            <a:r>
+              <a:rPr lang="zh-TW" altLang="en-US" dirty="0"/>
+              <a:t> </a:t>
+            </a:r>
+            <a:r>
+              <a:rPr lang="en-US" altLang="zh-TW" dirty="0"/>
+              <a:t>(4/)</a:t>
+            </a:r>
+            <a:endParaRPr lang="zh-TW" altLang="en-US" dirty="0"/>
+          </a:p>
+        </p:txBody>
+      </p:sp>
+      <p:sp>
+        <p:nvSpPr>
+          <p:cNvPr id="3" name="內容版面配置區 2">
+            <a:extLst>
+              <a:ext uri="{FF2B5EF4-FFF2-40B4-BE49-F238E27FC236}">
+                <a16:creationId xmlns:a16="http://schemas.microsoft.com/office/drawing/2014/main" id="{42D585F8-A2D1-7482-D3B0-718FAF3F887E}"/>
+              </a:ext>
+            </a:extLst>
+          </p:cNvPr>
+          <p:cNvSpPr>
+            <a:spLocks noGrp="1"/>
+          </p:cNvSpPr>
+          <p:nvPr>
+            <p:ph idx="1"/>
+          </p:nvPr>
+        </p:nvSpPr>
+        <p:spPr/>
+        <p:txBody>
+          <a:bodyPr>
+            <a:normAutofit/>
+          </a:bodyPr>
+          <a:lstStyle/>
+          <a:p>
+            <a:pPr algn="l"/>
+            <a:r>
+              <a:rPr lang="zh-TW" altLang="en-US" dirty="0">
+                <a:latin typeface="標楷體" panose="03000509000000000000" pitchFamily="65" charset="-120"/>
+                <a:ea typeface="標楷體" panose="03000509000000000000" pitchFamily="65" charset="-120"/>
+              </a:rPr>
+              <a:t>在</a:t>
+            </a:r>
+            <a:r>
+              <a:rPr lang="en-US" altLang="zh-TW" dirty="0" err="1">
+                <a:latin typeface="標楷體" panose="03000509000000000000" pitchFamily="65" charset="-120"/>
+                <a:ea typeface="標楷體" panose="03000509000000000000" pitchFamily="65" charset="-120"/>
+              </a:rPr>
+              <a:t>top_tb</a:t>
+            </a:r>
+            <a:r>
+              <a:rPr lang="zh-TW" altLang="en-US" dirty="0">
+                <a:latin typeface="標楷體" panose="03000509000000000000" pitchFamily="65" charset="-120"/>
+                <a:ea typeface="標楷體" panose="03000509000000000000" pitchFamily="65" charset="-120"/>
+              </a:rPr>
+              <a:t>中使用</a:t>
+            </a:r>
+            <a:r>
+              <a:rPr lang="en-US" altLang="zh-CN" dirty="0" err="1">
+                <a:latin typeface="標楷體" panose="03000509000000000000" pitchFamily="65" charset="-120"/>
+                <a:ea typeface="標楷體" panose="03000509000000000000" pitchFamily="65" charset="-120"/>
+              </a:rPr>
+              <a:t>run_test</a:t>
+            </a:r>
+            <a:r>
+              <a:rPr lang="en-US" altLang="zh-TW" dirty="0">
+                <a:latin typeface="標楷體" panose="03000509000000000000" pitchFamily="65" charset="-120"/>
+                <a:ea typeface="標楷體" panose="03000509000000000000" pitchFamily="65" charset="-120"/>
+              </a:rPr>
+              <a:t>()</a:t>
+            </a:r>
+            <a:r>
+              <a:rPr lang="zh-TW" altLang="en-US" dirty="0">
+                <a:latin typeface="標楷體" panose="03000509000000000000" pitchFamily="65" charset="-120"/>
+                <a:ea typeface="標楷體" panose="03000509000000000000" pitchFamily="65" charset="-120"/>
+              </a:rPr>
+              <a:t>實例化 </a:t>
+            </a:r>
+            <a:r>
+              <a:rPr lang="en-US" altLang="zh-TW" dirty="0">
+                <a:latin typeface="標楷體" panose="03000509000000000000" pitchFamily="65" charset="-120"/>
+                <a:ea typeface="標楷體" panose="03000509000000000000" pitchFamily="65" charset="-120"/>
+              </a:rPr>
+              <a:t>Env</a:t>
+            </a:r>
+            <a:r>
+              <a:rPr lang="zh-TW" altLang="en-US" dirty="0">
+                <a:latin typeface="標楷體" panose="03000509000000000000" pitchFamily="65" charset="-120"/>
+                <a:ea typeface="標楷體" panose="03000509000000000000" pitchFamily="65" charset="-120"/>
+              </a:rPr>
+              <a:t> 後，</a:t>
+            </a:r>
+            <a:br>
+              <a:rPr lang="en-US" altLang="zh-TW" dirty="0">
+                <a:latin typeface="標楷體" panose="03000509000000000000" pitchFamily="65" charset="-120"/>
+                <a:ea typeface="標楷體" panose="03000509000000000000" pitchFamily="65" charset="-120"/>
+              </a:rPr>
+            </a:br>
+            <a:r>
+              <a:rPr lang="zh-TW" altLang="en-US" dirty="0">
+                <a:latin typeface="標楷體" panose="03000509000000000000" pitchFamily="65" charset="-120"/>
+                <a:ea typeface="標楷體" panose="03000509000000000000" pitchFamily="65" charset="-120"/>
+              </a:rPr>
+              <a:t>在</a:t>
+            </a:r>
+            <a:r>
+              <a:rPr lang="en-US" altLang="zh-TW" dirty="0">
+                <a:latin typeface="標楷體" panose="03000509000000000000" pitchFamily="65" charset="-120"/>
+                <a:ea typeface="標楷體" panose="03000509000000000000" pitchFamily="65" charset="-120"/>
+              </a:rPr>
+              <a:t>Env</a:t>
+            </a:r>
+            <a:r>
+              <a:rPr lang="zh-TW" altLang="en-US" dirty="0">
+                <a:latin typeface="標楷體" panose="03000509000000000000" pitchFamily="65" charset="-120"/>
+                <a:ea typeface="標楷體" panose="03000509000000000000" pitchFamily="65" charset="-120"/>
+              </a:rPr>
+              <a:t>中去實例化其他物件 </a:t>
+            </a:r>
+            <a:r>
+              <a:rPr lang="en-US" altLang="zh-TW" dirty="0">
+                <a:latin typeface="標楷體" panose="03000509000000000000" pitchFamily="65" charset="-120"/>
+                <a:ea typeface="標楷體" panose="03000509000000000000" pitchFamily="65" charset="-120"/>
+              </a:rPr>
+              <a:t>(</a:t>
+            </a:r>
+            <a:r>
+              <a:rPr lang="en-US" altLang="zh-CN" dirty="0">
+                <a:latin typeface="標楷體" panose="03000509000000000000" pitchFamily="65" charset="-120"/>
+                <a:ea typeface="標楷體" panose="03000509000000000000" pitchFamily="65" charset="-120"/>
+              </a:rPr>
+              <a:t>driver</a:t>
+            </a:r>
+            <a:r>
+              <a:rPr lang="zh-TW" altLang="en-US" dirty="0">
+                <a:latin typeface="標楷體" panose="03000509000000000000" pitchFamily="65" charset="-120"/>
+                <a:ea typeface="標楷體" panose="03000509000000000000" pitchFamily="65" charset="-120"/>
+              </a:rPr>
+              <a:t>、</a:t>
+            </a:r>
+            <a:r>
+              <a:rPr lang="en-US" altLang="zh-CN" dirty="0">
+                <a:latin typeface="標楷體" panose="03000509000000000000" pitchFamily="65" charset="-120"/>
+                <a:ea typeface="標楷體" panose="03000509000000000000" pitchFamily="65" charset="-120"/>
+              </a:rPr>
+              <a:t> monitor</a:t>
+            </a:r>
+            <a:r>
+              <a:rPr lang="zh-TW" altLang="en-US" dirty="0">
+                <a:latin typeface="標楷體" panose="03000509000000000000" pitchFamily="65" charset="-120"/>
+                <a:ea typeface="標楷體" panose="03000509000000000000" pitchFamily="65" charset="-120"/>
+              </a:rPr>
+              <a:t> </a:t>
+            </a:r>
+            <a:r>
+              <a:rPr lang="en-US" altLang="zh-TW" dirty="0">
+                <a:latin typeface="標楷體" panose="03000509000000000000" pitchFamily="65" charset="-120"/>
+                <a:ea typeface="標楷體" panose="03000509000000000000" pitchFamily="65" charset="-120"/>
+              </a:rPr>
+              <a:t>…)</a:t>
+            </a:r>
+          </a:p>
+          <a:p>
+            <a:pPr algn="l"/>
+            <a:endParaRPr lang="en-US" altLang="zh-TW" dirty="0">
+              <a:latin typeface="標楷體" panose="03000509000000000000" pitchFamily="65" charset="-120"/>
+              <a:ea typeface="標楷體" panose="03000509000000000000" pitchFamily="65" charset="-120"/>
+            </a:endParaRPr>
+          </a:p>
+          <a:p>
+            <a:pPr algn="l"/>
+            <a:r>
+              <a:rPr lang="zh-TW" altLang="en-US" dirty="0">
+                <a:latin typeface="標楷體" panose="03000509000000000000" pitchFamily="65" charset="-120"/>
+                <a:ea typeface="標楷體" panose="03000509000000000000" pitchFamily="65" charset="-120"/>
+              </a:rPr>
+              <a:t>此時</a:t>
+            </a:r>
+            <a:r>
+              <a:rPr lang="en-US" altLang="zh-TW" dirty="0">
+                <a:latin typeface="標楷體" panose="03000509000000000000" pitchFamily="65" charset="-120"/>
+                <a:ea typeface="標楷體" panose="03000509000000000000" pitchFamily="65" charset="-120"/>
+              </a:rPr>
+              <a:t>UVM</a:t>
+            </a:r>
+            <a:r>
+              <a:rPr lang="zh-TW" altLang="en-US" dirty="0">
+                <a:latin typeface="標楷體" panose="03000509000000000000" pitchFamily="65" charset="-120"/>
+                <a:ea typeface="標楷體" panose="03000509000000000000" pitchFamily="65" charset="-120"/>
+              </a:rPr>
+              <a:t>樹就會以 </a:t>
+            </a:r>
+            <a:r>
+              <a:rPr lang="en-US" altLang="zh-TW" dirty="0">
+                <a:latin typeface="標楷體" panose="03000509000000000000" pitchFamily="65" charset="-120"/>
+                <a:ea typeface="標楷體" panose="03000509000000000000" pitchFamily="65" charset="-120"/>
+              </a:rPr>
+              <a:t>Env </a:t>
+            </a:r>
+            <a:r>
+              <a:rPr lang="zh-TW" altLang="en-US" dirty="0">
+                <a:latin typeface="標楷體" panose="03000509000000000000" pitchFamily="65" charset="-120"/>
+                <a:ea typeface="標楷體" panose="03000509000000000000" pitchFamily="65" charset="-120"/>
+              </a:rPr>
+              <a:t>這個樹根長出其他子葉</a:t>
+            </a:r>
+            <a:endParaRPr lang="en-US" altLang="zh-TW" dirty="0">
+              <a:latin typeface="標楷體" panose="03000509000000000000" pitchFamily="65" charset="-120"/>
+              <a:ea typeface="標楷體" panose="03000509000000000000" pitchFamily="65" charset="-120"/>
+            </a:endParaRPr>
+          </a:p>
+          <a:p>
+            <a:pPr algn="l"/>
+            <a:endParaRPr lang="en-US" altLang="zh-TW" dirty="0">
+              <a:latin typeface="標楷體" panose="03000509000000000000" pitchFamily="65" charset="-120"/>
+              <a:ea typeface="標楷體" panose="03000509000000000000" pitchFamily="65" charset="-120"/>
+            </a:endParaRPr>
+          </a:p>
+          <a:p>
+            <a:pPr algn="l"/>
+            <a:r>
+              <a:rPr lang="zh-TW" altLang="en-US" dirty="0">
+                <a:latin typeface="標楷體" panose="03000509000000000000" pitchFamily="65" charset="-120"/>
+                <a:ea typeface="標楷體" panose="03000509000000000000" pitchFamily="65" charset="-120"/>
+              </a:rPr>
+              <a:t>如右圖只有一個</a:t>
+            </a:r>
+            <a:r>
+              <a:rPr lang="en-US" altLang="zh-TW" dirty="0">
+                <a:latin typeface="標楷體" panose="03000509000000000000" pitchFamily="65" charset="-120"/>
+                <a:ea typeface="標楷體" panose="03000509000000000000" pitchFamily="65" charset="-120"/>
+              </a:rPr>
+              <a:t>driver</a:t>
+            </a:r>
+            <a:r>
+              <a:rPr lang="zh-TW" altLang="en-US" dirty="0">
+                <a:latin typeface="標楷體" panose="03000509000000000000" pitchFamily="65" charset="-120"/>
+                <a:ea typeface="標楷體" panose="03000509000000000000" pitchFamily="65" charset="-120"/>
+              </a:rPr>
+              <a:t>物件的樹狀圖</a:t>
+            </a:r>
+            <a:br>
+              <a:rPr lang="en-US" altLang="zh-TW" dirty="0">
+                <a:latin typeface="標楷體" panose="03000509000000000000" pitchFamily="65" charset="-120"/>
+                <a:ea typeface="標楷體" panose="03000509000000000000" pitchFamily="65" charset="-120"/>
+              </a:rPr>
+            </a:br>
+            <a:endParaRPr lang="en-US" altLang="zh-TW" dirty="0">
+              <a:latin typeface="標楷體" panose="03000509000000000000" pitchFamily="65" charset="-120"/>
+              <a:ea typeface="標楷體" panose="03000509000000000000" pitchFamily="65" charset="-120"/>
+            </a:endParaRPr>
+          </a:p>
+          <a:p>
+            <a:pPr algn="l"/>
+            <a:endParaRPr lang="en-US" altLang="zh-TW" dirty="0">
+              <a:latin typeface="標楷體" panose="03000509000000000000" pitchFamily="65" charset="-120"/>
+              <a:ea typeface="標楷體" panose="03000509000000000000" pitchFamily="65" charset="-120"/>
+            </a:endParaRPr>
+          </a:p>
+        </p:txBody>
+      </p:sp>
+      <p:pic>
+        <p:nvPicPr>
+          <p:cNvPr id="5" name="圖片 4">
+            <a:extLst>
+              <a:ext uri="{FF2B5EF4-FFF2-40B4-BE49-F238E27FC236}">
+                <a16:creationId xmlns:a16="http://schemas.microsoft.com/office/drawing/2014/main" id="{AB4B1544-EB5C-3E17-45CB-9DC0C5936BA2}"/>
+              </a:ext>
+            </a:extLst>
+          </p:cNvPr>
+          <p:cNvPicPr>
+            <a:picLocks noChangeAspect="1"/>
+          </p:cNvPicPr>
+          <p:nvPr/>
+        </p:nvPicPr>
+        <p:blipFill>
+          <a:blip r:embed="rId3"/>
+          <a:stretch>
+            <a:fillRect/>
+          </a:stretch>
+        </p:blipFill>
+        <p:spPr>
+          <a:xfrm>
+            <a:off x="9069864" y="3728119"/>
+            <a:ext cx="2000701" cy="2874024"/>
+          </a:xfrm>
+          <a:prstGeom prst="rect">
+            <a:avLst/>
+          </a:prstGeom>
+          <a:ln>
+            <a:solidFill>
+              <a:schemeClr val="tx1"/>
+            </a:solidFill>
+          </a:ln>
+        </p:spPr>
+      </p:pic>
+    </p:spTree>
+    <p:extLst>
+      <p:ext uri="{BB962C8B-B14F-4D97-AF65-F5344CB8AC3E}">
+        <p14:creationId xmlns:p14="http://schemas.microsoft.com/office/powerpoint/2010/main" val="2609895261"/>
+      </p:ext>
+    </p:extLst>
+  </p:cSld>
+  <p:clrMapOvr>
+    <a:masterClrMapping/>
+  </p:clrMapOvr>
+</p:sld>
+</file>
+
+<file path=ppt/slides/slide12.xml><?xml version="1.0" encoding="utf-8"?>
+<p:sld xmlns:a="http://schemas.openxmlformats.org/drawingml/2006/main" xmlns:r="http://schemas.openxmlformats.org/officeDocument/2006/relationships" xmlns:p="http://schemas.openxmlformats.org/presentationml/2006/main">
+  <p:cSld>
+    <p:spTree>
+      <p:nvGrpSpPr>
+        <p:cNvPr id="1" name="">
+          <a:extLst>
+            <a:ext uri="{FF2B5EF4-FFF2-40B4-BE49-F238E27FC236}">
+              <a16:creationId xmlns:a16="http://schemas.microsoft.com/office/drawing/2014/main" id="{4AC8B04F-7685-C1C7-6904-1B1DC2287E29}"/>
+            </a:ext>
+          </a:extLst>
+        </p:cNvPr>
+        <p:cNvGrpSpPr/>
+        <p:nvPr/>
+      </p:nvGrpSpPr>
+      <p:grpSpPr>
+        <a:xfrm>
+          <a:off x="0" y="0"/>
+          <a:ext cx="0" cy="0"/>
+          <a:chOff x="0" y="0"/>
+          <a:chExt cx="0" cy="0"/>
+        </a:xfrm>
+      </p:grpSpPr>
+      <p:sp>
+        <p:nvSpPr>
+          <p:cNvPr id="2" name="標題 1">
+            <a:extLst>
+              <a:ext uri="{FF2B5EF4-FFF2-40B4-BE49-F238E27FC236}">
+                <a16:creationId xmlns:a16="http://schemas.microsoft.com/office/drawing/2014/main" id="{7C5862F8-ED04-021C-814C-2B5D96B62ADC}"/>
+              </a:ext>
+            </a:extLst>
+          </p:cNvPr>
+          <p:cNvSpPr>
+            <a:spLocks noGrp="1"/>
+          </p:cNvSpPr>
+          <p:nvPr>
+            <p:ph type="title"/>
+          </p:nvPr>
+        </p:nvSpPr>
+        <p:spPr/>
+        <p:txBody>
+          <a:bodyPr/>
+          <a:lstStyle/>
+          <a:p>
+            <a:r>
+              <a:rPr lang="en-US" altLang="zh-TW" dirty="0"/>
+              <a:t>Env</a:t>
+            </a:r>
+            <a:r>
+              <a:rPr lang="zh-TW" altLang="en-US" dirty="0"/>
+              <a:t> </a:t>
+            </a:r>
+            <a:r>
+              <a:rPr lang="en-US" altLang="zh-TW" dirty="0"/>
+              <a:t>(5/)</a:t>
+            </a:r>
+            <a:endParaRPr lang="zh-TW" altLang="en-US" dirty="0"/>
+          </a:p>
+        </p:txBody>
+      </p:sp>
+      <p:sp>
+        <p:nvSpPr>
+          <p:cNvPr id="3" name="內容版面配置區 2">
+            <a:extLst>
+              <a:ext uri="{FF2B5EF4-FFF2-40B4-BE49-F238E27FC236}">
+                <a16:creationId xmlns:a16="http://schemas.microsoft.com/office/drawing/2014/main" id="{B68E95BA-8029-8850-EAA6-8C9ADD04581F}"/>
+              </a:ext>
+            </a:extLst>
+          </p:cNvPr>
+          <p:cNvSpPr>
+            <a:spLocks noGrp="1"/>
+          </p:cNvSpPr>
+          <p:nvPr>
+            <p:ph idx="1"/>
+          </p:nvPr>
+        </p:nvSpPr>
+        <p:spPr/>
+        <p:txBody>
+          <a:bodyPr>
+            <a:normAutofit/>
+          </a:bodyPr>
+          <a:lstStyle/>
+          <a:p>
+            <a:r>
+              <a:rPr lang="zh-TW" altLang="en-US" dirty="0">
+                <a:latin typeface="標楷體" panose="03000509000000000000" pitchFamily="65" charset="-120"/>
+                <a:ea typeface="標楷體" panose="03000509000000000000" pitchFamily="65" charset="-120"/>
+              </a:rPr>
+              <a:t>如果所有物件都實例完，就會長出如下圖的樹狀結構</a:t>
+            </a:r>
+            <a:br>
+              <a:rPr lang="en-US" altLang="zh-TW" dirty="0">
+                <a:latin typeface="標楷體" panose="03000509000000000000" pitchFamily="65" charset="-120"/>
+                <a:ea typeface="標楷體" panose="03000509000000000000" pitchFamily="65" charset="-120"/>
+              </a:rPr>
+            </a:br>
+            <a:endParaRPr lang="en-US" altLang="zh-TW" dirty="0">
+              <a:latin typeface="標楷體" panose="03000509000000000000" pitchFamily="65" charset="-120"/>
+              <a:ea typeface="標楷體" panose="03000509000000000000" pitchFamily="65" charset="-120"/>
+            </a:endParaRPr>
+          </a:p>
+          <a:p>
+            <a:pPr algn="l"/>
+            <a:endParaRPr lang="en-US" altLang="zh-TW" dirty="0">
+              <a:latin typeface="標楷體" panose="03000509000000000000" pitchFamily="65" charset="-120"/>
+              <a:ea typeface="標楷體" panose="03000509000000000000" pitchFamily="65" charset="-120"/>
+            </a:endParaRPr>
+          </a:p>
+        </p:txBody>
+      </p:sp>
+      <p:pic>
+        <p:nvPicPr>
+          <p:cNvPr id="6" name="圖片 5">
+            <a:extLst>
+              <a:ext uri="{FF2B5EF4-FFF2-40B4-BE49-F238E27FC236}">
+                <a16:creationId xmlns:a16="http://schemas.microsoft.com/office/drawing/2014/main" id="{51E5D9B9-1BEB-096E-D645-01B756824975}"/>
+              </a:ext>
+            </a:extLst>
+          </p:cNvPr>
+          <p:cNvPicPr>
+            <a:picLocks noChangeAspect="1"/>
+          </p:cNvPicPr>
+          <p:nvPr/>
+        </p:nvPicPr>
+        <p:blipFill>
+          <a:blip r:embed="rId3"/>
+          <a:stretch>
+            <a:fillRect/>
+          </a:stretch>
+        </p:blipFill>
+        <p:spPr>
+          <a:xfrm>
+            <a:off x="2084250" y="2626420"/>
+            <a:ext cx="8023500" cy="3866455"/>
+          </a:xfrm>
+          <a:prstGeom prst="rect">
+            <a:avLst/>
+          </a:prstGeom>
+          <a:ln>
+            <a:solidFill>
+              <a:schemeClr val="tx1"/>
+            </a:solidFill>
+          </a:ln>
+        </p:spPr>
+      </p:pic>
+    </p:spTree>
+    <p:extLst>
+      <p:ext uri="{BB962C8B-B14F-4D97-AF65-F5344CB8AC3E}">
+        <p14:creationId xmlns:p14="http://schemas.microsoft.com/office/powerpoint/2010/main" val="3961701473"/>
+      </p:ext>
+    </p:extLst>
+  </p:cSld>
+  <p:clrMapOvr>
+    <a:masterClrMapping/>
+  </p:clrMapOvr>
+</p:sld>
+</file>
+
+<file path=ppt/slides/slide13.xml><?xml version="1.0" encoding="utf-8"?>
+<p:sld xmlns:a="http://schemas.openxmlformats.org/drawingml/2006/main" xmlns:r="http://schemas.openxmlformats.org/officeDocument/2006/relationships" xmlns:p="http://schemas.openxmlformats.org/presentationml/2006/main">
+  <p:cSld>
+    <p:spTree>
+      <p:nvGrpSpPr>
+        <p:cNvPr id="1" name="">
+          <a:extLst>
+            <a:ext uri="{FF2B5EF4-FFF2-40B4-BE49-F238E27FC236}">
+              <a16:creationId xmlns:a16="http://schemas.microsoft.com/office/drawing/2014/main" id="{C9564C38-2B13-06B7-0142-08E890B53C59}"/>
+            </a:ext>
+          </a:extLst>
+        </p:cNvPr>
+        <p:cNvGrpSpPr/>
+        <p:nvPr/>
+      </p:nvGrpSpPr>
+      <p:grpSpPr>
+        <a:xfrm>
+          <a:off x="0" y="0"/>
+          <a:ext cx="0" cy="0"/>
+          <a:chOff x="0" y="0"/>
+          <a:chExt cx="0" cy="0"/>
+        </a:xfrm>
+      </p:grpSpPr>
+      <p:sp>
+        <p:nvSpPr>
+          <p:cNvPr id="2" name="標題 1">
+            <a:extLst>
+              <a:ext uri="{FF2B5EF4-FFF2-40B4-BE49-F238E27FC236}">
+                <a16:creationId xmlns:a16="http://schemas.microsoft.com/office/drawing/2014/main" id="{45E7386D-DF5C-0780-B0CC-57932D0CDC92}"/>
+              </a:ext>
+            </a:extLst>
+          </p:cNvPr>
+          <p:cNvSpPr>
+            <a:spLocks noGrp="1"/>
+          </p:cNvSpPr>
+          <p:nvPr>
+            <p:ph type="title"/>
+          </p:nvPr>
+        </p:nvSpPr>
+        <p:spPr/>
+        <p:txBody>
+          <a:bodyPr/>
+          <a:lstStyle/>
+          <a:p>
+            <a:r>
+              <a:rPr lang="en-US" altLang="zh-TW" dirty="0"/>
+              <a:t>Monitor</a:t>
+            </a:r>
+            <a:r>
+              <a:rPr lang="zh-TW" altLang="en-US" dirty="0"/>
+              <a:t> </a:t>
+            </a:r>
+            <a:r>
+              <a:rPr lang="en-US" altLang="zh-TW" dirty="0"/>
+              <a:t>(6/)</a:t>
+            </a:r>
+            <a:endParaRPr lang="zh-TW" altLang="en-US" dirty="0"/>
+          </a:p>
+        </p:txBody>
+      </p:sp>
+      <p:sp>
+        <p:nvSpPr>
+          <p:cNvPr id="3" name="內容版面配置區 2">
+            <a:extLst>
+              <a:ext uri="{FF2B5EF4-FFF2-40B4-BE49-F238E27FC236}">
+                <a16:creationId xmlns:a16="http://schemas.microsoft.com/office/drawing/2014/main" id="{A402DE7A-1DD9-D329-500C-2719F4728A28}"/>
+              </a:ext>
+            </a:extLst>
+          </p:cNvPr>
+          <p:cNvSpPr>
+            <a:spLocks noGrp="1"/>
+          </p:cNvSpPr>
+          <p:nvPr>
+            <p:ph idx="1"/>
+          </p:nvPr>
+        </p:nvSpPr>
+        <p:spPr/>
+        <p:txBody>
+          <a:bodyPr>
+            <a:normAutofit lnSpcReduction="10000"/>
+          </a:bodyPr>
+          <a:lstStyle/>
+          <a:p>
+            <a:pPr marL="514350" indent="-514350" algn="l">
+              <a:buFont typeface="+mj-lt"/>
+              <a:buAutoNum type="arabicPeriod"/>
+            </a:pPr>
+            <a:r>
+              <a:rPr lang="zh-TW" altLang="en-US" dirty="0">
+                <a:latin typeface="標楷體" panose="03000509000000000000" pitchFamily="65" charset="-120"/>
+                <a:ea typeface="標楷體" panose="03000509000000000000" pitchFamily="65" charset="-120"/>
+              </a:rPr>
+              <a:t>所有的</a:t>
+            </a:r>
+            <a:r>
+              <a:rPr lang="en-US" altLang="zh-TW" dirty="0">
+                <a:latin typeface="標楷體" panose="03000509000000000000" pitchFamily="65" charset="-120"/>
+                <a:ea typeface="標楷體" panose="03000509000000000000" pitchFamily="65" charset="-120"/>
+              </a:rPr>
+              <a:t>monitor</a:t>
+            </a:r>
+            <a:r>
+              <a:rPr lang="zh-TW" altLang="en-US" dirty="0">
+                <a:latin typeface="標楷體" panose="03000509000000000000" pitchFamily="65" charset="-120"/>
+                <a:ea typeface="標楷體" panose="03000509000000000000" pitchFamily="65" charset="-120"/>
+              </a:rPr>
+              <a:t>類應來自</a:t>
+            </a:r>
+            <a:r>
+              <a:rPr lang="en-US" altLang="zh-TW" dirty="0" err="1">
+                <a:latin typeface="標楷體" panose="03000509000000000000" pitchFamily="65" charset="-120"/>
+                <a:ea typeface="標楷體" panose="03000509000000000000" pitchFamily="65" charset="-120"/>
+              </a:rPr>
+              <a:t>uvm_monitor</a:t>
+            </a:r>
+            <a:endParaRPr lang="en-US" altLang="zh-TW" dirty="0">
+              <a:latin typeface="標楷體" panose="03000509000000000000" pitchFamily="65" charset="-120"/>
+              <a:ea typeface="標楷體" panose="03000509000000000000" pitchFamily="65" charset="-120"/>
+            </a:endParaRPr>
+          </a:p>
+          <a:p>
+            <a:pPr marL="514350" indent="-514350" algn="l">
+              <a:buFont typeface="+mj-lt"/>
+              <a:buAutoNum type="arabicPeriod"/>
+            </a:pPr>
+            <a:endParaRPr lang="en-US" altLang="zh-TW" dirty="0">
+              <a:latin typeface="標楷體" panose="03000509000000000000" pitchFamily="65" charset="-120"/>
+              <a:ea typeface="標楷體" panose="03000509000000000000" pitchFamily="65" charset="-120"/>
+            </a:endParaRPr>
+          </a:p>
+          <a:p>
+            <a:pPr marL="514350" indent="-514350" algn="l">
+              <a:buFont typeface="+mj-lt"/>
+              <a:buAutoNum type="arabicPeriod"/>
+            </a:pPr>
+            <a:r>
+              <a:rPr lang="zh-TW" altLang="en-US" dirty="0">
+                <a:latin typeface="標楷體" panose="03000509000000000000" pitchFamily="65" charset="-120"/>
+                <a:ea typeface="標楷體" panose="03000509000000000000" pitchFamily="65" charset="-120"/>
+              </a:rPr>
+              <a:t>與</a:t>
+            </a:r>
+            <a:r>
+              <a:rPr lang="en-US" altLang="zh-TW" dirty="0">
+                <a:latin typeface="標楷體" panose="03000509000000000000" pitchFamily="65" charset="-120"/>
+                <a:ea typeface="標楷體" panose="03000509000000000000" pitchFamily="65" charset="-120"/>
+              </a:rPr>
+              <a:t>driver</a:t>
+            </a:r>
+            <a:r>
+              <a:rPr lang="zh-TW" altLang="en-US" dirty="0">
+                <a:latin typeface="標楷體" panose="03000509000000000000" pitchFamily="65" charset="-120"/>
+                <a:ea typeface="標楷體" panose="03000509000000000000" pitchFamily="65" charset="-120"/>
+              </a:rPr>
+              <a:t>類似，在</a:t>
+            </a:r>
+            <a:r>
+              <a:rPr lang="en-US" altLang="zh-TW" dirty="0" err="1">
+                <a:latin typeface="標楷體" panose="03000509000000000000" pitchFamily="65" charset="-120"/>
+                <a:ea typeface="標楷體" panose="03000509000000000000" pitchFamily="65" charset="-120"/>
+              </a:rPr>
+              <a:t>my_monitor</a:t>
+            </a:r>
+            <a:r>
+              <a:rPr lang="zh-TW" altLang="en-US" dirty="0">
+                <a:latin typeface="標楷體" panose="03000509000000000000" pitchFamily="65" charset="-120"/>
+                <a:ea typeface="標楷體" panose="03000509000000000000" pitchFamily="65" charset="-120"/>
+              </a:rPr>
+              <a:t>中也需要有一個</a:t>
+            </a:r>
+            <a:r>
+              <a:rPr lang="en-US" altLang="zh-TW" dirty="0">
+                <a:latin typeface="標楷體" panose="03000509000000000000" pitchFamily="65" charset="-120"/>
+                <a:ea typeface="標楷體" panose="03000509000000000000" pitchFamily="65" charset="-120"/>
+              </a:rPr>
+              <a:t>virtual </a:t>
+            </a:r>
+            <a:r>
+              <a:rPr lang="en-US" altLang="zh-TW" dirty="0" err="1">
+                <a:latin typeface="標楷體" panose="03000509000000000000" pitchFamily="65" charset="-120"/>
+                <a:ea typeface="標楷體" panose="03000509000000000000" pitchFamily="65" charset="-120"/>
+              </a:rPr>
+              <a:t>my_if</a:t>
+            </a:r>
+            <a:r>
+              <a:rPr lang="zh-TW" altLang="en-US" dirty="0">
+                <a:latin typeface="標楷體" panose="03000509000000000000" pitchFamily="65" charset="-120"/>
+                <a:ea typeface="標楷體" panose="03000509000000000000" pitchFamily="65" charset="-120"/>
+              </a:rPr>
+              <a:t>，</a:t>
+            </a:r>
+            <a:br>
+              <a:rPr lang="en-US" altLang="zh-TW" dirty="0">
+                <a:latin typeface="標楷體" panose="03000509000000000000" pitchFamily="65" charset="-120"/>
+                <a:ea typeface="標楷體" panose="03000509000000000000" pitchFamily="65" charset="-120"/>
+              </a:rPr>
+            </a:br>
+            <a:r>
+              <a:rPr lang="zh-TW" altLang="en-US" dirty="0">
+                <a:latin typeface="標楷體" panose="03000509000000000000" pitchFamily="65" charset="-120"/>
+                <a:ea typeface="標楷體" panose="03000509000000000000" pitchFamily="65" charset="-120"/>
+              </a:rPr>
+              <a:t>才能監聽</a:t>
+            </a:r>
+            <a:r>
+              <a:rPr lang="en-US" altLang="zh-TW" dirty="0">
+                <a:latin typeface="標楷體" panose="03000509000000000000" pitchFamily="65" charset="-120"/>
+                <a:ea typeface="標楷體" panose="03000509000000000000" pitchFamily="65" charset="-120"/>
+              </a:rPr>
+              <a:t>DUT</a:t>
+            </a:r>
+          </a:p>
+          <a:p>
+            <a:pPr marL="514350" indent="-514350" algn="l">
+              <a:buFont typeface="+mj-lt"/>
+              <a:buAutoNum type="arabicPeriod"/>
+            </a:pPr>
+            <a:endParaRPr lang="en-US" altLang="zh-TW" dirty="0">
+              <a:latin typeface="標楷體" panose="03000509000000000000" pitchFamily="65" charset="-120"/>
+              <a:ea typeface="標楷體" panose="03000509000000000000" pitchFamily="65" charset="-120"/>
+            </a:endParaRPr>
+          </a:p>
+          <a:p>
+            <a:pPr marL="514350" indent="-514350" algn="l">
+              <a:buFont typeface="+mj-lt"/>
+              <a:buAutoNum type="arabicPeriod"/>
+            </a:pPr>
+            <a:r>
+              <a:rPr lang="en-US" altLang="zh-TW" dirty="0" err="1">
+                <a:latin typeface="標楷體" panose="03000509000000000000" pitchFamily="65" charset="-120"/>
+                <a:ea typeface="標楷體" panose="03000509000000000000" pitchFamily="65" charset="-120"/>
+              </a:rPr>
+              <a:t>uvm_monitor</a:t>
+            </a:r>
+            <a:r>
+              <a:rPr lang="zh-TW" altLang="en-US" dirty="0">
+                <a:latin typeface="標楷體" panose="03000509000000000000" pitchFamily="65" charset="-120"/>
+                <a:ea typeface="標楷體" panose="03000509000000000000" pitchFamily="65" charset="-120"/>
+              </a:rPr>
+              <a:t>在整個模擬中是一直存在的，所以它是一個</a:t>
+            </a:r>
+            <a:r>
+              <a:rPr lang="en-US" altLang="zh-TW" dirty="0">
+                <a:latin typeface="標楷體" panose="03000509000000000000" pitchFamily="65" charset="-120"/>
+                <a:ea typeface="標楷體" panose="03000509000000000000" pitchFamily="65" charset="-120"/>
+              </a:rPr>
+              <a:t>component</a:t>
+            </a:r>
+            <a:r>
+              <a:rPr lang="zh-TW" altLang="en-US" dirty="0">
+                <a:latin typeface="標楷體" panose="03000509000000000000" pitchFamily="65" charset="-120"/>
+                <a:ea typeface="標楷體" panose="03000509000000000000" pitchFamily="65" charset="-120"/>
+              </a:rPr>
+              <a:t>，要使用</a:t>
+            </a:r>
+            <a:r>
+              <a:rPr lang="en-US" altLang="zh-TW" dirty="0" err="1">
+                <a:latin typeface="標楷體" panose="03000509000000000000" pitchFamily="65" charset="-120"/>
+                <a:ea typeface="標楷體" panose="03000509000000000000" pitchFamily="65" charset="-120"/>
+              </a:rPr>
+              <a:t>uvm_component_utils</a:t>
+            </a:r>
+            <a:r>
+              <a:rPr lang="en-US" altLang="zh-TW" dirty="0">
+                <a:latin typeface="標楷體" panose="03000509000000000000" pitchFamily="65" charset="-120"/>
+                <a:ea typeface="標楷體" panose="03000509000000000000" pitchFamily="65" charset="-120"/>
+              </a:rPr>
+              <a:t>()</a:t>
+            </a:r>
+            <a:r>
+              <a:rPr lang="zh-TW" altLang="en-US" dirty="0">
+                <a:latin typeface="標楷體" panose="03000509000000000000" pitchFamily="65" charset="-120"/>
+                <a:ea typeface="標楷體" panose="03000509000000000000" pitchFamily="65" charset="-120"/>
+              </a:rPr>
+              <a:t>註冊</a:t>
+            </a:r>
+            <a:endParaRPr lang="en-US" altLang="zh-TW" dirty="0">
+              <a:latin typeface="標楷體" panose="03000509000000000000" pitchFamily="65" charset="-120"/>
+              <a:ea typeface="標楷體" panose="03000509000000000000" pitchFamily="65" charset="-120"/>
+            </a:endParaRPr>
+          </a:p>
+          <a:p>
+            <a:pPr marL="514350" indent="-514350" algn="l">
+              <a:buFont typeface="+mj-lt"/>
+              <a:buAutoNum type="arabicPeriod"/>
+            </a:pPr>
+            <a:endParaRPr lang="en-US" altLang="zh-TW" dirty="0">
+              <a:latin typeface="標楷體" panose="03000509000000000000" pitchFamily="65" charset="-120"/>
+              <a:ea typeface="標楷體" panose="03000509000000000000" pitchFamily="65" charset="-120"/>
+            </a:endParaRPr>
+          </a:p>
+          <a:p>
+            <a:pPr marL="514350" indent="-514350" algn="l">
+              <a:buFont typeface="+mj-lt"/>
+              <a:buAutoNum type="arabicPeriod"/>
+            </a:pPr>
+            <a:r>
+              <a:rPr lang="zh-TW" altLang="en-US" dirty="0">
+                <a:latin typeface="標楷體" panose="03000509000000000000" pitchFamily="65" charset="-120"/>
+                <a:ea typeface="標楷體" panose="03000509000000000000" pitchFamily="65" charset="-120"/>
+              </a:rPr>
+              <a:t>由於</a:t>
+            </a:r>
+            <a:r>
+              <a:rPr lang="en-US" altLang="zh-TW" dirty="0">
+                <a:latin typeface="標楷體" panose="03000509000000000000" pitchFamily="65" charset="-120"/>
+                <a:ea typeface="標楷體" panose="03000509000000000000" pitchFamily="65" charset="-120"/>
+              </a:rPr>
+              <a:t>monitor</a:t>
+            </a:r>
+            <a:r>
+              <a:rPr lang="zh-TW" altLang="en-US" dirty="0">
+                <a:latin typeface="標楷體" panose="03000509000000000000" pitchFamily="65" charset="-120"/>
+                <a:ea typeface="標楷體" panose="03000509000000000000" pitchFamily="65" charset="-120"/>
+              </a:rPr>
+              <a:t>需要時刻收集資料，永不停歇，所以在</a:t>
+            </a:r>
+            <a:r>
+              <a:rPr lang="en-US" altLang="zh-TW" dirty="0" err="1">
+                <a:latin typeface="標楷體" panose="03000509000000000000" pitchFamily="65" charset="-120"/>
+                <a:ea typeface="標楷體" panose="03000509000000000000" pitchFamily="65" charset="-120"/>
+              </a:rPr>
+              <a:t>main_phase</a:t>
+            </a:r>
+            <a:r>
+              <a:rPr lang="zh-TW" altLang="en-US" dirty="0">
+                <a:latin typeface="標楷體" panose="03000509000000000000" pitchFamily="65" charset="-120"/>
+                <a:ea typeface="標楷體" panose="03000509000000000000" pitchFamily="65" charset="-120"/>
+              </a:rPr>
+              <a:t>中使用</a:t>
+            </a:r>
+            <a:r>
+              <a:rPr lang="en-US" altLang="zh-TW" dirty="0">
+                <a:latin typeface="標楷體" panose="03000509000000000000" pitchFamily="65" charset="-120"/>
+                <a:ea typeface="標楷體" panose="03000509000000000000" pitchFamily="65" charset="-120"/>
+              </a:rPr>
+              <a:t>while</a:t>
+            </a:r>
+            <a:r>
+              <a:rPr lang="zh-TW" altLang="en-US" dirty="0">
+                <a:latin typeface="標楷體" panose="03000509000000000000" pitchFamily="65" charset="-120"/>
+                <a:ea typeface="標楷體" panose="03000509000000000000" pitchFamily="65" charset="-120"/>
+              </a:rPr>
+              <a:t>（</a:t>
+            </a:r>
+            <a:r>
+              <a:rPr lang="en-US" altLang="zh-TW" dirty="0">
+                <a:latin typeface="標楷體" panose="03000509000000000000" pitchFamily="65" charset="-120"/>
+                <a:ea typeface="標楷體" panose="03000509000000000000" pitchFamily="65" charset="-120"/>
+              </a:rPr>
+              <a:t>1</a:t>
+            </a:r>
+            <a:r>
+              <a:rPr lang="zh-TW" altLang="en-US" dirty="0">
+                <a:latin typeface="標楷體" panose="03000509000000000000" pitchFamily="65" charset="-120"/>
+                <a:ea typeface="標楷體" panose="03000509000000000000" pitchFamily="65" charset="-120"/>
+              </a:rPr>
+              <a:t>）迴圈來實現這一目的</a:t>
+            </a:r>
+            <a:endParaRPr lang="en-US" altLang="zh-TW" dirty="0">
+              <a:latin typeface="標楷體" panose="03000509000000000000" pitchFamily="65" charset="-120"/>
+              <a:ea typeface="標楷體" panose="03000509000000000000" pitchFamily="65" charset="-120"/>
+            </a:endParaRPr>
+          </a:p>
+        </p:txBody>
+      </p:sp>
+    </p:spTree>
+    <p:extLst>
+      <p:ext uri="{BB962C8B-B14F-4D97-AF65-F5344CB8AC3E}">
+        <p14:creationId xmlns:p14="http://schemas.microsoft.com/office/powerpoint/2010/main" val="1605105898"/>
+      </p:ext>
+    </p:extLst>
+  </p:cSld>
+  <p:clrMapOvr>
+    <a:masterClrMapping/>
+  </p:clrMapOvr>
+</p:sld>
+</file>
+
+<file path=ppt/slides/slide14.xml><?xml version="1.0" encoding="utf-8"?>
+<p:sld xmlns:a="http://schemas.openxmlformats.org/drawingml/2006/main" xmlns:r="http://schemas.openxmlformats.org/officeDocument/2006/relationships" xmlns:p="http://schemas.openxmlformats.org/presentationml/2006/main">
+  <p:cSld>
+    <p:spTree>
+      <p:nvGrpSpPr>
+        <p:cNvPr id="1" name="">
+          <a:extLst>
+            <a:ext uri="{FF2B5EF4-FFF2-40B4-BE49-F238E27FC236}">
+              <a16:creationId xmlns:a16="http://schemas.microsoft.com/office/drawing/2014/main" id="{ED20F8E2-05C7-663D-1BF6-785E7E00CD11}"/>
+            </a:ext>
+          </a:extLst>
+        </p:cNvPr>
+        <p:cNvGrpSpPr/>
+        <p:nvPr/>
+      </p:nvGrpSpPr>
+      <p:grpSpPr>
+        <a:xfrm>
+          <a:off x="0" y="0"/>
+          <a:ext cx="0" cy="0"/>
+          <a:chOff x="0" y="0"/>
+          <a:chExt cx="0" cy="0"/>
+        </a:xfrm>
+      </p:grpSpPr>
+      <p:sp>
+        <p:nvSpPr>
+          <p:cNvPr id="2" name="標題 1">
+            <a:extLst>
+              <a:ext uri="{FF2B5EF4-FFF2-40B4-BE49-F238E27FC236}">
+                <a16:creationId xmlns:a16="http://schemas.microsoft.com/office/drawing/2014/main" id="{E11B88F1-6924-3DE9-A031-B656D24AD0F6}"/>
+              </a:ext>
+            </a:extLst>
+          </p:cNvPr>
+          <p:cNvSpPr>
+            <a:spLocks noGrp="1"/>
+          </p:cNvSpPr>
+          <p:nvPr>
+            <p:ph type="title"/>
+          </p:nvPr>
+        </p:nvSpPr>
+        <p:spPr/>
+        <p:txBody>
+          <a:bodyPr/>
+          <a:lstStyle/>
+          <a:p>
+            <a:r>
+              <a:rPr lang="en-US" altLang="zh-TW" dirty="0"/>
+              <a:t>Monitor</a:t>
+            </a:r>
+            <a:r>
+              <a:rPr lang="zh-TW" altLang="en-US" dirty="0"/>
+              <a:t> </a:t>
+            </a:r>
+            <a:r>
+              <a:rPr lang="en-US" altLang="zh-TW" dirty="0"/>
+              <a:t>(7/)</a:t>
+            </a:r>
+            <a:endParaRPr lang="zh-TW" altLang="en-US" dirty="0"/>
+          </a:p>
+        </p:txBody>
+      </p:sp>
+      <p:sp>
+        <p:nvSpPr>
+          <p:cNvPr id="3" name="內容版面配置區 2">
+            <a:extLst>
+              <a:ext uri="{FF2B5EF4-FFF2-40B4-BE49-F238E27FC236}">
+                <a16:creationId xmlns:a16="http://schemas.microsoft.com/office/drawing/2014/main" id="{4E830D60-0058-8051-9E66-C1BC5E0F0993}"/>
+              </a:ext>
+            </a:extLst>
+          </p:cNvPr>
+          <p:cNvSpPr>
+            <a:spLocks noGrp="1"/>
+          </p:cNvSpPr>
+          <p:nvPr>
+            <p:ph idx="1"/>
+          </p:nvPr>
+        </p:nvSpPr>
+        <p:spPr/>
+        <p:txBody>
+          <a:bodyPr>
+            <a:normAutofit fontScale="92500" lnSpcReduction="20000"/>
+          </a:bodyPr>
+          <a:lstStyle/>
+          <a:p>
+            <a:pPr marL="514350" indent="-514350" algn="l">
+              <a:buFont typeface="+mj-lt"/>
+              <a:buAutoNum type="arabicPeriod"/>
+            </a:pPr>
+            <a:r>
+              <a:rPr lang="zh-TW" altLang="en-US" dirty="0">
+                <a:latin typeface="標楷體" panose="03000509000000000000" pitchFamily="65" charset="-120"/>
+                <a:ea typeface="標楷體" panose="03000509000000000000" pitchFamily="65" charset="-120"/>
+              </a:rPr>
+              <a:t>加入 </a:t>
+            </a:r>
+            <a:r>
+              <a:rPr lang="en-US" altLang="zh-TW" dirty="0">
+                <a:latin typeface="標楷體" panose="03000509000000000000" pitchFamily="65" charset="-120"/>
+                <a:ea typeface="標楷體" panose="03000509000000000000" pitchFamily="65" charset="-120"/>
+              </a:rPr>
+              <a:t>input/output monitor </a:t>
+            </a:r>
+            <a:r>
+              <a:rPr lang="zh-TW" altLang="en-US" dirty="0">
+                <a:latin typeface="標楷體" panose="03000509000000000000" pitchFamily="65" charset="-120"/>
+                <a:ea typeface="標楷體" panose="03000509000000000000" pitchFamily="65" charset="-120"/>
+              </a:rPr>
+              <a:t>後的樹狀圖</a:t>
+            </a:r>
+            <a:endParaRPr lang="en-US" altLang="zh-CN" dirty="0">
+              <a:latin typeface="標楷體" panose="03000509000000000000" pitchFamily="65" charset="-120"/>
+              <a:ea typeface="標楷體" panose="03000509000000000000" pitchFamily="65" charset="-120"/>
+            </a:endParaRPr>
+          </a:p>
+          <a:p>
+            <a:pPr marL="514350" indent="-514350" algn="l">
+              <a:buFont typeface="+mj-lt"/>
+              <a:buAutoNum type="arabicPeriod"/>
+            </a:pPr>
+            <a:endParaRPr lang="en-US" altLang="zh-CN" dirty="0">
+              <a:latin typeface="標楷體" panose="03000509000000000000" pitchFamily="65" charset="-120"/>
+              <a:ea typeface="標楷體" panose="03000509000000000000" pitchFamily="65" charset="-120"/>
+            </a:endParaRPr>
+          </a:p>
+          <a:p>
+            <a:pPr marL="514350" indent="-514350" algn="l">
+              <a:buFont typeface="+mj-lt"/>
+              <a:buAutoNum type="arabicPeriod"/>
+            </a:pPr>
+            <a:endParaRPr lang="en-US" altLang="zh-CN" dirty="0">
+              <a:latin typeface="標楷體" panose="03000509000000000000" pitchFamily="65" charset="-120"/>
+              <a:ea typeface="標楷體" panose="03000509000000000000" pitchFamily="65" charset="-120"/>
+            </a:endParaRPr>
+          </a:p>
+          <a:p>
+            <a:pPr marL="514350" indent="-514350" algn="l">
+              <a:buFont typeface="+mj-lt"/>
+              <a:buAutoNum type="arabicPeriod"/>
+            </a:pPr>
+            <a:endParaRPr lang="en-US" altLang="zh-CN" dirty="0">
+              <a:latin typeface="標楷體" panose="03000509000000000000" pitchFamily="65" charset="-120"/>
+              <a:ea typeface="標楷體" panose="03000509000000000000" pitchFamily="65" charset="-120"/>
+            </a:endParaRPr>
+          </a:p>
+          <a:p>
+            <a:pPr marL="514350" indent="-514350" algn="l">
+              <a:buFont typeface="+mj-lt"/>
+              <a:buAutoNum type="arabicPeriod"/>
+            </a:pPr>
+            <a:endParaRPr lang="en-US" altLang="zh-CN" dirty="0">
+              <a:latin typeface="標楷體" panose="03000509000000000000" pitchFamily="65" charset="-120"/>
+              <a:ea typeface="標楷體" panose="03000509000000000000" pitchFamily="65" charset="-120"/>
+            </a:endParaRPr>
+          </a:p>
+          <a:p>
+            <a:pPr marL="514350" indent="-514350" algn="l">
+              <a:buFont typeface="+mj-lt"/>
+              <a:buAutoNum type="arabicPeriod"/>
+            </a:pPr>
+            <a:endParaRPr lang="en-US" altLang="zh-CN" dirty="0">
+              <a:latin typeface="標楷體" panose="03000509000000000000" pitchFamily="65" charset="-120"/>
+              <a:ea typeface="標楷體" panose="03000509000000000000" pitchFamily="65" charset="-120"/>
+            </a:endParaRPr>
+          </a:p>
+          <a:p>
+            <a:pPr marL="514350" indent="-514350" algn="l">
+              <a:buFont typeface="+mj-lt"/>
+              <a:buAutoNum type="arabicPeriod"/>
+            </a:pPr>
+            <a:endParaRPr lang="en-US" altLang="zh-CN" dirty="0">
+              <a:latin typeface="標楷體" panose="03000509000000000000" pitchFamily="65" charset="-120"/>
+              <a:ea typeface="標楷體" panose="03000509000000000000" pitchFamily="65" charset="-120"/>
+            </a:endParaRPr>
+          </a:p>
+          <a:p>
+            <a:pPr marL="514350" indent="-514350" algn="l">
+              <a:buFont typeface="+mj-lt"/>
+              <a:buAutoNum type="arabicPeriod"/>
+            </a:pPr>
+            <a:r>
+              <a:rPr lang="zh-TW" altLang="en-US" dirty="0">
+                <a:latin typeface="標楷體" panose="03000509000000000000" pitchFamily="65" charset="-120"/>
+                <a:ea typeface="標楷體" panose="03000509000000000000" pitchFamily="65" charset="-120"/>
+              </a:rPr>
+              <a:t>為什麼需要 </a:t>
+            </a:r>
+            <a:r>
+              <a:rPr lang="en-US" altLang="zh-TW" dirty="0">
+                <a:latin typeface="標楷體" panose="03000509000000000000" pitchFamily="65" charset="-120"/>
+                <a:ea typeface="標楷體" panose="03000509000000000000" pitchFamily="65" charset="-120"/>
+              </a:rPr>
+              <a:t>input monitor</a:t>
+            </a:r>
+          </a:p>
+          <a:p>
+            <a:pPr lvl="1"/>
+            <a:r>
+              <a:rPr lang="zh-CN" altLang="en-US" dirty="0">
+                <a:latin typeface="標楷體" panose="03000509000000000000" pitchFamily="65" charset="-120"/>
+                <a:ea typeface="標楷體" panose="03000509000000000000" pitchFamily="65" charset="-120"/>
+              </a:rPr>
+              <a:t>在一個大型的項目中，</a:t>
+            </a:r>
+            <a:r>
+              <a:rPr lang="en-US" altLang="zh-CN" dirty="0">
+                <a:latin typeface="標楷體" panose="03000509000000000000" pitchFamily="65" charset="-120"/>
+                <a:ea typeface="標楷體" panose="03000509000000000000" pitchFamily="65" charset="-120"/>
+              </a:rPr>
+              <a:t>driver</a:t>
+            </a:r>
+            <a:r>
+              <a:rPr lang="zh-CN" altLang="en-US" dirty="0">
+                <a:latin typeface="標楷體" panose="03000509000000000000" pitchFamily="65" charset="-120"/>
+                <a:ea typeface="標楷體" panose="03000509000000000000" pitchFamily="65" charset="-120"/>
+              </a:rPr>
+              <a:t>根據某一協定發送資料，而</a:t>
+            </a:r>
+            <a:r>
+              <a:rPr lang="en-US" altLang="zh-CN" dirty="0">
+                <a:latin typeface="標楷體" panose="03000509000000000000" pitchFamily="65" charset="-120"/>
+                <a:ea typeface="標楷體" panose="03000509000000000000" pitchFamily="65" charset="-120"/>
+              </a:rPr>
+              <a:t>monitor</a:t>
+            </a:r>
+            <a:r>
+              <a:rPr lang="zh-CN" altLang="en-US" dirty="0">
+                <a:latin typeface="標楷體" panose="03000509000000000000" pitchFamily="65" charset="-120"/>
+                <a:ea typeface="標楷體" panose="03000509000000000000" pitchFamily="65" charset="-120"/>
+              </a:rPr>
+              <a:t>根據這種協定收集資料</a:t>
+            </a:r>
+            <a:endParaRPr lang="en-US" altLang="zh-CN" dirty="0">
+              <a:latin typeface="標楷體" panose="03000509000000000000" pitchFamily="65" charset="-120"/>
+              <a:ea typeface="標楷體" panose="03000509000000000000" pitchFamily="65" charset="-120"/>
+            </a:endParaRPr>
+          </a:p>
+          <a:p>
+            <a:pPr lvl="1"/>
+            <a:r>
+              <a:rPr lang="zh-CN" altLang="en-US" dirty="0">
+                <a:latin typeface="標楷體" panose="03000509000000000000" pitchFamily="65" charset="-120"/>
+                <a:ea typeface="標楷體" panose="03000509000000000000" pitchFamily="65" charset="-120"/>
+              </a:rPr>
+              <a:t>如果</a:t>
+            </a:r>
+            <a:r>
+              <a:rPr lang="en-US" altLang="zh-CN" dirty="0">
+                <a:latin typeface="標楷體" panose="03000509000000000000" pitchFamily="65" charset="-120"/>
+                <a:ea typeface="標楷體" panose="03000509000000000000" pitchFamily="65" charset="-120"/>
+              </a:rPr>
+              <a:t>driver</a:t>
+            </a:r>
+            <a:r>
+              <a:rPr lang="zh-CN" altLang="en-US" dirty="0">
+                <a:latin typeface="標楷體" panose="03000509000000000000" pitchFamily="65" charset="-120"/>
+                <a:ea typeface="標楷體" panose="03000509000000000000" pitchFamily="65" charset="-120"/>
+              </a:rPr>
+              <a:t>和</a:t>
+            </a:r>
+            <a:r>
+              <a:rPr lang="en-US" altLang="zh-CN" dirty="0">
+                <a:latin typeface="標楷體" panose="03000509000000000000" pitchFamily="65" charset="-120"/>
+                <a:ea typeface="標楷體" panose="03000509000000000000" pitchFamily="65" charset="-120"/>
+              </a:rPr>
+              <a:t>monitor</a:t>
+            </a:r>
+            <a:r>
+              <a:rPr lang="zh-CN" altLang="en-US" dirty="0">
+                <a:latin typeface="標楷體" panose="03000509000000000000" pitchFamily="65" charset="-120"/>
+                <a:ea typeface="標楷體" panose="03000509000000000000" pitchFamily="65" charset="-120"/>
+              </a:rPr>
+              <a:t>由不同人實現，那可以減少其中一方對協定理解的錯誤</a:t>
+            </a:r>
+            <a:endParaRPr lang="en-US" altLang="zh-CN" dirty="0">
+              <a:latin typeface="標楷體" panose="03000509000000000000" pitchFamily="65" charset="-120"/>
+              <a:ea typeface="標楷體" panose="03000509000000000000" pitchFamily="65" charset="-120"/>
+            </a:endParaRPr>
+          </a:p>
+        </p:txBody>
+      </p:sp>
+      <p:pic>
+        <p:nvPicPr>
+          <p:cNvPr id="5" name="圖片 4">
+            <a:extLst>
+              <a:ext uri="{FF2B5EF4-FFF2-40B4-BE49-F238E27FC236}">
+                <a16:creationId xmlns:a16="http://schemas.microsoft.com/office/drawing/2014/main" id="{6089410C-45DA-F5CF-33EF-D8690D825361}"/>
+              </a:ext>
+            </a:extLst>
+          </p:cNvPr>
+          <p:cNvPicPr>
+            <a:picLocks noChangeAspect="1"/>
+          </p:cNvPicPr>
+          <p:nvPr/>
+        </p:nvPicPr>
+        <p:blipFill>
+          <a:blip r:embed="rId3"/>
+          <a:stretch>
+            <a:fillRect/>
+          </a:stretch>
+        </p:blipFill>
+        <p:spPr>
+          <a:xfrm>
+            <a:off x="2733253" y="2360033"/>
+            <a:ext cx="5847155" cy="1984581"/>
+          </a:xfrm>
+          <a:prstGeom prst="rect">
+            <a:avLst/>
+          </a:prstGeom>
+          <a:ln>
+            <a:solidFill>
+              <a:schemeClr val="tx1"/>
+            </a:solidFill>
+          </a:ln>
+        </p:spPr>
+      </p:pic>
+    </p:spTree>
+    <p:extLst>
+      <p:ext uri="{BB962C8B-B14F-4D97-AF65-F5344CB8AC3E}">
+        <p14:creationId xmlns:p14="http://schemas.microsoft.com/office/powerpoint/2010/main" val="665569652"/>
+      </p:ext>
+    </p:extLst>
+  </p:cSld>
+  <p:clrMapOvr>
+    <a:masterClrMapping/>
+  </p:clrMapOvr>
+</p:sld>
+</file>
+
+<file path=ppt/slides/slide15.xml><?xml version="1.0" encoding="utf-8"?>
+<p:sld xmlns:a="http://schemas.openxmlformats.org/drawingml/2006/main" xmlns:r="http://schemas.openxmlformats.org/officeDocument/2006/relationships" xmlns:p="http://schemas.openxmlformats.org/presentationml/2006/main">
+  <p:cSld>
+    <p:spTree>
+      <p:nvGrpSpPr>
+        <p:cNvPr id="1" name="">
+          <a:extLst>
+            <a:ext uri="{FF2B5EF4-FFF2-40B4-BE49-F238E27FC236}">
+              <a16:creationId xmlns:a16="http://schemas.microsoft.com/office/drawing/2014/main" id="{9E4C1ED4-6F5E-E3CA-F0AD-569EE09A5340}"/>
+            </a:ext>
+          </a:extLst>
+        </p:cNvPr>
+        <p:cNvGrpSpPr/>
+        <p:nvPr/>
+      </p:nvGrpSpPr>
+      <p:grpSpPr>
+        <a:xfrm>
+          <a:off x="0" y="0"/>
+          <a:ext cx="0" cy="0"/>
+          <a:chOff x="0" y="0"/>
+          <a:chExt cx="0" cy="0"/>
+        </a:xfrm>
+      </p:grpSpPr>
+      <p:sp>
+        <p:nvSpPr>
+          <p:cNvPr id="2" name="標題 1">
+            <a:extLst>
+              <a:ext uri="{FF2B5EF4-FFF2-40B4-BE49-F238E27FC236}">
+                <a16:creationId xmlns:a16="http://schemas.microsoft.com/office/drawing/2014/main" id="{001B43A7-F1B1-AAB9-37FD-EE3C12C8E0BC}"/>
+              </a:ext>
+            </a:extLst>
+          </p:cNvPr>
+          <p:cNvSpPr>
+            <a:spLocks noGrp="1"/>
+          </p:cNvSpPr>
+          <p:nvPr>
+            <p:ph type="title"/>
+          </p:nvPr>
+        </p:nvSpPr>
+        <p:spPr/>
+        <p:txBody>
+          <a:bodyPr/>
+          <a:lstStyle/>
+          <a:p>
+            <a:r>
+              <a:rPr lang="en-US" altLang="zh-TW" dirty="0"/>
+              <a:t>Agent</a:t>
+            </a:r>
+            <a:r>
+              <a:rPr lang="zh-TW" altLang="en-US" dirty="0"/>
+              <a:t> </a:t>
+            </a:r>
+            <a:r>
+              <a:rPr lang="en-US" altLang="zh-TW" dirty="0"/>
+              <a:t>(8/)</a:t>
+            </a:r>
+            <a:endParaRPr lang="zh-TW" altLang="en-US" dirty="0"/>
+          </a:p>
+        </p:txBody>
+      </p:sp>
+      <p:sp>
+        <p:nvSpPr>
+          <p:cNvPr id="3" name="內容版面配置區 2">
+            <a:extLst>
+              <a:ext uri="{FF2B5EF4-FFF2-40B4-BE49-F238E27FC236}">
+                <a16:creationId xmlns:a16="http://schemas.microsoft.com/office/drawing/2014/main" id="{AEA50302-3860-6863-05F2-D1595FA5CB7D}"/>
+              </a:ext>
+            </a:extLst>
+          </p:cNvPr>
+          <p:cNvSpPr>
+            <a:spLocks noGrp="1"/>
+          </p:cNvSpPr>
+          <p:nvPr>
+            <p:ph idx="1"/>
+          </p:nvPr>
+        </p:nvSpPr>
+        <p:spPr/>
+        <p:txBody>
+          <a:bodyPr>
+            <a:normAutofit/>
+          </a:bodyPr>
+          <a:lstStyle/>
+          <a:p>
+            <a:pPr marL="0" indent="0" algn="l">
+              <a:buNone/>
+            </a:pPr>
+            <a:endParaRPr lang="en-US" altLang="zh-CN" dirty="0">
+              <a:latin typeface="標楷體" panose="03000509000000000000" pitchFamily="65" charset="-120"/>
+              <a:ea typeface="標楷體" panose="03000509000000000000" pitchFamily="65" charset="-120"/>
+            </a:endParaRPr>
+          </a:p>
+        </p:txBody>
+      </p:sp>
+    </p:spTree>
+    <p:extLst>
+      <p:ext uri="{BB962C8B-B14F-4D97-AF65-F5344CB8AC3E}">
+        <p14:creationId xmlns:p14="http://schemas.microsoft.com/office/powerpoint/2010/main" val="4126042550"/>
+      </p:ext>
+    </p:extLst>
+  </p:cSld>
+  <p:clrMapOvr>
+    <a:masterClrMapping/>
+  </p:clrMapOvr>
+</p:sld>
+</file>
+
 <file path=ppt/slides/slide2.xml><?xml version="1.0" encoding="utf-8"?>
 <p:sld xmlns:a="http://schemas.openxmlformats.org/drawingml/2006/main" xmlns:r="http://schemas.openxmlformats.org/officeDocument/2006/relationships" xmlns:p="http://schemas.openxmlformats.org/presentationml/2006/main">
   <p:cSld>
@@ -5250,7 +8045,7 @@
           <a:p>
             <a:r>
               <a:rPr lang="zh-TW" altLang="en-US" dirty="0"/>
-              <a:t>加入以下七種項目即可組成 </a:t>
+              <a:t>加入以下七種項目來組成 </a:t>
             </a:r>
             <a:r>
               <a:rPr lang="en-US" altLang="zh-TW" dirty="0"/>
@@ -5367,10 +8162,335 @@
           </a:p>
         </p:txBody>
       </p:sp>
+      <p:pic>
+        <p:nvPicPr>
+          <p:cNvPr id="4" name="內容版面配置區 3">
+            <a:extLst>
+              <a:ext uri="{FF2B5EF4-FFF2-40B4-BE49-F238E27FC236}">
+                <a16:creationId xmlns:a16="http://schemas.microsoft.com/office/drawing/2014/main" id="{B389C5A0-D5A6-35EF-4752-EA8EF133B730}"/>
+              </a:ext>
+            </a:extLst>
+          </p:cNvPr>
+          <p:cNvPicPr>
+            <a:picLocks noChangeAspect="1"/>
+          </p:cNvPicPr>
+          <p:nvPr/>
+        </p:nvPicPr>
+        <p:blipFill>
+          <a:blip r:embed="rId2"/>
+          <a:stretch>
+            <a:fillRect/>
+          </a:stretch>
+        </p:blipFill>
+        <p:spPr>
+          <a:xfrm>
+            <a:off x="6301627" y="2731698"/>
+            <a:ext cx="5052173" cy="3445265"/>
+          </a:xfrm>
+          <a:prstGeom prst="rect">
+            <a:avLst/>
+          </a:prstGeom>
+          <a:ln>
+            <a:solidFill>
+              <a:schemeClr val="tx1"/>
+            </a:solidFill>
+          </a:ln>
+        </p:spPr>
+      </p:pic>
     </p:spTree>
     <p:extLst>
       <p:ext uri="{BB962C8B-B14F-4D97-AF65-F5344CB8AC3E}">
         <p14:creationId xmlns:p14="http://schemas.microsoft.com/office/powerpoint/2010/main" val="156410506"/>
+      </p:ext>
+    </p:extLst>
+  </p:cSld>
+  <p:clrMapOvr>
+    <a:masterClrMapping/>
+  </p:clrMapOvr>
+</p:sld>
+</file>
+
+<file path=ppt/slides/slide9.xml><?xml version="1.0" encoding="utf-8"?>
+<p:sld xmlns:a="http://schemas.openxmlformats.org/drawingml/2006/main" xmlns:r="http://schemas.openxmlformats.org/officeDocument/2006/relationships" xmlns:p="http://schemas.openxmlformats.org/presentationml/2006/main">
+  <p:cSld>
+    <p:spTree>
+      <p:nvGrpSpPr>
+        <p:cNvPr id="1" name="">
+          <a:extLst>
+            <a:ext uri="{FF2B5EF4-FFF2-40B4-BE49-F238E27FC236}">
+              <a16:creationId xmlns:a16="http://schemas.microsoft.com/office/drawing/2014/main" id="{8A947E26-8140-5A8C-3A74-81AD6B2E5C7B}"/>
+            </a:ext>
+          </a:extLst>
+        </p:cNvPr>
+        <p:cNvGrpSpPr/>
+        <p:nvPr/>
+      </p:nvGrpSpPr>
+      <p:grpSpPr>
+        <a:xfrm>
+          <a:off x="0" y="0"/>
+          <a:ext cx="0" cy="0"/>
+          <a:chOff x="0" y="0"/>
+          <a:chExt cx="0" cy="0"/>
+        </a:xfrm>
+      </p:grpSpPr>
+      <p:sp>
+        <p:nvSpPr>
+          <p:cNvPr id="2" name="標題 1">
+            <a:extLst>
+              <a:ext uri="{FF2B5EF4-FFF2-40B4-BE49-F238E27FC236}">
+                <a16:creationId xmlns:a16="http://schemas.microsoft.com/office/drawing/2014/main" id="{692FD79E-5213-31AF-6C0A-5E515AA914CA}"/>
+              </a:ext>
+            </a:extLst>
+          </p:cNvPr>
+          <p:cNvSpPr>
+            <a:spLocks noGrp="1"/>
+          </p:cNvSpPr>
+          <p:nvPr>
+            <p:ph type="title"/>
+          </p:nvPr>
+        </p:nvSpPr>
+        <p:spPr/>
+        <p:txBody>
+          <a:bodyPr/>
+          <a:lstStyle/>
+          <a:p>
+            <a:r>
+              <a:rPr lang="en-US" altLang="zh-TW" dirty="0"/>
+              <a:t>Transation</a:t>
+            </a:r>
+            <a:r>
+              <a:rPr lang="zh-TW" altLang="en-US" dirty="0"/>
+              <a:t> </a:t>
+            </a:r>
+            <a:r>
+              <a:rPr lang="en-US" altLang="zh-TW" dirty="0"/>
+              <a:t>(2/)</a:t>
+            </a:r>
+            <a:endParaRPr lang="zh-TW" altLang="en-US" dirty="0"/>
+          </a:p>
+        </p:txBody>
+      </p:sp>
+      <p:sp>
+        <p:nvSpPr>
+          <p:cNvPr id="3" name="內容版面配置區 2">
+            <a:extLst>
+              <a:ext uri="{FF2B5EF4-FFF2-40B4-BE49-F238E27FC236}">
+                <a16:creationId xmlns:a16="http://schemas.microsoft.com/office/drawing/2014/main" id="{388F7D65-5796-BE80-A98D-268CF4ACCEA3}"/>
+              </a:ext>
+            </a:extLst>
+          </p:cNvPr>
+          <p:cNvSpPr>
+            <a:spLocks noGrp="1"/>
+          </p:cNvSpPr>
+          <p:nvPr>
+            <p:ph idx="1"/>
+          </p:nvPr>
+        </p:nvSpPr>
+        <p:spPr/>
+        <p:txBody>
+          <a:bodyPr>
+            <a:normAutofit lnSpcReduction="10000"/>
+          </a:bodyPr>
+          <a:lstStyle/>
+          <a:p>
+            <a:r>
+              <a:rPr lang="zh-TW" altLang="en-US" dirty="0"/>
+              <a:t>在</a:t>
+            </a:r>
+            <a:r>
+              <a:rPr lang="en-US" altLang="zh-TW" dirty="0"/>
+              <a:t>UVM</a:t>
+            </a:r>
+            <a:r>
+              <a:rPr lang="zh-TW" altLang="en-US" dirty="0"/>
+              <a:t>中，所有的</a:t>
+            </a:r>
+            <a:r>
+              <a:rPr lang="en-US" altLang="zh-TW" dirty="0"/>
+              <a:t>transaction</a:t>
+            </a:r>
+            <a:r>
+              <a:rPr lang="zh-TW" altLang="en-US" dirty="0"/>
+              <a:t>都要從</a:t>
+            </a:r>
+            <a:r>
+              <a:rPr lang="en-US" altLang="zh-TW" dirty="0" err="1"/>
+              <a:t>uvm_sequence_item</a:t>
+            </a:r>
+            <a:r>
+              <a:rPr lang="zh-TW" altLang="en-US" dirty="0"/>
+              <a:t>派生</a:t>
+            </a:r>
+            <a:endParaRPr lang="en-US" altLang="zh-TW" dirty="0"/>
+          </a:p>
+          <a:p>
+            <a:r>
+              <a:rPr lang="zh-TW" altLang="en-US" dirty="0"/>
+              <a:t>只有從</a:t>
+            </a:r>
+            <a:r>
+              <a:rPr lang="en-US" altLang="zh-TW" dirty="0" err="1"/>
+              <a:t>uvm_sequence_item</a:t>
+            </a:r>
+            <a:r>
+              <a:rPr lang="zh-TW" altLang="en-US" dirty="0"/>
+              <a:t>派生的</a:t>
+            </a:r>
+            <a:r>
+              <a:rPr lang="en-US" altLang="zh-TW" dirty="0"/>
+              <a:t>transaction</a:t>
+            </a:r>
+            <a:br>
+              <a:rPr lang="en-US" altLang="zh-TW" dirty="0"/>
+            </a:br>
+            <a:r>
+              <a:rPr lang="zh-TW" altLang="en-US" dirty="0"/>
+              <a:t>才可以使用</a:t>
+            </a:r>
+            <a:r>
+              <a:rPr lang="en-US" altLang="zh-TW" dirty="0"/>
+              <a:t>UVM</a:t>
+            </a:r>
+            <a:r>
+              <a:rPr lang="zh-TW" altLang="en-US" dirty="0"/>
+              <a:t>中強大的</a:t>
+            </a:r>
+            <a:r>
+              <a:rPr lang="en-US" altLang="zh-TW" dirty="0">
+                <a:solidFill>
+                  <a:srgbClr val="FF0000"/>
+                </a:solidFill>
+              </a:rPr>
+              <a:t>sequence</a:t>
+            </a:r>
+            <a:r>
+              <a:rPr lang="zh-TW" altLang="en-US" dirty="0">
+                <a:solidFill>
+                  <a:srgbClr val="FF0000"/>
+                </a:solidFill>
+              </a:rPr>
+              <a:t>機制</a:t>
+            </a:r>
+            <a:endParaRPr lang="en-US" altLang="zh-TW" dirty="0">
+              <a:solidFill>
+                <a:srgbClr val="FF0000"/>
+              </a:solidFill>
+            </a:endParaRPr>
+          </a:p>
+          <a:p>
+            <a:endParaRPr lang="en-US" altLang="zh-TW" dirty="0">
+              <a:solidFill>
+                <a:srgbClr val="FF0000"/>
+              </a:solidFill>
+            </a:endParaRPr>
+          </a:p>
+          <a:p>
+            <a:r>
+              <a:rPr lang="en-US" altLang="zh-TW" dirty="0"/>
+              <a:t>Transaction</a:t>
+            </a:r>
+            <a:r>
+              <a:rPr lang="zh-TW" altLang="en-US" dirty="0"/>
+              <a:t>有生命週期，它在模擬的某一時間產生</a:t>
+            </a:r>
+            <a:endParaRPr lang="en-US" altLang="zh-TW" dirty="0"/>
+          </a:p>
+          <a:p>
+            <a:pPr marL="914400" lvl="1" indent="-457200">
+              <a:buFont typeface="+mj-lt"/>
+              <a:buAutoNum type="arabicPeriod"/>
+            </a:pPr>
+            <a:r>
+              <a:rPr lang="zh-TW" altLang="en-US" dirty="0"/>
+              <a:t>經過</a:t>
+            </a:r>
+            <a:r>
+              <a:rPr lang="en-US" altLang="zh-TW" dirty="0"/>
+              <a:t>driver</a:t>
+            </a:r>
+            <a:r>
+              <a:rPr lang="zh-TW" altLang="en-US" dirty="0"/>
+              <a:t>驅動</a:t>
+            </a:r>
+            <a:endParaRPr lang="en-US" altLang="zh-TW" dirty="0"/>
+          </a:p>
+          <a:p>
+            <a:pPr marL="914400" lvl="1" indent="-457200">
+              <a:buFont typeface="+mj-lt"/>
+              <a:buAutoNum type="arabicPeriod"/>
+            </a:pPr>
+            <a:r>
+              <a:rPr lang="zh-TW" altLang="en-US" dirty="0"/>
+              <a:t>再經過</a:t>
+            </a:r>
+            <a:r>
+              <a:rPr lang="en-US" altLang="zh-TW" dirty="0"/>
+              <a:t>reference model</a:t>
+            </a:r>
+            <a:r>
+              <a:rPr lang="zh-TW" altLang="en-US" dirty="0"/>
+              <a:t>處理</a:t>
+            </a:r>
+            <a:endParaRPr lang="en-US" altLang="zh-TW" dirty="0"/>
+          </a:p>
+          <a:p>
+            <a:pPr marL="914400" lvl="1" indent="-457200">
+              <a:buFont typeface="+mj-lt"/>
+              <a:buAutoNum type="arabicPeriod"/>
+            </a:pPr>
+            <a:r>
+              <a:rPr lang="zh-TW" altLang="en-US" dirty="0"/>
+              <a:t>最終由</a:t>
+            </a:r>
+            <a:r>
+              <a:rPr lang="en-US" altLang="zh-TW" dirty="0"/>
+              <a:t>scoreboard</a:t>
+            </a:r>
+            <a:r>
+              <a:rPr lang="zh-TW" altLang="en-US" dirty="0"/>
+              <a:t>比較完成後，生命週期就結束了</a:t>
+            </a:r>
+            <a:endParaRPr lang="en-US" altLang="zh-TW" dirty="0"/>
+          </a:p>
+          <a:p>
+            <a:pPr marL="914400" lvl="1" indent="-457200">
+              <a:buFont typeface="+mj-lt"/>
+              <a:buAutoNum type="arabicPeriod"/>
+            </a:pPr>
+            <a:endParaRPr lang="en-US" altLang="zh-TW" dirty="0"/>
+          </a:p>
+          <a:p>
+            <a:r>
+              <a:rPr lang="en-US" altLang="zh-TW" dirty="0"/>
+              <a:t>transaction</a:t>
+            </a:r>
+            <a:r>
+              <a:rPr lang="zh-TW" altLang="en-US" dirty="0"/>
+              <a:t>定義後，就可以在</a:t>
+            </a:r>
+            <a:r>
+              <a:rPr lang="en-US" altLang="zh-TW" dirty="0"/>
+              <a:t>driver</a:t>
+            </a:r>
+            <a:r>
+              <a:rPr lang="zh-TW" altLang="en-US" dirty="0"/>
+              <a:t>中實現基於</a:t>
+            </a:r>
+            <a:r>
+              <a:rPr lang="en-US" altLang="zh-TW" dirty="0"/>
+              <a:t>transaction</a:t>
+            </a:r>
+            <a:r>
+              <a:rPr lang="zh-TW" altLang="en-US" dirty="0"/>
+              <a:t>的驅動</a:t>
+            </a:r>
+          </a:p>
+        </p:txBody>
+      </p:sp>
+    </p:spTree>
+    <p:extLst>
+      <p:ext uri="{BB962C8B-B14F-4D97-AF65-F5344CB8AC3E}">
+        <p14:creationId xmlns:p14="http://schemas.microsoft.com/office/powerpoint/2010/main" val="2014019353"/>
       </p:ext>
     </p:extLst>
   </p:cSld>
@@ -5693,4 +8813,319 @@
     </a:ext>
   </a:extLst>
 </a:theme>
+</file>
+
+<file path=ppt/theme/theme2.xml><?xml version="1.0" encoding="utf-8"?>
+<a:theme xmlns:a="http://schemas.openxmlformats.org/drawingml/2006/main" name="Office 佈景主題">
+  <a:themeElements>
+    <a:clrScheme name="Office">
+      <a:dk1>
+        <a:sysClr val="windowText" lastClr="000000"/>
+      </a:dk1>
+      <a:lt1>
+        <a:sysClr val="window" lastClr="FFFFFF"/>
+      </a:lt1>
+      <a:dk2>
+        <a:srgbClr val="0E2841"/>
+      </a:dk2>
+      <a:lt2>
+        <a:srgbClr val="E8E8E8"/>
+      </a:lt2>
+      <a:accent1>
+        <a:srgbClr val="156082"/>
+      </a:accent1>
+      <a:accent2>
+        <a:srgbClr val="E97132"/>
+      </a:accent2>
+      <a:accent3>
+        <a:srgbClr val="196B24"/>
+      </a:accent3>
+      <a:accent4>
+        <a:srgbClr val="0F9ED5"/>
+      </a:accent4>
+      <a:accent5>
+        <a:srgbClr val="A02B93"/>
+      </a:accent5>
+      <a:accent6>
+        <a:srgbClr val="4EA72E"/>
+      </a:accent6>
+      <a:hlink>
+        <a:srgbClr val="467886"/>
+      </a:hlink>
+      <a:folHlink>
+        <a:srgbClr val="96607D"/>
+      </a:folHlink>
+    </a:clrScheme>
+    <a:fontScheme name="Office">
+      <a:majorFont>
+        <a:latin typeface="Aptos Display" panose="02110004020202020204"/>
+        <a:ea typeface=""/>
+        <a:cs typeface=""/>
+        <a:font script="Jpan" typeface="游ゴシック Light"/>
+        <a:font script="Hang" typeface="맑은 고딕"/>
+        <a:font script="Hans" typeface="等线 Light"/>
+        <a:font script="Hant" typeface="新細明體"/>
+        <a:font script="Arab" typeface="Times New Roman"/>
+        <a:font script="Hebr" typeface="Times New Roman"/>
+        <a:font script="Thai" typeface="Angsana New"/>
+        <a:font script="Ethi" typeface="Nyala"/>
+        <a:font script="Beng" typeface="Vrinda"/>
+        <a:font script="Gujr" typeface="Shruti"/>
+        <a:font script="Khmr" typeface="MoolBoran"/>
+        <a:font script="Knda" typeface="Tunga"/>
+        <a:font script="Guru" typeface="Raavi"/>
+        <a:font script="Cans" typeface="Euphemia"/>
+        <a:font script="Cher" typeface="Plantagenet Cherokee"/>
+        <a:font script="Yiii" typeface="Microsoft Yi Baiti"/>
+        <a:font script="Tibt" typeface="Microsoft Himalaya"/>
+        <a:font script="Thaa" typeface="MV Boli"/>
+        <a:font script="Deva" typeface="Mangal"/>
+        <a:font script="Telu" typeface="Gautami"/>
+        <a:font script="Taml" typeface="Latha"/>
+        <a:font script="Syrc" typeface="Estrangelo Edessa"/>
+        <a:font script="Orya" typeface="Kalinga"/>
+        <a:font script="Mlym" typeface="Kartika"/>
+        <a:font script="Laoo" typeface="DokChampa"/>
+        <a:font script="Sinh" typeface="Iskoola Pota"/>
+        <a:font script="Mong" typeface="Mongolian Baiti"/>
+        <a:font script="Viet" typeface="Times New Roman"/>
+        <a:font script="Uigh" typeface="Microsoft Uighur"/>
+        <a:font script="Geor" typeface="Sylfaen"/>
+        <a:font script="Armn" typeface="Arial"/>
+        <a:font script="Bugi" typeface="Leelawadee UI"/>
+        <a:font script="Bopo" typeface="Microsoft JhengHei"/>
+        <a:font script="Java" typeface="Javanese Text"/>
+        <a:font script="Lisu" typeface="Segoe UI"/>
+        <a:font script="Mymr" typeface="Myanmar Text"/>
+        <a:font script="Nkoo" typeface="Ebrima"/>
+        <a:font script="Olck" typeface="Nirmala UI"/>
+        <a:font script="Osma" typeface="Ebrima"/>
+        <a:font script="Phag" typeface="Phagspa"/>
+        <a:font script="Syrn" typeface="Estrangelo Edessa"/>
+        <a:font script="Syrj" typeface="Estrangelo Edessa"/>
+        <a:font script="Syre" typeface="Estrangelo Edessa"/>
+        <a:font script="Sora" typeface="Nirmala UI"/>
+        <a:font script="Tale" typeface="Microsoft Tai Le"/>
+        <a:font script="Talu" typeface="Microsoft New Tai Lue"/>
+        <a:font script="Tfng" typeface="Ebrima"/>
+      </a:majorFont>
+      <a:minorFont>
+        <a:latin typeface="Aptos" panose="02110004020202020204"/>
+        <a:ea typeface=""/>
+        <a:cs typeface=""/>
+        <a:font script="Jpan" typeface="游ゴシック"/>
+        <a:font script="Hang" typeface="맑은 고딕"/>
+        <a:font script="Hans" typeface="等线"/>
+        <a:font script="Hant" typeface="新細明體"/>
+        <a:font script="Arab" typeface="Arial"/>
+        <a:font script="Hebr" typeface="Arial"/>
+        <a:font script="Thai" typeface="Cordia New"/>
+        <a:font script="Ethi" typeface="Nyala"/>
+        <a:font script="Beng" typeface="Vrinda"/>
+        <a:font script="Gujr" typeface="Shruti"/>
+        <a:font script="Khmr" typeface="DaunPenh"/>
+        <a:font script="Knda" typeface="Tunga"/>
+        <a:font script="Guru" typeface="Raavi"/>
+        <a:font script="Cans" typeface="Euphemia"/>
+        <a:font script="Cher" typeface="Plantagenet Cherokee"/>
+        <a:font script="Yiii" typeface="Microsoft Yi Baiti"/>
+        <a:font script="Tibt" typeface="Microsoft Himalaya"/>
+        <a:font script="Thaa" typeface="MV Boli"/>
+        <a:font script="Deva" typeface="Mangal"/>
+        <a:font script="Telu" typeface="Gautami"/>
+        <a:font script="Taml" typeface="Latha"/>
+        <a:font script="Syrc" typeface="Estrangelo Edessa"/>
+        <a:font script="Orya" typeface="Kalinga"/>
+        <a:font script="Mlym" typeface="Kartika"/>
+        <a:font script="Laoo" typeface="DokChampa"/>
+        <a:font script="Sinh" typeface="Iskoola Pota"/>
+        <a:font script="Mong" typeface="Mongolian Baiti"/>
+        <a:font script="Viet" typeface="Arial"/>
+        <a:font script="Uigh" typeface="Microsoft Uighur"/>
+        <a:font script="Geor" typeface="Sylfaen"/>
+        <a:font script="Armn" typeface="Arial"/>
+        <a:font script="Bugi" typeface="Leelawadee UI"/>
+        <a:font script="Bopo" typeface="Microsoft JhengHei"/>
+        <a:font script="Java" typeface="Javanese Text"/>
+        <a:font script="Lisu" typeface="Segoe UI"/>
+        <a:font script="Mymr" typeface="Myanmar Text"/>
+        <a:font script="Nkoo" typeface="Ebrima"/>
+        <a:font script="Olck" typeface="Nirmala UI"/>
+        <a:font script="Osma" typeface="Ebrima"/>
+        <a:font script="Phag" typeface="Phagspa"/>
+        <a:font script="Syrn" typeface="Estrangelo Edessa"/>
+        <a:font script="Syrj" typeface="Estrangelo Edessa"/>
+        <a:font script="Syre" typeface="Estrangelo Edessa"/>
+        <a:font script="Sora" typeface="Nirmala UI"/>
+        <a:font script="Tale" typeface="Microsoft Tai Le"/>
+        <a:font script="Talu" typeface="Microsoft New Tai Lue"/>
+        <a:font script="Tfng" typeface="Ebrima"/>
+      </a:minorFont>
+    </a:fontScheme>
+    <a:fmtScheme name="Office">
+      <a:fillStyleLst>
+        <a:solidFill>
+          <a:schemeClr val="phClr"/>
+        </a:solidFill>
+        <a:gradFill rotWithShape="1">
+          <a:gsLst>
+            <a:gs pos="0">
+              <a:schemeClr val="phClr">
+                <a:lumMod val="110000"/>
+                <a:satMod val="105000"/>
+                <a:tint val="67000"/>
+              </a:schemeClr>
+            </a:gs>
+            <a:gs pos="50000">
+              <a:schemeClr val="phClr">
+                <a:lumMod val="105000"/>
+                <a:satMod val="103000"/>
+                <a:tint val="73000"/>
+              </a:schemeClr>
+            </a:gs>
+            <a:gs pos="100000">
+              <a:schemeClr val="phClr">
+                <a:lumMod val="105000"/>
+                <a:satMod val="109000"/>
+                <a:tint val="81000"/>
+              </a:schemeClr>
+            </a:gs>
+          </a:gsLst>
+          <a:lin ang="5400000" scaled="0"/>
+        </a:gradFill>
+        <a:gradFill rotWithShape="1">
+          <a:gsLst>
+            <a:gs pos="0">
+              <a:schemeClr val="phClr">
+                <a:satMod val="103000"/>
+                <a:lumMod val="102000"/>
+                <a:tint val="94000"/>
+              </a:schemeClr>
+            </a:gs>
+            <a:gs pos="50000">
+              <a:schemeClr val="phClr">
+                <a:satMod val="110000"/>
+                <a:lumMod val="100000"/>
+                <a:shade val="100000"/>
+              </a:schemeClr>
+            </a:gs>
+            <a:gs pos="100000">
+              <a:schemeClr val="phClr">
+                <a:lumMod val="99000"/>
+                <a:satMod val="120000"/>
+                <a:shade val="78000"/>
+              </a:schemeClr>
+            </a:gs>
+          </a:gsLst>
+          <a:lin ang="5400000" scaled="0"/>
+        </a:gradFill>
+      </a:fillStyleLst>
+      <a:lnStyleLst>
+        <a:ln w="12700" cap="flat" cmpd="sng" algn="ctr">
+          <a:solidFill>
+            <a:schemeClr val="phClr"/>
+          </a:solidFill>
+          <a:prstDash val="solid"/>
+          <a:miter lim="800000"/>
+        </a:ln>
+        <a:ln w="19050" cap="flat" cmpd="sng" algn="ctr">
+          <a:solidFill>
+            <a:schemeClr val="phClr"/>
+          </a:solidFill>
+          <a:prstDash val="solid"/>
+          <a:miter lim="800000"/>
+        </a:ln>
+        <a:ln w="25400" cap="flat" cmpd="sng" algn="ctr">
+          <a:solidFill>
+            <a:schemeClr val="phClr"/>
+          </a:solidFill>
+          <a:prstDash val="solid"/>
+          <a:miter lim="800000"/>
+        </a:ln>
+      </a:lnStyleLst>
+      <a:effectStyleLst>
+        <a:effectStyle>
+          <a:effectLst/>
+        </a:effectStyle>
+        <a:effectStyle>
+          <a:effectLst/>
+        </a:effectStyle>
+        <a:effectStyle>
+          <a:effectLst>
+            <a:outerShdw blurRad="57150" dist="19050" dir="5400000" algn="ctr" rotWithShape="0">
+              <a:srgbClr val="000000">
+                <a:alpha val="63000"/>
+              </a:srgbClr>
+            </a:outerShdw>
+          </a:effectLst>
+        </a:effectStyle>
+      </a:effectStyleLst>
+      <a:bgFillStyleLst>
+        <a:solidFill>
+          <a:schemeClr val="phClr"/>
+        </a:solidFill>
+        <a:solidFill>
+          <a:schemeClr val="phClr">
+            <a:tint val="95000"/>
+            <a:satMod val="170000"/>
+          </a:schemeClr>
+        </a:solidFill>
+        <a:gradFill rotWithShape="1">
+          <a:gsLst>
+            <a:gs pos="0">
+              <a:schemeClr val="phClr">
+                <a:tint val="93000"/>
+                <a:satMod val="150000"/>
+                <a:shade val="98000"/>
+                <a:lumMod val="102000"/>
+              </a:schemeClr>
+            </a:gs>
+            <a:gs pos="50000">
+              <a:schemeClr val="phClr">
+                <a:tint val="98000"/>
+                <a:satMod val="130000"/>
+                <a:shade val="90000"/>
+                <a:lumMod val="103000"/>
+              </a:schemeClr>
+            </a:gs>
+            <a:gs pos="100000">
+              <a:schemeClr val="phClr">
+                <a:shade val="63000"/>
+                <a:satMod val="120000"/>
+              </a:schemeClr>
+            </a:gs>
+          </a:gsLst>
+          <a:lin ang="5400000" scaled="0"/>
+        </a:gradFill>
+      </a:bgFillStyleLst>
+    </a:fmtScheme>
+  </a:themeElements>
+  <a:objectDefaults>
+    <a:lnDef>
+      <a:spPr/>
+      <a:bodyPr/>
+      <a:lstStyle/>
+      <a:style>
+        <a:lnRef idx="2">
+          <a:schemeClr val="accent1"/>
+        </a:lnRef>
+        <a:fillRef idx="0">
+          <a:schemeClr val="accent1"/>
+        </a:fillRef>
+        <a:effectRef idx="1">
+          <a:schemeClr val="accent1"/>
+        </a:effectRef>
+        <a:fontRef idx="minor">
+          <a:schemeClr val="tx1"/>
+        </a:fontRef>
+      </a:style>
+    </a:lnDef>
+  </a:objectDefaults>
+  <a:extraClrSchemeLst/>
+  <a:extLst>
+    <a:ext uri="{05A4C25C-085E-4340-85A3-A5531E510DB2}">
+      <thm15:themeFamily xmlns:thm15="http://schemas.microsoft.com/office/thememl/2012/main" name="Office Theme" id="{2E142A2C-CD16-42D6-873A-C26D2A0506FA}" vid="{1BDDFF52-6CD6-40A5-AB3C-68EB2F1E4D0A}"/>
+    </a:ext>
+  </a:extLst>
+</a:theme>
 </file>
</xml_diff>

<commit_message>
Modify: UVM.pptx 1. Add: chapter 2 Basic UVM
</commit_message>
<xml_diff>
--- a/UVM/UVM.pptx
+++ b/UVM/UVM.pptx
@@ -5,7 +5,7 @@
     <p:sldMasterId id="2147483648" r:id="rId1"/>
   </p:sldMasterIdLst>
   <p:notesMasterIdLst>
-    <p:notesMasterId r:id="rId17"/>
+    <p:notesMasterId r:id="rId21"/>
   </p:notesMasterIdLst>
   <p:sldIdLst>
     <p:sldId id="256" r:id="rId2"/>
@@ -23,6 +23,10 @@
     <p:sldId id="269" r:id="rId14"/>
     <p:sldId id="270" r:id="rId15"/>
     <p:sldId id="271" r:id="rId16"/>
+    <p:sldId id="272" r:id="rId17"/>
+    <p:sldId id="273" r:id="rId18"/>
+    <p:sldId id="274" r:id="rId19"/>
+    <p:sldId id="275" r:id="rId20"/>
   </p:sldIdLst>
   <p:sldSz cx="12192000" cy="6858000"/>
   <p:notesSz cx="6858000" cy="9144000"/>
@@ -211,7 +215,7 @@
           <a:p>
             <a:fld id="{DC9BAD77-A9DC-412E-A1BD-F95D6ECE15BA}" type="datetimeFigureOut">
               <a:rPr lang="zh-TW" altLang="en-US" smtClean="0"/>
-              <a:t>2025/5/1</a:t>
+              <a:t>2025/7/3</a:t>
             </a:fld>
             <a:endParaRPr lang="zh-TW" altLang="en-US"/>
           </a:p>
@@ -562,6 +566,114 @@
 </p:notes>
 </file>
 
+<file path=ppt/notesSlides/notesSlide10.xml><?xml version="1.0" encoding="utf-8"?>
+<p:notes xmlns:a="http://schemas.openxmlformats.org/drawingml/2006/main" xmlns:r="http://schemas.openxmlformats.org/officeDocument/2006/relationships" xmlns:p="http://schemas.openxmlformats.org/presentationml/2006/main">
+  <p:cSld>
+    <p:spTree>
+      <p:nvGrpSpPr>
+        <p:cNvPr id="1" name="">
+          <a:extLst>
+            <a:ext uri="{FF2B5EF4-FFF2-40B4-BE49-F238E27FC236}">
+              <a16:creationId xmlns:a16="http://schemas.microsoft.com/office/drawing/2014/main" id="{C115016F-2395-A0A5-16CE-2779A203CC81}"/>
+            </a:ext>
+          </a:extLst>
+        </p:cNvPr>
+        <p:cNvGrpSpPr/>
+        <p:nvPr/>
+      </p:nvGrpSpPr>
+      <p:grpSpPr>
+        <a:xfrm>
+          <a:off x="0" y="0"/>
+          <a:ext cx="0" cy="0"/>
+          <a:chOff x="0" y="0"/>
+          <a:chExt cx="0" cy="0"/>
+        </a:xfrm>
+      </p:grpSpPr>
+      <p:sp>
+        <p:nvSpPr>
+          <p:cNvPr id="2" name="投影片影像版面配置區 1">
+            <a:extLst>
+              <a:ext uri="{FF2B5EF4-FFF2-40B4-BE49-F238E27FC236}">
+                <a16:creationId xmlns:a16="http://schemas.microsoft.com/office/drawing/2014/main" id="{54D77AC6-DDFD-7566-59AD-F86F05387FC7}"/>
+              </a:ext>
+            </a:extLst>
+          </p:cNvPr>
+          <p:cNvSpPr>
+            <a:spLocks noGrp="1" noRot="1" noChangeAspect="1"/>
+          </p:cNvSpPr>
+          <p:nvPr>
+            <p:ph type="sldImg"/>
+          </p:nvPr>
+        </p:nvSpPr>
+        <p:spPr/>
+      </p:sp>
+      <p:sp>
+        <p:nvSpPr>
+          <p:cNvPr id="3" name="備忘稿版面配置區 2">
+            <a:extLst>
+              <a:ext uri="{FF2B5EF4-FFF2-40B4-BE49-F238E27FC236}">
+                <a16:creationId xmlns:a16="http://schemas.microsoft.com/office/drawing/2014/main" id="{797E8CC5-9929-10C4-F837-6548B1A9E539}"/>
+              </a:ext>
+            </a:extLst>
+          </p:cNvPr>
+          <p:cNvSpPr>
+            <a:spLocks noGrp="1"/>
+          </p:cNvSpPr>
+          <p:nvPr>
+            <p:ph type="body" idx="1"/>
+          </p:nvPr>
+        </p:nvSpPr>
+        <p:spPr/>
+        <p:txBody>
+          <a:bodyPr/>
+          <a:lstStyle/>
+          <a:p>
+            <a:endParaRPr lang="zh-TW" altLang="en-US" dirty="0"/>
+          </a:p>
+        </p:txBody>
+      </p:sp>
+      <p:sp>
+        <p:nvSpPr>
+          <p:cNvPr id="4" name="投影片編號版面配置區 3">
+            <a:extLst>
+              <a:ext uri="{FF2B5EF4-FFF2-40B4-BE49-F238E27FC236}">
+                <a16:creationId xmlns:a16="http://schemas.microsoft.com/office/drawing/2014/main" id="{3CF46936-E50C-6FB0-DA0D-6E231427F2FF}"/>
+              </a:ext>
+            </a:extLst>
+          </p:cNvPr>
+          <p:cNvSpPr>
+            <a:spLocks noGrp="1"/>
+          </p:cNvSpPr>
+          <p:nvPr>
+            <p:ph type="sldNum" sz="quarter" idx="5"/>
+          </p:nvPr>
+        </p:nvSpPr>
+        <p:spPr/>
+        <p:txBody>
+          <a:bodyPr/>
+          <a:lstStyle/>
+          <a:p>
+            <a:fld id="{005DCC72-CBA4-423D-B8F5-4EF2030FF5C1}" type="slidenum">
+              <a:rPr lang="zh-TW" altLang="en-US" smtClean="0"/>
+              <a:t>19</a:t>
+            </a:fld>
+            <a:endParaRPr lang="zh-TW" altLang="en-US"/>
+          </a:p>
+        </p:txBody>
+      </p:sp>
+    </p:spTree>
+    <p:extLst>
+      <p:ext uri="{BB962C8B-B14F-4D97-AF65-F5344CB8AC3E}">
+        <p14:creationId xmlns:p14="http://schemas.microsoft.com/office/powerpoint/2010/main" val="1381063283"/>
+      </p:ext>
+    </p:extLst>
+  </p:cSld>
+  <p:clrMapOvr>
+    <a:masterClrMapping/>
+  </p:clrMapOvr>
+</p:notes>
+</file>
+
 <file path=ppt/notesSlides/notesSlide2.xml><?xml version="1.0" encoding="utf-8"?>
 <p:notes xmlns:a="http://schemas.openxmlformats.org/drawingml/2006/main" xmlns:r="http://schemas.openxmlformats.org/officeDocument/2006/relationships" xmlns:p="http://schemas.openxmlformats.org/presentationml/2006/main">
   <p:cSld>
@@ -1093,6 +1205,330 @@
     <p:extLst>
       <p:ext uri="{BB962C8B-B14F-4D97-AF65-F5344CB8AC3E}">
         <p14:creationId xmlns:p14="http://schemas.microsoft.com/office/powerpoint/2010/main" val="710619753"/>
+      </p:ext>
+    </p:extLst>
+  </p:cSld>
+  <p:clrMapOvr>
+    <a:masterClrMapping/>
+  </p:clrMapOvr>
+</p:notes>
+</file>
+
+<file path=ppt/notesSlides/notesSlide7.xml><?xml version="1.0" encoding="utf-8"?>
+<p:notes xmlns:a="http://schemas.openxmlformats.org/drawingml/2006/main" xmlns:r="http://schemas.openxmlformats.org/officeDocument/2006/relationships" xmlns:p="http://schemas.openxmlformats.org/presentationml/2006/main">
+  <p:cSld>
+    <p:spTree>
+      <p:nvGrpSpPr>
+        <p:cNvPr id="1" name="">
+          <a:extLst>
+            <a:ext uri="{FF2B5EF4-FFF2-40B4-BE49-F238E27FC236}">
+              <a16:creationId xmlns:a16="http://schemas.microsoft.com/office/drawing/2014/main" id="{EFED69AD-5895-7F42-C028-2BCF8B96BD74}"/>
+            </a:ext>
+          </a:extLst>
+        </p:cNvPr>
+        <p:cNvGrpSpPr/>
+        <p:nvPr/>
+      </p:nvGrpSpPr>
+      <p:grpSpPr>
+        <a:xfrm>
+          <a:off x="0" y="0"/>
+          <a:ext cx="0" cy="0"/>
+          <a:chOff x="0" y="0"/>
+          <a:chExt cx="0" cy="0"/>
+        </a:xfrm>
+      </p:grpSpPr>
+      <p:sp>
+        <p:nvSpPr>
+          <p:cNvPr id="2" name="投影片影像版面配置區 1">
+            <a:extLst>
+              <a:ext uri="{FF2B5EF4-FFF2-40B4-BE49-F238E27FC236}">
+                <a16:creationId xmlns:a16="http://schemas.microsoft.com/office/drawing/2014/main" id="{34C318EB-A1F5-47E0-33D1-FACAAC12C23D}"/>
+              </a:ext>
+            </a:extLst>
+          </p:cNvPr>
+          <p:cNvSpPr>
+            <a:spLocks noGrp="1" noRot="1" noChangeAspect="1"/>
+          </p:cNvSpPr>
+          <p:nvPr>
+            <p:ph type="sldImg"/>
+          </p:nvPr>
+        </p:nvSpPr>
+        <p:spPr/>
+      </p:sp>
+      <p:sp>
+        <p:nvSpPr>
+          <p:cNvPr id="3" name="備忘稿版面配置區 2">
+            <a:extLst>
+              <a:ext uri="{FF2B5EF4-FFF2-40B4-BE49-F238E27FC236}">
+                <a16:creationId xmlns:a16="http://schemas.microsoft.com/office/drawing/2014/main" id="{21E164E5-56B0-C216-66F9-74B1BF3A6820}"/>
+              </a:ext>
+            </a:extLst>
+          </p:cNvPr>
+          <p:cNvSpPr>
+            <a:spLocks noGrp="1"/>
+          </p:cNvSpPr>
+          <p:nvPr>
+            <p:ph type="body" idx="1"/>
+          </p:nvPr>
+        </p:nvSpPr>
+        <p:spPr/>
+        <p:txBody>
+          <a:bodyPr/>
+          <a:lstStyle/>
+          <a:p>
+            <a:endParaRPr lang="zh-TW" altLang="en-US" dirty="0"/>
+          </a:p>
+        </p:txBody>
+      </p:sp>
+      <p:sp>
+        <p:nvSpPr>
+          <p:cNvPr id="4" name="投影片編號版面配置區 3">
+            <a:extLst>
+              <a:ext uri="{FF2B5EF4-FFF2-40B4-BE49-F238E27FC236}">
+                <a16:creationId xmlns:a16="http://schemas.microsoft.com/office/drawing/2014/main" id="{587706E7-9B20-DE1E-2540-15E47B51E779}"/>
+              </a:ext>
+            </a:extLst>
+          </p:cNvPr>
+          <p:cNvSpPr>
+            <a:spLocks noGrp="1"/>
+          </p:cNvSpPr>
+          <p:nvPr>
+            <p:ph type="sldNum" sz="quarter" idx="5"/>
+          </p:nvPr>
+        </p:nvSpPr>
+        <p:spPr/>
+        <p:txBody>
+          <a:bodyPr/>
+          <a:lstStyle/>
+          <a:p>
+            <a:fld id="{005DCC72-CBA4-423D-B8F5-4EF2030FF5C1}" type="slidenum">
+              <a:rPr lang="zh-TW" altLang="en-US" smtClean="0"/>
+              <a:t>16</a:t>
+            </a:fld>
+            <a:endParaRPr lang="zh-TW" altLang="en-US"/>
+          </a:p>
+        </p:txBody>
+      </p:sp>
+    </p:spTree>
+    <p:extLst>
+      <p:ext uri="{BB962C8B-B14F-4D97-AF65-F5344CB8AC3E}">
+        <p14:creationId xmlns:p14="http://schemas.microsoft.com/office/powerpoint/2010/main" val="2434090472"/>
+      </p:ext>
+    </p:extLst>
+  </p:cSld>
+  <p:clrMapOvr>
+    <a:masterClrMapping/>
+  </p:clrMapOvr>
+</p:notes>
+</file>
+
+<file path=ppt/notesSlides/notesSlide8.xml><?xml version="1.0" encoding="utf-8"?>
+<p:notes xmlns:a="http://schemas.openxmlformats.org/drawingml/2006/main" xmlns:r="http://schemas.openxmlformats.org/officeDocument/2006/relationships" xmlns:p="http://schemas.openxmlformats.org/presentationml/2006/main">
+  <p:cSld>
+    <p:spTree>
+      <p:nvGrpSpPr>
+        <p:cNvPr id="1" name="">
+          <a:extLst>
+            <a:ext uri="{FF2B5EF4-FFF2-40B4-BE49-F238E27FC236}">
+              <a16:creationId xmlns:a16="http://schemas.microsoft.com/office/drawing/2014/main" id="{D028D72E-AC54-45E9-AC8D-C7A30EA1068B}"/>
+            </a:ext>
+          </a:extLst>
+        </p:cNvPr>
+        <p:cNvGrpSpPr/>
+        <p:nvPr/>
+      </p:nvGrpSpPr>
+      <p:grpSpPr>
+        <a:xfrm>
+          <a:off x="0" y="0"/>
+          <a:ext cx="0" cy="0"/>
+          <a:chOff x="0" y="0"/>
+          <a:chExt cx="0" cy="0"/>
+        </a:xfrm>
+      </p:grpSpPr>
+      <p:sp>
+        <p:nvSpPr>
+          <p:cNvPr id="2" name="投影片影像版面配置區 1">
+            <a:extLst>
+              <a:ext uri="{FF2B5EF4-FFF2-40B4-BE49-F238E27FC236}">
+                <a16:creationId xmlns:a16="http://schemas.microsoft.com/office/drawing/2014/main" id="{CDF1ED7E-EFC3-C4B5-8E55-433A37070149}"/>
+              </a:ext>
+            </a:extLst>
+          </p:cNvPr>
+          <p:cNvSpPr>
+            <a:spLocks noGrp="1" noRot="1" noChangeAspect="1"/>
+          </p:cNvSpPr>
+          <p:nvPr>
+            <p:ph type="sldImg"/>
+          </p:nvPr>
+        </p:nvSpPr>
+        <p:spPr/>
+      </p:sp>
+      <p:sp>
+        <p:nvSpPr>
+          <p:cNvPr id="3" name="備忘稿版面配置區 2">
+            <a:extLst>
+              <a:ext uri="{FF2B5EF4-FFF2-40B4-BE49-F238E27FC236}">
+                <a16:creationId xmlns:a16="http://schemas.microsoft.com/office/drawing/2014/main" id="{0E681D55-B291-79DB-26C2-AB42FA6CD585}"/>
+              </a:ext>
+            </a:extLst>
+          </p:cNvPr>
+          <p:cNvSpPr>
+            <a:spLocks noGrp="1"/>
+          </p:cNvSpPr>
+          <p:nvPr>
+            <p:ph type="body" idx="1"/>
+          </p:nvPr>
+        </p:nvSpPr>
+        <p:spPr/>
+        <p:txBody>
+          <a:bodyPr/>
+          <a:lstStyle/>
+          <a:p>
+            <a:endParaRPr lang="zh-TW" altLang="en-US" dirty="0"/>
+          </a:p>
+        </p:txBody>
+      </p:sp>
+      <p:sp>
+        <p:nvSpPr>
+          <p:cNvPr id="4" name="投影片編號版面配置區 3">
+            <a:extLst>
+              <a:ext uri="{FF2B5EF4-FFF2-40B4-BE49-F238E27FC236}">
+                <a16:creationId xmlns:a16="http://schemas.microsoft.com/office/drawing/2014/main" id="{DF1F0F94-D331-4E06-0817-A40DA841F4A6}"/>
+              </a:ext>
+            </a:extLst>
+          </p:cNvPr>
+          <p:cNvSpPr>
+            <a:spLocks noGrp="1"/>
+          </p:cNvSpPr>
+          <p:nvPr>
+            <p:ph type="sldNum" sz="quarter" idx="5"/>
+          </p:nvPr>
+        </p:nvSpPr>
+        <p:spPr/>
+        <p:txBody>
+          <a:bodyPr/>
+          <a:lstStyle/>
+          <a:p>
+            <a:fld id="{005DCC72-CBA4-423D-B8F5-4EF2030FF5C1}" type="slidenum">
+              <a:rPr lang="zh-TW" altLang="en-US" smtClean="0"/>
+              <a:t>17</a:t>
+            </a:fld>
+            <a:endParaRPr lang="zh-TW" altLang="en-US"/>
+          </a:p>
+        </p:txBody>
+      </p:sp>
+    </p:spTree>
+    <p:extLst>
+      <p:ext uri="{BB962C8B-B14F-4D97-AF65-F5344CB8AC3E}">
+        <p14:creationId xmlns:p14="http://schemas.microsoft.com/office/powerpoint/2010/main" val="3387105021"/>
+      </p:ext>
+    </p:extLst>
+  </p:cSld>
+  <p:clrMapOvr>
+    <a:masterClrMapping/>
+  </p:clrMapOvr>
+</p:notes>
+</file>
+
+<file path=ppt/notesSlides/notesSlide9.xml><?xml version="1.0" encoding="utf-8"?>
+<p:notes xmlns:a="http://schemas.openxmlformats.org/drawingml/2006/main" xmlns:r="http://schemas.openxmlformats.org/officeDocument/2006/relationships" xmlns:p="http://schemas.openxmlformats.org/presentationml/2006/main">
+  <p:cSld>
+    <p:spTree>
+      <p:nvGrpSpPr>
+        <p:cNvPr id="1" name="">
+          <a:extLst>
+            <a:ext uri="{FF2B5EF4-FFF2-40B4-BE49-F238E27FC236}">
+              <a16:creationId xmlns:a16="http://schemas.microsoft.com/office/drawing/2014/main" id="{5B99C5F3-06B6-8652-C523-9023B3BF2BF4}"/>
+            </a:ext>
+          </a:extLst>
+        </p:cNvPr>
+        <p:cNvGrpSpPr/>
+        <p:nvPr/>
+      </p:nvGrpSpPr>
+      <p:grpSpPr>
+        <a:xfrm>
+          <a:off x="0" y="0"/>
+          <a:ext cx="0" cy="0"/>
+          <a:chOff x="0" y="0"/>
+          <a:chExt cx="0" cy="0"/>
+        </a:xfrm>
+      </p:grpSpPr>
+      <p:sp>
+        <p:nvSpPr>
+          <p:cNvPr id="2" name="投影片影像版面配置區 1">
+            <a:extLst>
+              <a:ext uri="{FF2B5EF4-FFF2-40B4-BE49-F238E27FC236}">
+                <a16:creationId xmlns:a16="http://schemas.microsoft.com/office/drawing/2014/main" id="{A35096C0-DE79-B9E2-641B-A7DF54B40061}"/>
+              </a:ext>
+            </a:extLst>
+          </p:cNvPr>
+          <p:cNvSpPr>
+            <a:spLocks noGrp="1" noRot="1" noChangeAspect="1"/>
+          </p:cNvSpPr>
+          <p:nvPr>
+            <p:ph type="sldImg"/>
+          </p:nvPr>
+        </p:nvSpPr>
+        <p:spPr/>
+      </p:sp>
+      <p:sp>
+        <p:nvSpPr>
+          <p:cNvPr id="3" name="備忘稿版面配置區 2">
+            <a:extLst>
+              <a:ext uri="{FF2B5EF4-FFF2-40B4-BE49-F238E27FC236}">
+                <a16:creationId xmlns:a16="http://schemas.microsoft.com/office/drawing/2014/main" id="{23F9EF26-CD24-6FFF-3FDC-2CD2E1B6A831}"/>
+              </a:ext>
+            </a:extLst>
+          </p:cNvPr>
+          <p:cNvSpPr>
+            <a:spLocks noGrp="1"/>
+          </p:cNvSpPr>
+          <p:nvPr>
+            <p:ph type="body" idx="1"/>
+          </p:nvPr>
+        </p:nvSpPr>
+        <p:spPr/>
+        <p:txBody>
+          <a:bodyPr/>
+          <a:lstStyle/>
+          <a:p>
+            <a:endParaRPr lang="zh-TW" altLang="en-US" dirty="0"/>
+          </a:p>
+        </p:txBody>
+      </p:sp>
+      <p:sp>
+        <p:nvSpPr>
+          <p:cNvPr id="4" name="投影片編號版面配置區 3">
+            <a:extLst>
+              <a:ext uri="{FF2B5EF4-FFF2-40B4-BE49-F238E27FC236}">
+                <a16:creationId xmlns:a16="http://schemas.microsoft.com/office/drawing/2014/main" id="{3174FCF8-C22C-C316-5A88-0A8EE1397AD1}"/>
+              </a:ext>
+            </a:extLst>
+          </p:cNvPr>
+          <p:cNvSpPr>
+            <a:spLocks noGrp="1"/>
+          </p:cNvSpPr>
+          <p:nvPr>
+            <p:ph type="sldNum" sz="quarter" idx="5"/>
+          </p:nvPr>
+        </p:nvSpPr>
+        <p:spPr/>
+        <p:txBody>
+          <a:bodyPr/>
+          <a:lstStyle/>
+          <a:p>
+            <a:fld id="{005DCC72-CBA4-423D-B8F5-4EF2030FF5C1}" type="slidenum">
+              <a:rPr lang="zh-TW" altLang="en-US" smtClean="0"/>
+              <a:t>18</a:t>
+            </a:fld>
+            <a:endParaRPr lang="zh-TW" altLang="en-US"/>
+          </a:p>
+        </p:txBody>
+      </p:sp>
+    </p:spTree>
+    <p:extLst>
+      <p:ext uri="{BB962C8B-B14F-4D97-AF65-F5344CB8AC3E}">
+        <p14:creationId xmlns:p14="http://schemas.microsoft.com/office/powerpoint/2010/main" val="1581881475"/>
       </p:ext>
     </p:extLst>
   </p:cSld>
@@ -1249,7 +1685,7 @@
           <a:p>
             <a:fld id="{0F32A204-0AD4-466F-ABEA-B4DB33A37E21}" type="datetimeFigureOut">
               <a:rPr lang="zh-TW" altLang="en-US" smtClean="0"/>
-              <a:t>2025/5/1</a:t>
+              <a:t>2025/7/3</a:t>
             </a:fld>
             <a:endParaRPr lang="zh-TW" altLang="en-US"/>
           </a:p>
@@ -1447,7 +1883,7 @@
           <a:p>
             <a:fld id="{0F32A204-0AD4-466F-ABEA-B4DB33A37E21}" type="datetimeFigureOut">
               <a:rPr lang="zh-TW" altLang="en-US" smtClean="0"/>
-              <a:t>2025/5/1</a:t>
+              <a:t>2025/7/3</a:t>
             </a:fld>
             <a:endParaRPr lang="zh-TW" altLang="en-US"/>
           </a:p>
@@ -1655,7 +2091,7 @@
           <a:p>
             <a:fld id="{0F32A204-0AD4-466F-ABEA-B4DB33A37E21}" type="datetimeFigureOut">
               <a:rPr lang="zh-TW" altLang="en-US" smtClean="0"/>
-              <a:t>2025/5/1</a:t>
+              <a:t>2025/7/3</a:t>
             </a:fld>
             <a:endParaRPr lang="zh-TW" altLang="en-US"/>
           </a:p>
@@ -1853,7 +2289,7 @@
           <a:p>
             <a:fld id="{0F32A204-0AD4-466F-ABEA-B4DB33A37E21}" type="datetimeFigureOut">
               <a:rPr lang="zh-TW" altLang="en-US" smtClean="0"/>
-              <a:t>2025/5/1</a:t>
+              <a:t>2025/7/3</a:t>
             </a:fld>
             <a:endParaRPr lang="zh-TW" altLang="en-US"/>
           </a:p>
@@ -2128,7 +2564,7 @@
           <a:p>
             <a:fld id="{0F32A204-0AD4-466F-ABEA-B4DB33A37E21}" type="datetimeFigureOut">
               <a:rPr lang="zh-TW" altLang="en-US" smtClean="0"/>
-              <a:t>2025/5/1</a:t>
+              <a:t>2025/7/3</a:t>
             </a:fld>
             <a:endParaRPr lang="zh-TW" altLang="en-US"/>
           </a:p>
@@ -2393,7 +2829,7 @@
           <a:p>
             <a:fld id="{0F32A204-0AD4-466F-ABEA-B4DB33A37E21}" type="datetimeFigureOut">
               <a:rPr lang="zh-TW" altLang="en-US" smtClean="0"/>
-              <a:t>2025/5/1</a:t>
+              <a:t>2025/7/3</a:t>
             </a:fld>
             <a:endParaRPr lang="zh-TW" altLang="en-US"/>
           </a:p>
@@ -2805,7 +3241,7 @@
           <a:p>
             <a:fld id="{0F32A204-0AD4-466F-ABEA-B4DB33A37E21}" type="datetimeFigureOut">
               <a:rPr lang="zh-TW" altLang="en-US" smtClean="0"/>
-              <a:t>2025/5/1</a:t>
+              <a:t>2025/7/3</a:t>
             </a:fld>
             <a:endParaRPr lang="zh-TW" altLang="en-US"/>
           </a:p>
@@ -2946,7 +3382,7 @@
           <a:p>
             <a:fld id="{0F32A204-0AD4-466F-ABEA-B4DB33A37E21}" type="datetimeFigureOut">
               <a:rPr lang="zh-TW" altLang="en-US" smtClean="0"/>
-              <a:t>2025/5/1</a:t>
+              <a:t>2025/7/3</a:t>
             </a:fld>
             <a:endParaRPr lang="zh-TW" altLang="en-US"/>
           </a:p>
@@ -3059,7 +3495,7 @@
           <a:p>
             <a:fld id="{0F32A204-0AD4-466F-ABEA-B4DB33A37E21}" type="datetimeFigureOut">
               <a:rPr lang="zh-TW" altLang="en-US" smtClean="0"/>
-              <a:t>2025/5/1</a:t>
+              <a:t>2025/7/3</a:t>
             </a:fld>
             <a:endParaRPr lang="zh-TW" altLang="en-US"/>
           </a:p>
@@ -3370,7 +3806,7 @@
           <a:p>
             <a:fld id="{0F32A204-0AD4-466F-ABEA-B4DB33A37E21}" type="datetimeFigureOut">
               <a:rPr lang="zh-TW" altLang="en-US" smtClean="0"/>
-              <a:t>2025/5/1</a:t>
+              <a:t>2025/7/3</a:t>
             </a:fld>
             <a:endParaRPr lang="zh-TW" altLang="en-US"/>
           </a:p>
@@ -3658,7 +4094,7 @@
           <a:p>
             <a:fld id="{0F32A204-0AD4-466F-ABEA-B4DB33A37E21}" type="datetimeFigureOut">
               <a:rPr lang="zh-TW" altLang="en-US" smtClean="0"/>
-              <a:t>2025/5/1</a:t>
+              <a:t>2025/7/3</a:t>
             </a:fld>
             <a:endParaRPr lang="zh-TW" altLang="en-US"/>
           </a:p>
@@ -3899,7 +4335,7 @@
           <a:p>
             <a:fld id="{0F32A204-0AD4-466F-ABEA-B4DB33A37E21}" type="datetimeFigureOut">
               <a:rPr lang="zh-TW" altLang="en-US" smtClean="0"/>
-              <a:t>2025/5/1</a:t>
+              <a:t>2025/7/3</a:t>
             </a:fld>
             <a:endParaRPr lang="zh-TW" altLang="en-US"/>
           </a:p>
@@ -6172,20 +6608,1187 @@
           </a:bodyPr>
           <a:lstStyle/>
           <a:p>
-            <a:pPr marL="0" indent="0" algn="l">
-              <a:buNone/>
+            <a:pPr marL="514350" indent="-514350" algn="l">
+              <a:buFont typeface="+mj-lt"/>
+              <a:buAutoNum type="arabicPeriod"/>
             </a:pPr>
+            <a:r>
+              <a:rPr lang="zh-TW" altLang="en-US" dirty="0">
+                <a:latin typeface="標楷體" panose="03000509000000000000" pitchFamily="65" charset="-120"/>
+                <a:ea typeface="標楷體" panose="03000509000000000000" pitchFamily="65" charset="-120"/>
+              </a:rPr>
+              <a:t>將 </a:t>
+            </a:r>
+            <a:r>
+              <a:rPr lang="en-US" altLang="zh-TW" dirty="0">
+                <a:latin typeface="標楷體" panose="03000509000000000000" pitchFamily="65" charset="-120"/>
+                <a:ea typeface="標楷體" panose="03000509000000000000" pitchFamily="65" charset="-120"/>
+              </a:rPr>
+              <a:t>driver </a:t>
+            </a:r>
+            <a:r>
+              <a:rPr lang="zh-TW" altLang="en-US" dirty="0">
+                <a:latin typeface="標楷體" panose="03000509000000000000" pitchFamily="65" charset="-120"/>
+                <a:ea typeface="標楷體" panose="03000509000000000000" pitchFamily="65" charset="-120"/>
+              </a:rPr>
+              <a:t>跟 </a:t>
+            </a:r>
+            <a:r>
+              <a:rPr lang="en-US" altLang="zh-TW" dirty="0">
+                <a:latin typeface="標楷體" panose="03000509000000000000" pitchFamily="65" charset="-120"/>
+                <a:ea typeface="標楷體" panose="03000509000000000000" pitchFamily="65" charset="-120"/>
+              </a:rPr>
+              <a:t>monitor </a:t>
+            </a:r>
+            <a:r>
+              <a:rPr lang="zh-TW" altLang="en-US" dirty="0">
+                <a:latin typeface="標楷體" panose="03000509000000000000" pitchFamily="65" charset="-120"/>
+                <a:ea typeface="標楷體" panose="03000509000000000000" pitchFamily="65" charset="-120"/>
+              </a:rPr>
+              <a:t>封裝成 </a:t>
+            </a:r>
+            <a:r>
+              <a:rPr lang="en-US" altLang="zh-TW" dirty="0">
+                <a:latin typeface="標楷體" panose="03000509000000000000" pitchFamily="65" charset="-120"/>
+                <a:ea typeface="標楷體" panose="03000509000000000000" pitchFamily="65" charset="-120"/>
+              </a:rPr>
+              <a:t>agent</a:t>
+            </a:r>
+          </a:p>
+          <a:p>
+            <a:pPr marL="514350" indent="-514350" algn="l">
+              <a:buFont typeface="+mj-lt"/>
+              <a:buAutoNum type="arabicPeriod"/>
+            </a:pPr>
+            <a:r>
+              <a:rPr lang="zh-TW" altLang="en-US" dirty="0">
+                <a:latin typeface="標楷體" panose="03000509000000000000" pitchFamily="65" charset="-120"/>
+                <a:ea typeface="標楷體" panose="03000509000000000000" pitchFamily="65" charset="-120"/>
+              </a:rPr>
+              <a:t>由於 </a:t>
+            </a:r>
+            <a:r>
+              <a:rPr lang="en-US" altLang="zh-CN" dirty="0">
+                <a:latin typeface="標楷體" panose="03000509000000000000" pitchFamily="65" charset="-120"/>
+                <a:ea typeface="標楷體" panose="03000509000000000000" pitchFamily="65" charset="-120"/>
+              </a:rPr>
+              <a:t>driver</a:t>
+            </a:r>
+            <a:r>
+              <a:rPr lang="zh-CN" altLang="en-US" dirty="0">
+                <a:latin typeface="標楷體" panose="03000509000000000000" pitchFamily="65" charset="-120"/>
+                <a:ea typeface="標楷體" panose="03000509000000000000" pitchFamily="65" charset="-120"/>
+              </a:rPr>
+              <a:t>和</a:t>
+            </a:r>
+            <a:r>
+              <a:rPr lang="en-US" altLang="zh-CN" dirty="0">
+                <a:latin typeface="標楷體" panose="03000509000000000000" pitchFamily="65" charset="-120"/>
+                <a:ea typeface="標楷體" panose="03000509000000000000" pitchFamily="65" charset="-120"/>
+              </a:rPr>
+              <a:t>monitor</a:t>
+            </a:r>
+            <a:r>
+              <a:rPr lang="zh-TW" altLang="en-US" dirty="0">
+                <a:latin typeface="標楷體" panose="03000509000000000000" pitchFamily="65" charset="-120"/>
+                <a:ea typeface="標楷體" panose="03000509000000000000" pitchFamily="65" charset="-120"/>
+              </a:rPr>
+              <a:t> </a:t>
+            </a:r>
+            <a:r>
+              <a:rPr lang="zh-CN" altLang="en-US" dirty="0">
+                <a:latin typeface="標楷體" panose="03000509000000000000" pitchFamily="65" charset="-120"/>
+                <a:ea typeface="標楷體" panose="03000509000000000000" pitchFamily="65" charset="-120"/>
+              </a:rPr>
+              <a:t>處理的是同一種協議</a:t>
+            </a:r>
+            <a:r>
+              <a:rPr lang="zh-TW" altLang="en-US" dirty="0">
+                <a:latin typeface="標楷體" panose="03000509000000000000" pitchFamily="65" charset="-120"/>
+                <a:ea typeface="標楷體" panose="03000509000000000000" pitchFamily="65" charset="-120"/>
+              </a:rPr>
+              <a:t>，</a:t>
+            </a:r>
+            <a:br>
+              <a:rPr lang="en-US" altLang="zh-TW" dirty="0">
+                <a:latin typeface="標楷體" panose="03000509000000000000" pitchFamily="65" charset="-120"/>
+                <a:ea typeface="標楷體" panose="03000509000000000000" pitchFamily="65" charset="-120"/>
+              </a:rPr>
+            </a:br>
+            <a:r>
+              <a:rPr lang="zh-CN" altLang="en-US" dirty="0">
+                <a:latin typeface="標楷體" panose="03000509000000000000" pitchFamily="65" charset="-120"/>
+                <a:ea typeface="標楷體" panose="03000509000000000000" pitchFamily="65" charset="-120"/>
+              </a:rPr>
+              <a:t>二者的相似性</a:t>
+            </a:r>
+            <a:r>
+              <a:rPr lang="zh-TW" altLang="en-US" dirty="0">
+                <a:latin typeface="標楷體" panose="03000509000000000000" pitchFamily="65" charset="-120"/>
+                <a:ea typeface="標楷體" panose="03000509000000000000" pitchFamily="65" charset="-120"/>
+              </a:rPr>
+              <a:t>極高</a:t>
+            </a:r>
+            <a:r>
+              <a:rPr lang="zh-CN" altLang="en-US" dirty="0">
+                <a:latin typeface="標楷體" panose="03000509000000000000" pitchFamily="65" charset="-120"/>
+                <a:ea typeface="標楷體" panose="03000509000000000000" pitchFamily="65" charset="-120"/>
+              </a:rPr>
+              <a:t>，</a:t>
+            </a:r>
+            <a:r>
+              <a:rPr lang="en-US" altLang="zh-CN" dirty="0">
+                <a:latin typeface="標楷體" panose="03000509000000000000" pitchFamily="65" charset="-120"/>
+                <a:ea typeface="標楷體" panose="03000509000000000000" pitchFamily="65" charset="-120"/>
+              </a:rPr>
+              <a:t>UVM</a:t>
+            </a:r>
+            <a:r>
+              <a:rPr lang="zh-CN" altLang="en-US" dirty="0">
+                <a:latin typeface="標楷體" panose="03000509000000000000" pitchFamily="65" charset="-120"/>
+                <a:ea typeface="標楷體" panose="03000509000000000000" pitchFamily="65" charset="-120"/>
+              </a:rPr>
+              <a:t>中通常將二者封裝在一起</a:t>
+            </a:r>
             <a:endParaRPr lang="en-US" altLang="zh-CN" dirty="0">
               <a:latin typeface="標楷體" panose="03000509000000000000" pitchFamily="65" charset="-120"/>
               <a:ea typeface="標楷體" panose="03000509000000000000" pitchFamily="65" charset="-120"/>
             </a:endParaRPr>
           </a:p>
-        </p:txBody>
-      </p:sp>
+          <a:p>
+            <a:pPr marL="514350" indent="-514350" algn="l">
+              <a:buFont typeface="+mj-lt"/>
+              <a:buAutoNum type="arabicPeriod"/>
+            </a:pPr>
+            <a:r>
+              <a:rPr lang="zh-TW" altLang="en-US" dirty="0">
+                <a:latin typeface="標楷體" panose="03000509000000000000" pitchFamily="65" charset="-120"/>
+                <a:ea typeface="標楷體" panose="03000509000000000000" pitchFamily="65" charset="-120"/>
+              </a:rPr>
+              <a:t>會分成 </a:t>
+            </a:r>
+            <a:r>
+              <a:rPr lang="en-US" altLang="zh-TW" dirty="0">
+                <a:latin typeface="標楷體" panose="03000509000000000000" pitchFamily="65" charset="-120"/>
+                <a:ea typeface="標楷體" panose="03000509000000000000" pitchFamily="65" charset="-120"/>
+              </a:rPr>
+              <a:t>in agent </a:t>
+            </a:r>
+            <a:r>
+              <a:rPr lang="zh-TW" altLang="en-US" dirty="0">
+                <a:latin typeface="標楷體" panose="03000509000000000000" pitchFamily="65" charset="-120"/>
+                <a:ea typeface="標楷體" panose="03000509000000000000" pitchFamily="65" charset="-120"/>
+              </a:rPr>
+              <a:t>跟 </a:t>
+            </a:r>
+            <a:r>
+              <a:rPr lang="en-US" altLang="zh-TW" dirty="0">
+                <a:latin typeface="標楷體" panose="03000509000000000000" pitchFamily="65" charset="-120"/>
+                <a:ea typeface="標楷體" panose="03000509000000000000" pitchFamily="65" charset="-120"/>
+              </a:rPr>
+              <a:t>out agent</a:t>
+            </a:r>
+          </a:p>
+          <a:p>
+            <a:pPr lvl="1"/>
+            <a:r>
+              <a:rPr lang="en-US" altLang="zh-TW" dirty="0">
+                <a:latin typeface="標楷體" panose="03000509000000000000" pitchFamily="65" charset="-120"/>
+                <a:ea typeface="標楷體" panose="03000509000000000000" pitchFamily="65" charset="-120"/>
+              </a:rPr>
+              <a:t>in agent </a:t>
+            </a:r>
+            <a:r>
+              <a:rPr lang="zh-TW" altLang="en-US" dirty="0">
+                <a:latin typeface="標楷體" panose="03000509000000000000" pitchFamily="65" charset="-120"/>
+                <a:ea typeface="標楷體" panose="03000509000000000000" pitchFamily="65" charset="-120"/>
+              </a:rPr>
+              <a:t>將 </a:t>
+            </a:r>
+            <a:r>
+              <a:rPr lang="en-US" altLang="zh-TW" dirty="0">
+                <a:latin typeface="標楷體" panose="03000509000000000000" pitchFamily="65" charset="-120"/>
+                <a:ea typeface="標楷體" panose="03000509000000000000" pitchFamily="65" charset="-120"/>
+              </a:rPr>
+              <a:t>sequence </a:t>
+            </a:r>
+            <a:r>
+              <a:rPr lang="zh-TW" altLang="en-US" dirty="0">
+                <a:latin typeface="標楷體" panose="03000509000000000000" pitchFamily="65" charset="-120"/>
+                <a:ea typeface="標楷體" panose="03000509000000000000" pitchFamily="65" charset="-120"/>
+              </a:rPr>
+              <a:t>送入 </a:t>
+            </a:r>
+            <a:r>
+              <a:rPr lang="en-US" altLang="zh-TW" dirty="0">
+                <a:latin typeface="標楷體" panose="03000509000000000000" pitchFamily="65" charset="-120"/>
+                <a:ea typeface="標楷體" panose="03000509000000000000" pitchFamily="65" charset="-120"/>
+              </a:rPr>
+              <a:t>DUT</a:t>
+            </a:r>
+          </a:p>
+          <a:p>
+            <a:pPr lvl="1"/>
+            <a:r>
+              <a:rPr lang="en-US" altLang="zh-CN" dirty="0">
+                <a:latin typeface="標楷體" panose="03000509000000000000" pitchFamily="65" charset="-120"/>
+                <a:ea typeface="標楷體" panose="03000509000000000000" pitchFamily="65" charset="-120"/>
+              </a:rPr>
+              <a:t>out agent </a:t>
+            </a:r>
+            <a:r>
+              <a:rPr lang="zh-TW" altLang="en-US" dirty="0">
+                <a:latin typeface="標楷體" panose="03000509000000000000" pitchFamily="65" charset="-120"/>
+                <a:ea typeface="標楷體" panose="03000509000000000000" pitchFamily="65" charset="-120"/>
+              </a:rPr>
+              <a:t>負責 </a:t>
+            </a:r>
+            <a:r>
+              <a:rPr lang="en-US" altLang="zh-TW" dirty="0">
+                <a:latin typeface="標楷體" panose="03000509000000000000" pitchFamily="65" charset="-120"/>
+                <a:ea typeface="標楷體" panose="03000509000000000000" pitchFamily="65" charset="-120"/>
+              </a:rPr>
+              <a:t>DUT</a:t>
+            </a:r>
+            <a:r>
+              <a:rPr lang="zh-TW" altLang="en-US" dirty="0">
+                <a:latin typeface="標楷體" panose="03000509000000000000" pitchFamily="65" charset="-120"/>
+                <a:ea typeface="標楷體" panose="03000509000000000000" pitchFamily="65" charset="-120"/>
+              </a:rPr>
+              <a:t> 執行後產出的 </a:t>
+            </a:r>
+            <a:r>
+              <a:rPr lang="en-US" altLang="zh-TW" dirty="0">
+                <a:latin typeface="標楷體" panose="03000509000000000000" pitchFamily="65" charset="-120"/>
+                <a:ea typeface="標楷體" panose="03000509000000000000" pitchFamily="65" charset="-120"/>
+              </a:rPr>
+              <a:t>sequence</a:t>
+            </a:r>
+            <a:endParaRPr lang="en-US" altLang="zh-CN" dirty="0">
+              <a:latin typeface="標楷體" panose="03000509000000000000" pitchFamily="65" charset="-120"/>
+              <a:ea typeface="標楷體" panose="03000509000000000000" pitchFamily="65" charset="-120"/>
+            </a:endParaRPr>
+          </a:p>
+        </p:txBody>
+      </p:sp>
+      <p:pic>
+        <p:nvPicPr>
+          <p:cNvPr id="5" name="圖片 4">
+            <a:extLst>
+              <a:ext uri="{FF2B5EF4-FFF2-40B4-BE49-F238E27FC236}">
+                <a16:creationId xmlns:a16="http://schemas.microsoft.com/office/drawing/2014/main" id="{BBFE1F9C-717A-6C06-1ABA-9D9831F9BE30}"/>
+              </a:ext>
+            </a:extLst>
+          </p:cNvPr>
+          <p:cNvPicPr>
+            <a:picLocks noChangeAspect="1"/>
+          </p:cNvPicPr>
+          <p:nvPr/>
+        </p:nvPicPr>
+        <p:blipFill>
+          <a:blip r:embed="rId3"/>
+          <a:stretch>
+            <a:fillRect/>
+          </a:stretch>
+        </p:blipFill>
+        <p:spPr>
+          <a:xfrm>
+            <a:off x="3153600" y="4709893"/>
+            <a:ext cx="5884800" cy="1945943"/>
+          </a:xfrm>
+          <a:prstGeom prst="rect">
+            <a:avLst/>
+          </a:prstGeom>
+          <a:ln>
+            <a:solidFill>
+              <a:schemeClr val="tx1"/>
+            </a:solidFill>
+          </a:ln>
+        </p:spPr>
+      </p:pic>
     </p:spTree>
     <p:extLst>
       <p:ext uri="{BB962C8B-B14F-4D97-AF65-F5344CB8AC3E}">
         <p14:creationId xmlns:p14="http://schemas.microsoft.com/office/powerpoint/2010/main" val="4126042550"/>
+      </p:ext>
+    </p:extLst>
+  </p:cSld>
+  <p:clrMapOvr>
+    <a:masterClrMapping/>
+  </p:clrMapOvr>
+</p:sld>
+</file>
+
+<file path=ppt/slides/slide16.xml><?xml version="1.0" encoding="utf-8"?>
+<p:sld xmlns:a="http://schemas.openxmlformats.org/drawingml/2006/main" xmlns:r="http://schemas.openxmlformats.org/officeDocument/2006/relationships" xmlns:p="http://schemas.openxmlformats.org/presentationml/2006/main">
+  <p:cSld>
+    <p:spTree>
+      <p:nvGrpSpPr>
+        <p:cNvPr id="1" name="">
+          <a:extLst>
+            <a:ext uri="{FF2B5EF4-FFF2-40B4-BE49-F238E27FC236}">
+              <a16:creationId xmlns:a16="http://schemas.microsoft.com/office/drawing/2014/main" id="{B243D60E-AA21-47B2-FBF7-9CE7B32160BE}"/>
+            </a:ext>
+          </a:extLst>
+        </p:cNvPr>
+        <p:cNvGrpSpPr/>
+        <p:nvPr/>
+      </p:nvGrpSpPr>
+      <p:grpSpPr>
+        <a:xfrm>
+          <a:off x="0" y="0"/>
+          <a:ext cx="0" cy="0"/>
+          <a:chOff x="0" y="0"/>
+          <a:chExt cx="0" cy="0"/>
+        </a:xfrm>
+      </p:grpSpPr>
+      <p:sp>
+        <p:nvSpPr>
+          <p:cNvPr id="2" name="標題 1">
+            <a:extLst>
+              <a:ext uri="{FF2B5EF4-FFF2-40B4-BE49-F238E27FC236}">
+                <a16:creationId xmlns:a16="http://schemas.microsoft.com/office/drawing/2014/main" id="{C4E3005C-6FF6-9CDE-5DD3-72053C1CA2E6}"/>
+              </a:ext>
+            </a:extLst>
+          </p:cNvPr>
+          <p:cNvSpPr>
+            <a:spLocks noGrp="1"/>
+          </p:cNvSpPr>
+          <p:nvPr>
+            <p:ph type="title"/>
+          </p:nvPr>
+        </p:nvSpPr>
+        <p:spPr/>
+        <p:txBody>
+          <a:bodyPr/>
+          <a:lstStyle/>
+          <a:p>
+            <a:r>
+              <a:rPr lang="en-US" altLang="zh-TW" dirty="0"/>
+              <a:t>Agent</a:t>
+            </a:r>
+            <a:r>
+              <a:rPr lang="zh-TW" altLang="en-US" dirty="0"/>
+              <a:t> </a:t>
+            </a:r>
+            <a:r>
+              <a:rPr lang="en-US" altLang="zh-TW" dirty="0"/>
+              <a:t>(9/)</a:t>
+            </a:r>
+            <a:endParaRPr lang="zh-TW" altLang="en-US" dirty="0"/>
+          </a:p>
+        </p:txBody>
+      </p:sp>
+      <p:sp>
+        <p:nvSpPr>
+          <p:cNvPr id="3" name="內容版面配置區 2">
+            <a:extLst>
+              <a:ext uri="{FF2B5EF4-FFF2-40B4-BE49-F238E27FC236}">
+                <a16:creationId xmlns:a16="http://schemas.microsoft.com/office/drawing/2014/main" id="{991F412E-0A96-4864-0392-1063AEC45D39}"/>
+              </a:ext>
+            </a:extLst>
+          </p:cNvPr>
+          <p:cNvSpPr>
+            <a:spLocks noGrp="1"/>
+          </p:cNvSpPr>
+          <p:nvPr>
+            <p:ph idx="1"/>
+          </p:nvPr>
+        </p:nvSpPr>
+        <p:spPr/>
+        <p:txBody>
+          <a:bodyPr>
+            <a:normAutofit/>
+          </a:bodyPr>
+          <a:lstStyle/>
+          <a:p>
+            <a:pPr marL="514350" indent="-514350">
+              <a:buFont typeface="+mj-lt"/>
+              <a:buAutoNum type="arabicPeriod"/>
+            </a:pPr>
+            <a:r>
+              <a:rPr lang="zh-TW" altLang="en-US" dirty="0">
+                <a:latin typeface="標楷體" panose="03000509000000000000" pitchFamily="65" charset="-120"/>
+                <a:ea typeface="標楷體" panose="03000509000000000000" pitchFamily="65" charset="-120"/>
+              </a:rPr>
+              <a:t>加入 </a:t>
+            </a:r>
+            <a:r>
+              <a:rPr lang="en-US" altLang="zh-TW" dirty="0">
+                <a:latin typeface="標楷體" panose="03000509000000000000" pitchFamily="65" charset="-120"/>
+                <a:ea typeface="標楷體" panose="03000509000000000000" pitchFamily="65" charset="-120"/>
+              </a:rPr>
+              <a:t>in/out agent </a:t>
+            </a:r>
+            <a:r>
+              <a:rPr lang="zh-TW" altLang="en-US" dirty="0">
+                <a:latin typeface="標楷體" panose="03000509000000000000" pitchFamily="65" charset="-120"/>
+                <a:ea typeface="標楷體" panose="03000509000000000000" pitchFamily="65" charset="-120"/>
+              </a:rPr>
+              <a:t>後的樹狀圖</a:t>
+            </a:r>
+            <a:endParaRPr lang="en-US" altLang="zh-CN" dirty="0">
+              <a:latin typeface="標楷體" panose="03000509000000000000" pitchFamily="65" charset="-120"/>
+              <a:ea typeface="標楷體" panose="03000509000000000000" pitchFamily="65" charset="-120"/>
+            </a:endParaRPr>
+          </a:p>
+        </p:txBody>
+      </p:sp>
+      <p:pic>
+        <p:nvPicPr>
+          <p:cNvPr id="6" name="圖片 5">
+            <a:extLst>
+              <a:ext uri="{FF2B5EF4-FFF2-40B4-BE49-F238E27FC236}">
+                <a16:creationId xmlns:a16="http://schemas.microsoft.com/office/drawing/2014/main" id="{31B3E561-2A69-7742-8CE0-0862611BB8F9}"/>
+              </a:ext>
+            </a:extLst>
+          </p:cNvPr>
+          <p:cNvPicPr>
+            <a:picLocks noChangeAspect="1"/>
+          </p:cNvPicPr>
+          <p:nvPr/>
+        </p:nvPicPr>
+        <p:blipFill>
+          <a:blip r:embed="rId3"/>
+          <a:stretch>
+            <a:fillRect/>
+          </a:stretch>
+        </p:blipFill>
+        <p:spPr>
+          <a:xfrm>
+            <a:off x="2893250" y="2679826"/>
+            <a:ext cx="6405500" cy="3933731"/>
+          </a:xfrm>
+          <a:prstGeom prst="rect">
+            <a:avLst/>
+          </a:prstGeom>
+          <a:ln>
+            <a:solidFill>
+              <a:schemeClr val="tx1"/>
+            </a:solidFill>
+          </a:ln>
+        </p:spPr>
+      </p:pic>
+    </p:spTree>
+    <p:extLst>
+      <p:ext uri="{BB962C8B-B14F-4D97-AF65-F5344CB8AC3E}">
+        <p14:creationId xmlns:p14="http://schemas.microsoft.com/office/powerpoint/2010/main" val="2846859891"/>
+      </p:ext>
+    </p:extLst>
+  </p:cSld>
+  <p:clrMapOvr>
+    <a:masterClrMapping/>
+  </p:clrMapOvr>
+</p:sld>
+</file>
+
+<file path=ppt/slides/slide17.xml><?xml version="1.0" encoding="utf-8"?>
+<p:sld xmlns:a="http://schemas.openxmlformats.org/drawingml/2006/main" xmlns:r="http://schemas.openxmlformats.org/officeDocument/2006/relationships" xmlns:p="http://schemas.openxmlformats.org/presentationml/2006/main">
+  <p:cSld>
+    <p:spTree>
+      <p:nvGrpSpPr>
+        <p:cNvPr id="1" name="">
+          <a:extLst>
+            <a:ext uri="{FF2B5EF4-FFF2-40B4-BE49-F238E27FC236}">
+              <a16:creationId xmlns:a16="http://schemas.microsoft.com/office/drawing/2014/main" id="{E70DB1EA-4B56-7971-DEFD-CBFE4DF82141}"/>
+            </a:ext>
+          </a:extLst>
+        </p:cNvPr>
+        <p:cNvGrpSpPr/>
+        <p:nvPr/>
+      </p:nvGrpSpPr>
+      <p:grpSpPr>
+        <a:xfrm>
+          <a:off x="0" y="0"/>
+          <a:ext cx="0" cy="0"/>
+          <a:chOff x="0" y="0"/>
+          <a:chExt cx="0" cy="0"/>
+        </a:xfrm>
+      </p:grpSpPr>
+      <p:sp>
+        <p:nvSpPr>
+          <p:cNvPr id="2" name="標題 1">
+            <a:extLst>
+              <a:ext uri="{FF2B5EF4-FFF2-40B4-BE49-F238E27FC236}">
+                <a16:creationId xmlns:a16="http://schemas.microsoft.com/office/drawing/2014/main" id="{EE793FA9-F701-05AE-33DE-4ECFE4DFCBDB}"/>
+              </a:ext>
+            </a:extLst>
+          </p:cNvPr>
+          <p:cNvSpPr>
+            <a:spLocks noGrp="1"/>
+          </p:cNvSpPr>
+          <p:nvPr>
+            <p:ph type="title"/>
+          </p:nvPr>
+        </p:nvSpPr>
+        <p:spPr/>
+        <p:txBody>
+          <a:bodyPr/>
+          <a:lstStyle/>
+          <a:p>
+            <a:r>
+              <a:rPr lang="en-US" altLang="zh-TW" dirty="0"/>
+              <a:t>reference model</a:t>
+            </a:r>
+            <a:r>
+              <a:rPr lang="zh-TW" altLang="en-US" dirty="0"/>
+              <a:t> </a:t>
+            </a:r>
+            <a:r>
+              <a:rPr lang="en-US" altLang="zh-TW" dirty="0"/>
+              <a:t>(10/)</a:t>
+            </a:r>
+            <a:endParaRPr lang="zh-TW" altLang="en-US" dirty="0"/>
+          </a:p>
+        </p:txBody>
+      </p:sp>
+      <p:sp>
+        <p:nvSpPr>
+          <p:cNvPr id="3" name="內容版面配置區 2">
+            <a:extLst>
+              <a:ext uri="{FF2B5EF4-FFF2-40B4-BE49-F238E27FC236}">
+                <a16:creationId xmlns:a16="http://schemas.microsoft.com/office/drawing/2014/main" id="{B920A98C-4C67-4569-575B-2452E1C421CB}"/>
+              </a:ext>
+            </a:extLst>
+          </p:cNvPr>
+          <p:cNvSpPr>
+            <a:spLocks noGrp="1"/>
+          </p:cNvSpPr>
+          <p:nvPr>
+            <p:ph idx="1"/>
+          </p:nvPr>
+        </p:nvSpPr>
+        <p:spPr/>
+        <p:txBody>
+          <a:bodyPr>
+            <a:normAutofit/>
+          </a:bodyPr>
+          <a:lstStyle/>
+          <a:p>
+            <a:pPr marL="514350" indent="-514350">
+              <a:buFont typeface="+mj-lt"/>
+              <a:buAutoNum type="arabicPeriod"/>
+            </a:pPr>
+            <a:r>
+              <a:rPr lang="en-US" altLang="zh-TW" dirty="0">
+                <a:latin typeface="標楷體" panose="03000509000000000000" pitchFamily="65" charset="-120"/>
+                <a:ea typeface="標楷體" panose="03000509000000000000" pitchFamily="65" charset="-120"/>
+              </a:rPr>
+              <a:t>reference model</a:t>
+            </a:r>
+            <a:r>
+              <a:rPr lang="zh-TW" altLang="en-US" dirty="0">
+                <a:latin typeface="標楷體" panose="03000509000000000000" pitchFamily="65" charset="-120"/>
+                <a:ea typeface="標楷體" panose="03000509000000000000" pitchFamily="65" charset="-120"/>
+              </a:rPr>
+              <a:t>用於完成和</a:t>
+            </a:r>
+            <a:r>
+              <a:rPr lang="en-US" altLang="zh-TW" dirty="0">
+                <a:latin typeface="標楷體" panose="03000509000000000000" pitchFamily="65" charset="-120"/>
+                <a:ea typeface="標楷體" panose="03000509000000000000" pitchFamily="65" charset="-120"/>
+              </a:rPr>
+              <a:t>DUT</a:t>
+            </a:r>
+            <a:r>
+              <a:rPr lang="zh-TW" altLang="en-US" dirty="0">
+                <a:latin typeface="標楷體" panose="03000509000000000000" pitchFamily="65" charset="-120"/>
+                <a:ea typeface="標楷體" panose="03000509000000000000" pitchFamily="65" charset="-120"/>
+              </a:rPr>
+              <a:t>相同的功能。</a:t>
+            </a:r>
+            <a:endParaRPr lang="en-US" altLang="zh-TW" dirty="0">
+              <a:latin typeface="標楷體" panose="03000509000000000000" pitchFamily="65" charset="-120"/>
+              <a:ea typeface="標楷體" panose="03000509000000000000" pitchFamily="65" charset="-120"/>
+            </a:endParaRPr>
+          </a:p>
+          <a:p>
+            <a:pPr marL="514350" indent="-514350">
+              <a:buFont typeface="+mj-lt"/>
+              <a:buAutoNum type="arabicPeriod"/>
+            </a:pPr>
+            <a:r>
+              <a:rPr lang="en-US" altLang="zh-TW" dirty="0">
+                <a:latin typeface="標楷體" panose="03000509000000000000" pitchFamily="65" charset="-120"/>
+                <a:ea typeface="標楷體" panose="03000509000000000000" pitchFamily="65" charset="-120"/>
+              </a:rPr>
+              <a:t>reference model</a:t>
+            </a:r>
+            <a:r>
+              <a:rPr lang="zh-TW" altLang="en-US" dirty="0">
+                <a:latin typeface="標楷體" panose="03000509000000000000" pitchFamily="65" charset="-120"/>
+                <a:ea typeface="標楷體" panose="03000509000000000000" pitchFamily="65" charset="-120"/>
+              </a:rPr>
+              <a:t>的輸出被</a:t>
+            </a:r>
+            <a:r>
+              <a:rPr lang="en-US" altLang="zh-TW" dirty="0">
+                <a:latin typeface="標楷體" panose="03000509000000000000" pitchFamily="65" charset="-120"/>
+                <a:ea typeface="標楷體" panose="03000509000000000000" pitchFamily="65" charset="-120"/>
+              </a:rPr>
+              <a:t>scoreboard</a:t>
+            </a:r>
+            <a:r>
+              <a:rPr lang="zh-TW" altLang="en-US" dirty="0">
+                <a:latin typeface="標楷體" panose="03000509000000000000" pitchFamily="65" charset="-120"/>
+                <a:ea typeface="標楷體" panose="03000509000000000000" pitchFamily="65" charset="-120"/>
+              </a:rPr>
+              <a:t>接收，</a:t>
+            </a:r>
+            <a:br>
+              <a:rPr lang="en-US" altLang="zh-TW" dirty="0">
+                <a:latin typeface="標楷體" panose="03000509000000000000" pitchFamily="65" charset="-120"/>
+                <a:ea typeface="標楷體" panose="03000509000000000000" pitchFamily="65" charset="-120"/>
+              </a:rPr>
+            </a:br>
+            <a:r>
+              <a:rPr lang="zh-TW" altLang="en-US" dirty="0">
+                <a:latin typeface="標楷體" panose="03000509000000000000" pitchFamily="65" charset="-120"/>
+                <a:ea typeface="標楷體" panose="03000509000000000000" pitchFamily="65" charset="-120"/>
+              </a:rPr>
+              <a:t>用於和</a:t>
+            </a:r>
+            <a:r>
+              <a:rPr lang="en-US" altLang="zh-TW" dirty="0">
+                <a:latin typeface="標楷體" panose="03000509000000000000" pitchFamily="65" charset="-120"/>
+                <a:ea typeface="標楷體" panose="03000509000000000000" pitchFamily="65" charset="-120"/>
+              </a:rPr>
+              <a:t>DUT</a:t>
+            </a:r>
+            <a:r>
+              <a:rPr lang="zh-TW" altLang="en-US" dirty="0">
+                <a:latin typeface="標楷體" panose="03000509000000000000" pitchFamily="65" charset="-120"/>
+                <a:ea typeface="標楷體" panose="03000509000000000000" pitchFamily="65" charset="-120"/>
+              </a:rPr>
+              <a:t>的輸出相比較。</a:t>
+            </a:r>
+            <a:endParaRPr lang="en-US" altLang="zh-CN" dirty="0">
+              <a:latin typeface="標楷體" panose="03000509000000000000" pitchFamily="65" charset="-120"/>
+              <a:ea typeface="標楷體" panose="03000509000000000000" pitchFamily="65" charset="-120"/>
+            </a:endParaRPr>
+          </a:p>
+        </p:txBody>
+      </p:sp>
+      <p:pic>
+        <p:nvPicPr>
+          <p:cNvPr id="5" name="圖片 4">
+            <a:extLst>
+              <a:ext uri="{FF2B5EF4-FFF2-40B4-BE49-F238E27FC236}">
+                <a16:creationId xmlns:a16="http://schemas.microsoft.com/office/drawing/2014/main" id="{15C6BC36-5C84-DE8A-7CDB-FC40C47A6505}"/>
+              </a:ext>
+            </a:extLst>
+          </p:cNvPr>
+          <p:cNvPicPr>
+            <a:picLocks noChangeAspect="1"/>
+          </p:cNvPicPr>
+          <p:nvPr/>
+        </p:nvPicPr>
+        <p:blipFill>
+          <a:blip r:embed="rId3"/>
+          <a:stretch>
+            <a:fillRect/>
+          </a:stretch>
+        </p:blipFill>
+        <p:spPr>
+          <a:xfrm>
+            <a:off x="2807163" y="3429000"/>
+            <a:ext cx="6577673" cy="3147176"/>
+          </a:xfrm>
+          <a:prstGeom prst="rect">
+            <a:avLst/>
+          </a:prstGeom>
+          <a:ln>
+            <a:solidFill>
+              <a:schemeClr val="tx1"/>
+            </a:solidFill>
+          </a:ln>
+        </p:spPr>
+      </p:pic>
+    </p:spTree>
+    <p:extLst>
+      <p:ext uri="{BB962C8B-B14F-4D97-AF65-F5344CB8AC3E}">
+        <p14:creationId xmlns:p14="http://schemas.microsoft.com/office/powerpoint/2010/main" val="1633723130"/>
+      </p:ext>
+    </p:extLst>
+  </p:cSld>
+  <p:clrMapOvr>
+    <a:masterClrMapping/>
+  </p:clrMapOvr>
+</p:sld>
+</file>
+
+<file path=ppt/slides/slide18.xml><?xml version="1.0" encoding="utf-8"?>
+<p:sld xmlns:a="http://schemas.openxmlformats.org/drawingml/2006/main" xmlns:r="http://schemas.openxmlformats.org/officeDocument/2006/relationships" xmlns:p="http://schemas.openxmlformats.org/presentationml/2006/main">
+  <p:cSld>
+    <p:spTree>
+      <p:nvGrpSpPr>
+        <p:cNvPr id="1" name="">
+          <a:extLst>
+            <a:ext uri="{FF2B5EF4-FFF2-40B4-BE49-F238E27FC236}">
+              <a16:creationId xmlns:a16="http://schemas.microsoft.com/office/drawing/2014/main" id="{23E2C677-7FB1-FDD4-767B-AC62A58951AF}"/>
+            </a:ext>
+          </a:extLst>
+        </p:cNvPr>
+        <p:cNvGrpSpPr/>
+        <p:nvPr/>
+      </p:nvGrpSpPr>
+      <p:grpSpPr>
+        <a:xfrm>
+          <a:off x="0" y="0"/>
+          <a:ext cx="0" cy="0"/>
+          <a:chOff x="0" y="0"/>
+          <a:chExt cx="0" cy="0"/>
+        </a:xfrm>
+      </p:grpSpPr>
+      <p:sp>
+        <p:nvSpPr>
+          <p:cNvPr id="2" name="標題 1">
+            <a:extLst>
+              <a:ext uri="{FF2B5EF4-FFF2-40B4-BE49-F238E27FC236}">
+                <a16:creationId xmlns:a16="http://schemas.microsoft.com/office/drawing/2014/main" id="{B324DF7D-0560-B449-546C-C60C742E2FE9}"/>
+              </a:ext>
+            </a:extLst>
+          </p:cNvPr>
+          <p:cNvSpPr>
+            <a:spLocks noGrp="1"/>
+          </p:cNvSpPr>
+          <p:nvPr>
+            <p:ph type="title"/>
+          </p:nvPr>
+        </p:nvSpPr>
+        <p:spPr/>
+        <p:txBody>
+          <a:bodyPr/>
+          <a:lstStyle/>
+          <a:p>
+            <a:r>
+              <a:rPr lang="en-US" altLang="zh-TW" dirty="0"/>
+              <a:t>Scoreboard (12/)</a:t>
+            </a:r>
+            <a:endParaRPr lang="zh-TW" altLang="en-US" dirty="0"/>
+          </a:p>
+        </p:txBody>
+      </p:sp>
+      <p:sp>
+        <p:nvSpPr>
+          <p:cNvPr id="3" name="內容版面配置區 2">
+            <a:extLst>
+              <a:ext uri="{FF2B5EF4-FFF2-40B4-BE49-F238E27FC236}">
+                <a16:creationId xmlns:a16="http://schemas.microsoft.com/office/drawing/2014/main" id="{1A83422A-2FFC-6ED2-6F13-B039BEE5635C}"/>
+              </a:ext>
+            </a:extLst>
+          </p:cNvPr>
+          <p:cNvSpPr>
+            <a:spLocks noGrp="1"/>
+          </p:cNvSpPr>
+          <p:nvPr>
+            <p:ph idx="1"/>
+          </p:nvPr>
+        </p:nvSpPr>
+        <p:spPr/>
+        <p:txBody>
+          <a:bodyPr>
+            <a:normAutofit/>
+          </a:bodyPr>
+          <a:lstStyle/>
+          <a:p>
+            <a:pPr marL="514350" indent="-514350">
+              <a:buFont typeface="+mj-lt"/>
+              <a:buAutoNum type="arabicPeriod"/>
+            </a:pPr>
+            <a:r>
+              <a:rPr lang="en-US" altLang="zh-TW" dirty="0">
+                <a:latin typeface="標楷體" panose="03000509000000000000" pitchFamily="65" charset="-120"/>
+                <a:ea typeface="標楷體" panose="03000509000000000000" pitchFamily="65" charset="-120"/>
+              </a:rPr>
+              <a:t>scoreboard</a:t>
+            </a:r>
+            <a:r>
+              <a:rPr lang="zh-TW" altLang="en-US" dirty="0">
+                <a:latin typeface="標楷體" panose="03000509000000000000" pitchFamily="65" charset="-120"/>
+                <a:ea typeface="標楷體" panose="03000509000000000000" pitchFamily="65" charset="-120"/>
+              </a:rPr>
+              <a:t>要比較的資料</a:t>
+            </a:r>
+            <a:endParaRPr lang="en-US" altLang="zh-TW" dirty="0">
+              <a:latin typeface="標楷體" panose="03000509000000000000" pitchFamily="65" charset="-120"/>
+              <a:ea typeface="標楷體" panose="03000509000000000000" pitchFamily="65" charset="-120"/>
+            </a:endParaRPr>
+          </a:p>
+          <a:p>
+            <a:pPr lvl="1"/>
+            <a:r>
+              <a:rPr lang="zh-TW" altLang="en-US" dirty="0">
+                <a:latin typeface="標楷體" panose="03000509000000000000" pitchFamily="65" charset="-120"/>
+                <a:ea typeface="標楷體" panose="03000509000000000000" pitchFamily="65" charset="-120"/>
+              </a:rPr>
+              <a:t>一是來源於</a:t>
+            </a:r>
+            <a:r>
+              <a:rPr lang="en-US" altLang="zh-TW" dirty="0">
+                <a:latin typeface="標楷體" panose="03000509000000000000" pitchFamily="65" charset="-120"/>
+                <a:ea typeface="標楷體" panose="03000509000000000000" pitchFamily="65" charset="-120"/>
+              </a:rPr>
+              <a:t>reference model</a:t>
+            </a:r>
+          </a:p>
+          <a:p>
+            <a:pPr lvl="1"/>
+            <a:r>
+              <a:rPr lang="zh-TW" altLang="en-US" dirty="0">
+                <a:latin typeface="標楷體" panose="03000509000000000000" pitchFamily="65" charset="-120"/>
+                <a:ea typeface="標楷體" panose="03000509000000000000" pitchFamily="65" charset="-120"/>
+              </a:rPr>
+              <a:t>二是來源於</a:t>
+            </a:r>
+            <a:r>
+              <a:rPr lang="en-US" altLang="zh-TW" dirty="0">
+                <a:latin typeface="標楷體" panose="03000509000000000000" pitchFamily="65" charset="-120"/>
+                <a:ea typeface="標楷體" panose="03000509000000000000" pitchFamily="65" charset="-120"/>
+              </a:rPr>
+              <a:t>out agent</a:t>
+            </a:r>
+            <a:r>
+              <a:rPr lang="zh-TW" altLang="en-US" dirty="0">
+                <a:latin typeface="標楷體" panose="03000509000000000000" pitchFamily="65" charset="-120"/>
+                <a:ea typeface="標楷體" panose="03000509000000000000" pitchFamily="65" charset="-120"/>
+              </a:rPr>
+              <a:t>的</a:t>
+            </a:r>
+            <a:r>
+              <a:rPr lang="en-US" altLang="zh-TW" dirty="0">
+                <a:latin typeface="標楷體" panose="03000509000000000000" pitchFamily="65" charset="-120"/>
+                <a:ea typeface="標楷體" panose="03000509000000000000" pitchFamily="65" charset="-120"/>
+              </a:rPr>
+              <a:t>monitor</a:t>
+            </a:r>
+            <a:endParaRPr lang="en-US" altLang="zh-CN" dirty="0">
+              <a:latin typeface="標楷體" panose="03000509000000000000" pitchFamily="65" charset="-120"/>
+              <a:ea typeface="標楷體" panose="03000509000000000000" pitchFamily="65" charset="-120"/>
+            </a:endParaRPr>
+          </a:p>
+        </p:txBody>
+      </p:sp>
+      <p:pic>
+        <p:nvPicPr>
+          <p:cNvPr id="6" name="圖片 5">
+            <a:extLst>
+              <a:ext uri="{FF2B5EF4-FFF2-40B4-BE49-F238E27FC236}">
+                <a16:creationId xmlns:a16="http://schemas.microsoft.com/office/drawing/2014/main" id="{583583C9-671E-1A57-F3BF-55BA64FF82A7}"/>
+              </a:ext>
+            </a:extLst>
+          </p:cNvPr>
+          <p:cNvPicPr>
+            <a:picLocks noChangeAspect="1"/>
+          </p:cNvPicPr>
+          <p:nvPr/>
+        </p:nvPicPr>
+        <p:blipFill>
+          <a:blip r:embed="rId3"/>
+          <a:stretch>
+            <a:fillRect/>
+          </a:stretch>
+        </p:blipFill>
+        <p:spPr>
+          <a:xfrm>
+            <a:off x="2619823" y="3322621"/>
+            <a:ext cx="6952354" cy="3271696"/>
+          </a:xfrm>
+          <a:prstGeom prst="rect">
+            <a:avLst/>
+          </a:prstGeom>
+          <a:ln>
+            <a:solidFill>
+              <a:schemeClr val="tx1"/>
+            </a:solidFill>
+          </a:ln>
+        </p:spPr>
+      </p:pic>
+    </p:spTree>
+    <p:extLst>
+      <p:ext uri="{BB962C8B-B14F-4D97-AF65-F5344CB8AC3E}">
+        <p14:creationId xmlns:p14="http://schemas.microsoft.com/office/powerpoint/2010/main" val="4210315735"/>
+      </p:ext>
+    </p:extLst>
+  </p:cSld>
+  <p:clrMapOvr>
+    <a:masterClrMapping/>
+  </p:clrMapOvr>
+</p:sld>
+</file>
+
+<file path=ppt/slides/slide19.xml><?xml version="1.0" encoding="utf-8"?>
+<p:sld xmlns:a="http://schemas.openxmlformats.org/drawingml/2006/main" xmlns:r="http://schemas.openxmlformats.org/officeDocument/2006/relationships" xmlns:p="http://schemas.openxmlformats.org/presentationml/2006/main">
+  <p:cSld>
+    <p:spTree>
+      <p:nvGrpSpPr>
+        <p:cNvPr id="1" name="">
+          <a:extLst>
+            <a:ext uri="{FF2B5EF4-FFF2-40B4-BE49-F238E27FC236}">
+              <a16:creationId xmlns:a16="http://schemas.microsoft.com/office/drawing/2014/main" id="{77DEDC32-0DF3-DA1E-C211-15BCFD493895}"/>
+            </a:ext>
+          </a:extLst>
+        </p:cNvPr>
+        <p:cNvGrpSpPr/>
+        <p:nvPr/>
+      </p:nvGrpSpPr>
+      <p:grpSpPr>
+        <a:xfrm>
+          <a:off x="0" y="0"/>
+          <a:ext cx="0" cy="0"/>
+          <a:chOff x="0" y="0"/>
+          <a:chExt cx="0" cy="0"/>
+        </a:xfrm>
+      </p:grpSpPr>
+      <p:sp>
+        <p:nvSpPr>
+          <p:cNvPr id="2" name="標題 1">
+            <a:extLst>
+              <a:ext uri="{FF2B5EF4-FFF2-40B4-BE49-F238E27FC236}">
+                <a16:creationId xmlns:a16="http://schemas.microsoft.com/office/drawing/2014/main" id="{0A169166-5074-E8D3-C332-A3842EC2F707}"/>
+              </a:ext>
+            </a:extLst>
+          </p:cNvPr>
+          <p:cNvSpPr>
+            <a:spLocks noGrp="1"/>
+          </p:cNvSpPr>
+          <p:nvPr>
+            <p:ph type="title"/>
+          </p:nvPr>
+        </p:nvSpPr>
+        <p:spPr/>
+        <p:txBody>
+          <a:bodyPr/>
+          <a:lstStyle/>
+          <a:p>
+            <a:r>
+              <a:rPr lang="en-US" altLang="zh-TW" dirty="0"/>
+              <a:t>Sequencer (13/)</a:t>
+            </a:r>
+            <a:endParaRPr lang="zh-TW" altLang="en-US" dirty="0"/>
+          </a:p>
+        </p:txBody>
+      </p:sp>
+      <p:sp>
+        <p:nvSpPr>
+          <p:cNvPr id="3" name="內容版面配置區 2">
+            <a:extLst>
+              <a:ext uri="{FF2B5EF4-FFF2-40B4-BE49-F238E27FC236}">
+                <a16:creationId xmlns:a16="http://schemas.microsoft.com/office/drawing/2014/main" id="{AC001EEA-17F1-B625-0413-B5072DBDE281}"/>
+              </a:ext>
+            </a:extLst>
+          </p:cNvPr>
+          <p:cNvSpPr>
+            <a:spLocks noGrp="1"/>
+          </p:cNvSpPr>
+          <p:nvPr>
+            <p:ph idx="1"/>
+          </p:nvPr>
+        </p:nvSpPr>
+        <p:spPr/>
+        <p:txBody>
+          <a:bodyPr>
+            <a:normAutofit/>
+          </a:bodyPr>
+          <a:lstStyle/>
+          <a:p>
+            <a:pPr marL="514350" indent="-514350">
+              <a:buFont typeface="+mj-lt"/>
+              <a:buAutoNum type="arabicPeriod"/>
+            </a:pPr>
+            <a:r>
+              <a:rPr lang="en-US" altLang="zh-CN" dirty="0">
+                <a:latin typeface="標楷體" panose="03000509000000000000" pitchFamily="65" charset="-120"/>
+                <a:ea typeface="標楷體" panose="03000509000000000000" pitchFamily="65" charset="-120"/>
+              </a:rPr>
+              <a:t>sequence</a:t>
+            </a:r>
+            <a:r>
+              <a:rPr lang="zh-TW" altLang="en-US" dirty="0">
+                <a:latin typeface="標楷體" panose="03000509000000000000" pitchFamily="65" charset="-120"/>
+                <a:ea typeface="標楷體" panose="03000509000000000000" pitchFamily="65" charset="-120"/>
+              </a:rPr>
+              <a:t>機制用於產生</a:t>
+            </a:r>
+            <a:r>
+              <a:rPr lang="en-US" altLang="zh-TW" dirty="0">
+                <a:latin typeface="標楷體" panose="03000509000000000000" pitchFamily="65" charset="-120"/>
+                <a:ea typeface="標楷體" panose="03000509000000000000" pitchFamily="65" charset="-120"/>
+              </a:rPr>
+              <a:t>transaction</a:t>
+            </a:r>
+          </a:p>
+          <a:p>
+            <a:pPr marL="514350" indent="-514350">
+              <a:buFont typeface="+mj-lt"/>
+              <a:buAutoNum type="arabicPeriod"/>
+            </a:pPr>
+            <a:r>
+              <a:rPr lang="en-US" altLang="zh-CN" dirty="0">
+                <a:latin typeface="標楷體" panose="03000509000000000000" pitchFamily="65" charset="-120"/>
+                <a:ea typeface="標楷體" panose="03000509000000000000" pitchFamily="65" charset="-120"/>
+              </a:rPr>
+              <a:t>sequence</a:t>
+            </a:r>
+            <a:r>
+              <a:rPr lang="zh-TW" altLang="en-US" dirty="0">
+                <a:latin typeface="標楷體" panose="03000509000000000000" pitchFamily="65" charset="-120"/>
+                <a:ea typeface="標楷體" panose="03000509000000000000" pitchFamily="65" charset="-120"/>
+              </a:rPr>
+              <a:t>機制有兩大組成部分</a:t>
+            </a:r>
+            <a:endParaRPr lang="en-US" altLang="zh-TW" dirty="0">
+              <a:latin typeface="標楷體" panose="03000509000000000000" pitchFamily="65" charset="-120"/>
+              <a:ea typeface="標楷體" panose="03000509000000000000" pitchFamily="65" charset="-120"/>
+            </a:endParaRPr>
+          </a:p>
+          <a:p>
+            <a:pPr lvl="1"/>
+            <a:r>
+              <a:rPr lang="zh-TW" altLang="en-US" dirty="0">
+                <a:latin typeface="標楷體" panose="03000509000000000000" pitchFamily="65" charset="-120"/>
+                <a:ea typeface="標楷體" panose="03000509000000000000" pitchFamily="65" charset="-120"/>
+              </a:rPr>
+              <a:t>一是</a:t>
+            </a:r>
+            <a:r>
+              <a:rPr lang="en-US" altLang="zh-CN" dirty="0">
+                <a:latin typeface="標楷體" panose="03000509000000000000" pitchFamily="65" charset="-120"/>
+                <a:ea typeface="標楷體" panose="03000509000000000000" pitchFamily="65" charset="-120"/>
+              </a:rPr>
+              <a:t>sequence</a:t>
+            </a:r>
+          </a:p>
+          <a:p>
+            <a:pPr lvl="1"/>
+            <a:r>
+              <a:rPr lang="zh-TW" altLang="en-US" dirty="0">
+                <a:latin typeface="標楷體" panose="03000509000000000000" pitchFamily="65" charset="-120"/>
+                <a:ea typeface="標楷體" panose="03000509000000000000" pitchFamily="65" charset="-120"/>
+              </a:rPr>
+              <a:t>二是</a:t>
+            </a:r>
+            <a:r>
+              <a:rPr lang="en-US" altLang="zh-CN" dirty="0">
+                <a:latin typeface="標楷體" panose="03000509000000000000" pitchFamily="65" charset="-120"/>
+                <a:ea typeface="標楷體" panose="03000509000000000000" pitchFamily="65" charset="-120"/>
+              </a:rPr>
+              <a:t>sequencer</a:t>
+            </a:r>
+          </a:p>
+          <a:p>
+            <a:pPr marL="514350" indent="-514350">
+              <a:buFont typeface="+mj-lt"/>
+              <a:buAutoNum type="arabicPeriod"/>
+            </a:pPr>
+            <a:r>
+              <a:rPr lang="zh-TW" altLang="en-US" dirty="0">
+                <a:latin typeface="標楷體" panose="03000509000000000000" pitchFamily="65" charset="-120"/>
+                <a:ea typeface="標楷體" panose="03000509000000000000" pitchFamily="65" charset="-120"/>
+              </a:rPr>
+              <a:t>由於</a:t>
+            </a:r>
+            <a:r>
+              <a:rPr lang="en-US" altLang="zh-CN" dirty="0">
+                <a:latin typeface="標楷體" panose="03000509000000000000" pitchFamily="65" charset="-120"/>
+                <a:ea typeface="標楷體" panose="03000509000000000000" pitchFamily="65" charset="-120"/>
+              </a:rPr>
+              <a:t>sequencer</a:t>
+            </a:r>
+            <a:r>
+              <a:rPr lang="zh-TW" altLang="en-US" dirty="0">
+                <a:latin typeface="標楷體" panose="03000509000000000000" pitchFamily="65" charset="-120"/>
+                <a:ea typeface="標楷體" panose="03000509000000000000" pitchFamily="65" charset="-120"/>
+              </a:rPr>
+              <a:t>與</a:t>
+            </a:r>
+            <a:r>
+              <a:rPr lang="en-US" altLang="zh-CN" dirty="0">
+                <a:latin typeface="標楷體" panose="03000509000000000000" pitchFamily="65" charset="-120"/>
+                <a:ea typeface="標楷體" panose="03000509000000000000" pitchFamily="65" charset="-120"/>
+              </a:rPr>
+              <a:t>driver</a:t>
+            </a:r>
+            <a:r>
+              <a:rPr lang="zh-TW" altLang="en-US" dirty="0">
+                <a:latin typeface="標楷體" panose="03000509000000000000" pitchFamily="65" charset="-120"/>
+                <a:ea typeface="標楷體" panose="03000509000000000000" pitchFamily="65" charset="-120"/>
+              </a:rPr>
+              <a:t>的關係非常密切，</a:t>
+            </a:r>
+            <a:br>
+              <a:rPr lang="en-US" altLang="zh-TW" dirty="0">
+                <a:latin typeface="標楷體" panose="03000509000000000000" pitchFamily="65" charset="-120"/>
+                <a:ea typeface="標楷體" panose="03000509000000000000" pitchFamily="65" charset="-120"/>
+              </a:rPr>
+            </a:br>
+            <a:r>
+              <a:rPr lang="zh-TW" altLang="en-US" dirty="0">
+                <a:latin typeface="標楷體" panose="03000509000000000000" pitchFamily="65" charset="-120"/>
+                <a:ea typeface="標楷體" panose="03000509000000000000" pitchFamily="65" charset="-120"/>
+              </a:rPr>
+              <a:t>因此要把其加入</a:t>
+            </a:r>
+            <a:r>
+              <a:rPr lang="en-US" altLang="zh-CN" dirty="0">
+                <a:latin typeface="標楷體" panose="03000509000000000000" pitchFamily="65" charset="-120"/>
+                <a:ea typeface="標楷體" panose="03000509000000000000" pitchFamily="65" charset="-120"/>
+              </a:rPr>
+              <a:t>agent</a:t>
+            </a:r>
+            <a:r>
+              <a:rPr lang="zh-TW" altLang="en-US" dirty="0">
+                <a:latin typeface="標楷體" panose="03000509000000000000" pitchFamily="65" charset="-120"/>
+                <a:ea typeface="標楷體" panose="03000509000000000000" pitchFamily="65" charset="-120"/>
+              </a:rPr>
+              <a:t>中</a:t>
+            </a:r>
+            <a:endParaRPr lang="en-US" altLang="zh-CN" dirty="0">
+              <a:latin typeface="標楷體" panose="03000509000000000000" pitchFamily="65" charset="-120"/>
+              <a:ea typeface="標楷體" panose="03000509000000000000" pitchFamily="65" charset="-120"/>
+            </a:endParaRPr>
+          </a:p>
+        </p:txBody>
+      </p:sp>
+      <p:pic>
+        <p:nvPicPr>
+          <p:cNvPr id="5" name="圖片 4">
+            <a:extLst>
+              <a:ext uri="{FF2B5EF4-FFF2-40B4-BE49-F238E27FC236}">
+                <a16:creationId xmlns:a16="http://schemas.microsoft.com/office/drawing/2014/main" id="{7F3FC967-D442-F170-2922-681F9F6B7590}"/>
+              </a:ext>
+            </a:extLst>
+          </p:cNvPr>
+          <p:cNvPicPr>
+            <a:picLocks noChangeAspect="1"/>
+          </p:cNvPicPr>
+          <p:nvPr/>
+        </p:nvPicPr>
+        <p:blipFill>
+          <a:blip r:embed="rId3"/>
+          <a:stretch>
+            <a:fillRect/>
+          </a:stretch>
+        </p:blipFill>
+        <p:spPr>
+          <a:xfrm>
+            <a:off x="6363077" y="4163566"/>
+            <a:ext cx="5335247" cy="2562648"/>
+          </a:xfrm>
+          <a:prstGeom prst="rect">
+            <a:avLst/>
+          </a:prstGeom>
+          <a:ln>
+            <a:solidFill>
+              <a:schemeClr val="tx1"/>
+            </a:solidFill>
+          </a:ln>
+        </p:spPr>
+      </p:pic>
+    </p:spTree>
+    <p:extLst>
+      <p:ext uri="{BB962C8B-B14F-4D97-AF65-F5344CB8AC3E}">
+        <p14:creationId xmlns:p14="http://schemas.microsoft.com/office/powerpoint/2010/main" val="1907120988"/>
       </p:ext>
     </p:extLst>
   </p:cSld>

</xml_diff>